<commit_message>
Revert "Esercitazione 3 final"
This reverts commit 88814bea962cbf122c3dd506e22d8814757c6320.
</commit_message>
<xml_diff>
--- a/Esercitazione_3/esercitazione3.pptx
+++ b/Esercitazione_3/esercitazione3.pptx
@@ -738,7 +738,7 @@
           <a:noFill/>
           <a:extLst>
             <a:ext uri="{909E8E84-426E-40dd-AFC4-6F175D3DCCD1}">
-              <a14:hiddenFill xmlns:a14="http://schemas.microsoft.com/office/drawing/2010/main" xmlns="">
+              <a14:hiddenFill xmlns="" xmlns:a14="http://schemas.microsoft.com/office/drawing/2010/main">
                 <a:solidFill>
                   <a:srgbClr val="FFFFFF"/>
                 </a:solidFill>
@@ -798,7 +798,7 @@
             </a:ln>
             <a:extLst>
               <a:ext uri="{91240B29-F687-4f45-9708-019B960494DF}">
-                <a14:hiddenLine xmlns:a14="http://schemas.microsoft.com/office/drawing/2010/main" xmlns="" w="9525">
+                <a14:hiddenLine xmlns="" xmlns:a14="http://schemas.microsoft.com/office/drawing/2010/main" w="9525">
                   <a:solidFill>
                     <a:srgbClr val="000000"/>
                   </a:solidFill>
@@ -888,7 +888,7 @@
             </a:ln>
             <a:extLst>
               <a:ext uri="{91240B29-F687-4f45-9708-019B960494DF}">
-                <a14:hiddenLine xmlns:a14="http://schemas.microsoft.com/office/drawing/2010/main" xmlns="" w="9525">
+                <a14:hiddenLine xmlns="" xmlns:a14="http://schemas.microsoft.com/office/drawing/2010/main" w="9525">
                   <a:solidFill>
                     <a:srgbClr val="000000"/>
                   </a:solidFill>
@@ -978,7 +978,7 @@
             </a:ln>
             <a:extLst>
               <a:ext uri="{91240B29-F687-4f45-9708-019B960494DF}">
-                <a14:hiddenLine xmlns:a14="http://schemas.microsoft.com/office/drawing/2010/main" xmlns="" w="9525">
+                <a14:hiddenLine xmlns="" xmlns:a14="http://schemas.microsoft.com/office/drawing/2010/main" w="9525">
                   <a:solidFill>
                     <a:srgbClr val="000000"/>
                   </a:solidFill>
@@ -1012,7 +1012,7 @@
             </a:ln>
             <a:extLst>
               <a:ext uri="{91240B29-F687-4f45-9708-019B960494DF}">
-                <a14:hiddenLine xmlns:a14="http://schemas.microsoft.com/office/drawing/2010/main" xmlns="" w="9525">
+                <a14:hiddenLine xmlns="" xmlns:a14="http://schemas.microsoft.com/office/drawing/2010/main" w="9525">
                   <a:solidFill>
                     <a:srgbClr val="000000"/>
                   </a:solidFill>
@@ -1102,7 +1102,7 @@
             </a:ln>
             <a:extLst>
               <a:ext uri="{91240B29-F687-4f45-9708-019B960494DF}">
-                <a14:hiddenLine xmlns:a14="http://schemas.microsoft.com/office/drawing/2010/main" xmlns="" w="9525">
+                <a14:hiddenLine xmlns="" xmlns:a14="http://schemas.microsoft.com/office/drawing/2010/main" w="9525">
                   <a:solidFill>
                     <a:srgbClr val="000000"/>
                   </a:solidFill>
@@ -1164,7 +1164,7 @@
             </a:ln>
             <a:extLst>
               <a:ext uri="{91240B29-F687-4f45-9708-019B960494DF}">
-                <a14:hiddenLine xmlns:a14="http://schemas.microsoft.com/office/drawing/2010/main" xmlns="" w="9525">
+                <a14:hiddenLine xmlns="" xmlns:a14="http://schemas.microsoft.com/office/drawing/2010/main" w="9525">
                   <a:solidFill>
                     <a:srgbClr val="000000"/>
                   </a:solidFill>
@@ -1226,7 +1226,7 @@
             </a:ln>
             <a:extLst>
               <a:ext uri="{91240B29-F687-4f45-9708-019B960494DF}">
-                <a14:hiddenLine xmlns:a14="http://schemas.microsoft.com/office/drawing/2010/main" xmlns="" w="9525">
+                <a14:hiddenLine xmlns="" xmlns:a14="http://schemas.microsoft.com/office/drawing/2010/main" w="9525">
                   <a:solidFill>
                     <a:srgbClr val="000000"/>
                   </a:solidFill>
@@ -1316,7 +1316,7 @@
             </a:ln>
             <a:extLst>
               <a:ext uri="{91240B29-F687-4f45-9708-019B960494DF}">
-                <a14:hiddenLine xmlns:a14="http://schemas.microsoft.com/office/drawing/2010/main" xmlns="" w="9525">
+                <a14:hiddenLine xmlns="" xmlns:a14="http://schemas.microsoft.com/office/drawing/2010/main" w="9525">
                   <a:solidFill>
                     <a:srgbClr val="000000"/>
                   </a:solidFill>
@@ -1378,7 +1378,7 @@
             </a:ln>
             <a:extLst>
               <a:ext uri="{91240B29-F687-4f45-9708-019B960494DF}">
-                <a14:hiddenLine xmlns:a14="http://schemas.microsoft.com/office/drawing/2010/main" xmlns="" w="9525">
+                <a14:hiddenLine xmlns="" xmlns:a14="http://schemas.microsoft.com/office/drawing/2010/main" w="9525">
                   <a:solidFill>
                     <a:srgbClr val="000000"/>
                   </a:solidFill>
@@ -1440,7 +1440,7 @@
             </a:ln>
             <a:extLst>
               <a:ext uri="{91240B29-F687-4f45-9708-019B960494DF}">
-                <a14:hiddenLine xmlns:a14="http://schemas.microsoft.com/office/drawing/2010/main" xmlns="" w="9525">
+                <a14:hiddenLine xmlns="" xmlns:a14="http://schemas.microsoft.com/office/drawing/2010/main" w="9525">
                   <a:solidFill>
                     <a:srgbClr val="000000"/>
                   </a:solidFill>
@@ -1530,7 +1530,7 @@
             </a:ln>
             <a:extLst>
               <a:ext uri="{91240B29-F687-4f45-9708-019B960494DF}">
-                <a14:hiddenLine xmlns:a14="http://schemas.microsoft.com/office/drawing/2010/main" xmlns="" w="9525">
+                <a14:hiddenLine xmlns="" xmlns:a14="http://schemas.microsoft.com/office/drawing/2010/main" w="9525">
                   <a:solidFill>
                     <a:srgbClr val="000000"/>
                   </a:solidFill>
@@ -1620,7 +1620,7 @@
             </a:ln>
             <a:extLst>
               <a:ext uri="{91240B29-F687-4f45-9708-019B960494DF}">
-                <a14:hiddenLine xmlns:a14="http://schemas.microsoft.com/office/drawing/2010/main" xmlns="" w="9525">
+                <a14:hiddenLine xmlns="" xmlns:a14="http://schemas.microsoft.com/office/drawing/2010/main" w="9525">
                   <a:solidFill>
                     <a:srgbClr val="000000"/>
                   </a:solidFill>
@@ -1682,7 +1682,7 @@
             </a:ln>
             <a:extLst>
               <a:ext uri="{91240B29-F687-4f45-9708-019B960494DF}">
-                <a14:hiddenLine xmlns:a14="http://schemas.microsoft.com/office/drawing/2010/main" xmlns="" w="9525">
+                <a14:hiddenLine xmlns="" xmlns:a14="http://schemas.microsoft.com/office/drawing/2010/main" w="9525">
                   <a:solidFill>
                     <a:srgbClr val="000000"/>
                   </a:solidFill>
@@ -1792,7 +1792,7 @@
             </a:ln>
             <a:extLst>
               <a:ext uri="{91240B29-F687-4f45-9708-019B960494DF}">
-                <a14:hiddenLine xmlns:a14="http://schemas.microsoft.com/office/drawing/2010/main" xmlns="" w="9525">
+                <a14:hiddenLine xmlns="" xmlns:a14="http://schemas.microsoft.com/office/drawing/2010/main" w="9525">
                   <a:solidFill>
                     <a:srgbClr val="000000"/>
                   </a:solidFill>
@@ -1854,7 +1854,7 @@
             </a:ln>
             <a:extLst>
               <a:ext uri="{91240B29-F687-4f45-9708-019B960494DF}">
-                <a14:hiddenLine xmlns:a14="http://schemas.microsoft.com/office/drawing/2010/main" xmlns="" w="9525">
+                <a14:hiddenLine xmlns="" xmlns:a14="http://schemas.microsoft.com/office/drawing/2010/main" w="9525">
                   <a:solidFill>
                     <a:srgbClr val="000000"/>
                   </a:solidFill>
@@ -1944,7 +1944,7 @@
             </a:ln>
             <a:extLst>
               <a:ext uri="{91240B29-F687-4f45-9708-019B960494DF}">
-                <a14:hiddenLine xmlns:a14="http://schemas.microsoft.com/office/drawing/2010/main" xmlns="" w="9525">
+                <a14:hiddenLine xmlns="" xmlns:a14="http://schemas.microsoft.com/office/drawing/2010/main" w="9525">
                   <a:solidFill>
                     <a:srgbClr val="000000"/>
                   </a:solidFill>
@@ -2034,7 +2034,7 @@
             </a:ln>
             <a:extLst>
               <a:ext uri="{91240B29-F687-4f45-9708-019B960494DF}">
-                <a14:hiddenLine xmlns:a14="http://schemas.microsoft.com/office/drawing/2010/main" xmlns="" w="9525">
+                <a14:hiddenLine xmlns="" xmlns:a14="http://schemas.microsoft.com/office/drawing/2010/main" w="9525">
                   <a:solidFill>
                     <a:srgbClr val="000000"/>
                   </a:solidFill>
@@ -2096,7 +2096,7 @@
             </a:ln>
             <a:extLst>
               <a:ext uri="{91240B29-F687-4f45-9708-019B960494DF}">
-                <a14:hiddenLine xmlns:a14="http://schemas.microsoft.com/office/drawing/2010/main" xmlns="" w="9525">
+                <a14:hiddenLine xmlns="" xmlns:a14="http://schemas.microsoft.com/office/drawing/2010/main" w="9525">
                   <a:solidFill>
                     <a:srgbClr val="000000"/>
                   </a:solidFill>
@@ -2186,7 +2186,7 @@
             </a:ln>
             <a:extLst>
               <a:ext uri="{91240B29-F687-4f45-9708-019B960494DF}">
-                <a14:hiddenLine xmlns:a14="http://schemas.microsoft.com/office/drawing/2010/main" xmlns="" w="9525">
+                <a14:hiddenLine xmlns="" xmlns:a14="http://schemas.microsoft.com/office/drawing/2010/main" w="9525">
                   <a:solidFill>
                     <a:srgbClr val="000000"/>
                   </a:solidFill>
@@ -2276,7 +2276,7 @@
             </a:ln>
             <a:extLst>
               <a:ext uri="{91240B29-F687-4f45-9708-019B960494DF}">
-                <a14:hiddenLine xmlns:a14="http://schemas.microsoft.com/office/drawing/2010/main" xmlns="" w="9525">
+                <a14:hiddenLine xmlns="" xmlns:a14="http://schemas.microsoft.com/office/drawing/2010/main" w="9525">
                   <a:solidFill>
                     <a:srgbClr val="000000"/>
                   </a:solidFill>
@@ -2332,7 +2332,7 @@
             </a:ln>
             <a:extLst>
               <a:ext uri="{91240B29-F687-4f45-9708-019B960494DF}">
-                <a14:hiddenLine xmlns:a14="http://schemas.microsoft.com/office/drawing/2010/main" xmlns="" w="9525">
+                <a14:hiddenLine xmlns="" xmlns:a14="http://schemas.microsoft.com/office/drawing/2010/main" w="9525">
                   <a:solidFill>
                     <a:srgbClr val="000000"/>
                   </a:solidFill>
@@ -2422,7 +2422,7 @@
             </a:ln>
             <a:extLst>
               <a:ext uri="{91240B29-F687-4f45-9708-019B960494DF}">
-                <a14:hiddenLine xmlns:a14="http://schemas.microsoft.com/office/drawing/2010/main" xmlns="" w="9525">
+                <a14:hiddenLine xmlns="" xmlns:a14="http://schemas.microsoft.com/office/drawing/2010/main" w="9525">
                   <a:solidFill>
                     <a:srgbClr val="000000"/>
                   </a:solidFill>
@@ -2478,7 +2478,7 @@
             </a:ln>
             <a:extLst>
               <a:ext uri="{91240B29-F687-4f45-9708-019B960494DF}">
-                <a14:hiddenLine xmlns:a14="http://schemas.microsoft.com/office/drawing/2010/main" xmlns="" w="9525">
+                <a14:hiddenLine xmlns="" xmlns:a14="http://schemas.microsoft.com/office/drawing/2010/main" w="9525">
                   <a:solidFill>
                     <a:srgbClr val="000000"/>
                   </a:solidFill>
@@ -2568,7 +2568,7 @@
             </a:ln>
             <a:extLst>
               <a:ext uri="{91240B29-F687-4f45-9708-019B960494DF}">
-                <a14:hiddenLine xmlns:a14="http://schemas.microsoft.com/office/drawing/2010/main" xmlns="" w="9525">
+                <a14:hiddenLine xmlns="" xmlns:a14="http://schemas.microsoft.com/office/drawing/2010/main" w="9525">
                   <a:solidFill>
                     <a:srgbClr val="000000"/>
                   </a:solidFill>
@@ -2636,7 +2636,7 @@
             </a:ln>
             <a:extLst>
               <a:ext uri="{91240B29-F687-4f45-9708-019B960494DF}">
-                <a14:hiddenLine xmlns:a14="http://schemas.microsoft.com/office/drawing/2010/main" xmlns="" w="9525">
+                <a14:hiddenLine xmlns="" xmlns:a14="http://schemas.microsoft.com/office/drawing/2010/main" w="9525">
                   <a:solidFill>
                     <a:srgbClr val="000000"/>
                   </a:solidFill>
@@ -2726,7 +2726,7 @@
             </a:ln>
             <a:extLst>
               <a:ext uri="{91240B29-F687-4f45-9708-019B960494DF}">
-                <a14:hiddenLine xmlns:a14="http://schemas.microsoft.com/office/drawing/2010/main" xmlns="" w="9525">
+                <a14:hiddenLine xmlns="" xmlns:a14="http://schemas.microsoft.com/office/drawing/2010/main" w="9525">
                   <a:solidFill>
                     <a:srgbClr val="000000"/>
                   </a:solidFill>
@@ -2794,7 +2794,7 @@
             </a:ln>
             <a:extLst>
               <a:ext uri="{91240B29-F687-4f45-9708-019B960494DF}">
-                <a14:hiddenLine xmlns:a14="http://schemas.microsoft.com/office/drawing/2010/main" xmlns="" w="9525">
+                <a14:hiddenLine xmlns="" xmlns:a14="http://schemas.microsoft.com/office/drawing/2010/main" w="9525">
                   <a:solidFill>
                     <a:srgbClr val="000000"/>
                   </a:solidFill>
@@ -2884,7 +2884,7 @@
             </a:ln>
             <a:extLst>
               <a:ext uri="{91240B29-F687-4f45-9708-019B960494DF}">
-                <a14:hiddenLine xmlns:a14="http://schemas.microsoft.com/office/drawing/2010/main" xmlns="" w="9525">
+                <a14:hiddenLine xmlns="" xmlns:a14="http://schemas.microsoft.com/office/drawing/2010/main" w="9525">
                   <a:solidFill>
                     <a:srgbClr val="000000"/>
                   </a:solidFill>
@@ -2918,7 +2918,7 @@
             </a:ln>
             <a:extLst>
               <a:ext uri="{91240B29-F687-4f45-9708-019B960494DF}">
-                <a14:hiddenLine xmlns:a14="http://schemas.microsoft.com/office/drawing/2010/main" xmlns="" w="9525">
+                <a14:hiddenLine xmlns="" xmlns:a14="http://schemas.microsoft.com/office/drawing/2010/main" w="9525">
                   <a:solidFill>
                     <a:srgbClr val="000000"/>
                   </a:solidFill>
@@ -3008,7 +3008,7 @@
             </a:ln>
             <a:extLst>
               <a:ext uri="{91240B29-F687-4f45-9708-019B960494DF}">
-                <a14:hiddenLine xmlns:a14="http://schemas.microsoft.com/office/drawing/2010/main" xmlns="" w="9525">
+                <a14:hiddenLine xmlns="" xmlns:a14="http://schemas.microsoft.com/office/drawing/2010/main" w="9525">
                   <a:solidFill>
                     <a:srgbClr val="000000"/>
                   </a:solidFill>
@@ -3070,7 +3070,7 @@
             </a:ln>
             <a:extLst>
               <a:ext uri="{91240B29-F687-4f45-9708-019B960494DF}">
-                <a14:hiddenLine xmlns:a14="http://schemas.microsoft.com/office/drawing/2010/main" xmlns="" w="9525">
+                <a14:hiddenLine xmlns="" xmlns:a14="http://schemas.microsoft.com/office/drawing/2010/main" w="9525">
                   <a:solidFill>
                     <a:srgbClr val="000000"/>
                   </a:solidFill>
@@ -3132,7 +3132,7 @@
             </a:ln>
             <a:extLst>
               <a:ext uri="{91240B29-F687-4f45-9708-019B960494DF}">
-                <a14:hiddenLine xmlns:a14="http://schemas.microsoft.com/office/drawing/2010/main" xmlns="" w="9525">
+                <a14:hiddenLine xmlns="" xmlns:a14="http://schemas.microsoft.com/office/drawing/2010/main" w="9525">
                   <a:solidFill>
                     <a:srgbClr val="000000"/>
                   </a:solidFill>
@@ -3222,7 +3222,7 @@
             </a:ln>
             <a:extLst>
               <a:ext uri="{91240B29-F687-4f45-9708-019B960494DF}">
-                <a14:hiddenLine xmlns:a14="http://schemas.microsoft.com/office/drawing/2010/main" xmlns="" w="9525">
+                <a14:hiddenLine xmlns="" xmlns:a14="http://schemas.microsoft.com/office/drawing/2010/main" w="9525">
                   <a:solidFill>
                     <a:srgbClr val="000000"/>
                   </a:solidFill>
@@ -3290,7 +3290,7 @@
             </a:ln>
             <a:extLst>
               <a:ext uri="{91240B29-F687-4f45-9708-019B960494DF}">
-                <a14:hiddenLine xmlns:a14="http://schemas.microsoft.com/office/drawing/2010/main" xmlns="" w="9525">
+                <a14:hiddenLine xmlns="" xmlns:a14="http://schemas.microsoft.com/office/drawing/2010/main" w="9525">
                   <a:solidFill>
                     <a:srgbClr val="000000"/>
                   </a:solidFill>
@@ -3352,7 +3352,7 @@
             </a:ln>
             <a:extLst>
               <a:ext uri="{91240B29-F687-4f45-9708-019B960494DF}">
-                <a14:hiddenLine xmlns:a14="http://schemas.microsoft.com/office/drawing/2010/main" xmlns="" w="9525">
+                <a14:hiddenLine xmlns="" xmlns:a14="http://schemas.microsoft.com/office/drawing/2010/main" w="9525">
                   <a:solidFill>
                     <a:srgbClr val="000000"/>
                   </a:solidFill>
@@ -3442,7 +3442,7 @@
             </a:ln>
             <a:extLst>
               <a:ext uri="{91240B29-F687-4f45-9708-019B960494DF}">
-                <a14:hiddenLine xmlns:a14="http://schemas.microsoft.com/office/drawing/2010/main" xmlns="" w="9525">
+                <a14:hiddenLine xmlns="" xmlns:a14="http://schemas.microsoft.com/office/drawing/2010/main" w="9525">
                   <a:solidFill>
                     <a:srgbClr val="000000"/>
                   </a:solidFill>
@@ -3504,7 +3504,7 @@
             </a:ln>
             <a:extLst>
               <a:ext uri="{91240B29-F687-4f45-9708-019B960494DF}">
-                <a14:hiddenLine xmlns:a14="http://schemas.microsoft.com/office/drawing/2010/main" xmlns="" w="9525">
+                <a14:hiddenLine xmlns="" xmlns:a14="http://schemas.microsoft.com/office/drawing/2010/main" w="9525">
                   <a:solidFill>
                     <a:srgbClr val="000000"/>
                   </a:solidFill>
@@ -3594,7 +3594,7 @@
             </a:ln>
             <a:extLst>
               <a:ext uri="{91240B29-F687-4f45-9708-019B960494DF}">
-                <a14:hiddenLine xmlns:a14="http://schemas.microsoft.com/office/drawing/2010/main" xmlns="" w="9525">
+                <a14:hiddenLine xmlns="" xmlns:a14="http://schemas.microsoft.com/office/drawing/2010/main" w="9525">
                   <a:solidFill>
                     <a:srgbClr val="000000"/>
                   </a:solidFill>
@@ -3656,7 +3656,7 @@
             </a:ln>
             <a:extLst>
               <a:ext uri="{91240B29-F687-4f45-9708-019B960494DF}">
-                <a14:hiddenLine xmlns:a14="http://schemas.microsoft.com/office/drawing/2010/main" xmlns="" w="9525">
+                <a14:hiddenLine xmlns="" xmlns:a14="http://schemas.microsoft.com/office/drawing/2010/main" w="9525">
                   <a:solidFill>
                     <a:srgbClr val="000000"/>
                   </a:solidFill>
@@ -3746,7 +3746,7 @@
             </a:ln>
             <a:extLst>
               <a:ext uri="{91240B29-F687-4f45-9708-019B960494DF}">
-                <a14:hiddenLine xmlns:a14="http://schemas.microsoft.com/office/drawing/2010/main" xmlns="" w="9525">
+                <a14:hiddenLine xmlns="" xmlns:a14="http://schemas.microsoft.com/office/drawing/2010/main" w="9525">
                   <a:solidFill>
                     <a:srgbClr val="000000"/>
                   </a:solidFill>
@@ -3780,7 +3780,7 @@
             </a:ln>
             <a:extLst>
               <a:ext uri="{91240B29-F687-4f45-9708-019B960494DF}">
-                <a14:hiddenLine xmlns:a14="http://schemas.microsoft.com/office/drawing/2010/main" xmlns="" w="9525">
+                <a14:hiddenLine xmlns="" xmlns:a14="http://schemas.microsoft.com/office/drawing/2010/main" w="9525">
                   <a:solidFill>
                     <a:srgbClr val="000000"/>
                   </a:solidFill>
@@ -3845,7 +3845,7 @@
             </a:ln>
             <a:extLst>
               <a:ext uri="{91240B29-F687-4f45-9708-019B960494DF}">
-                <a14:hiddenLine xmlns:a14="http://schemas.microsoft.com/office/drawing/2010/main" xmlns="" w="9525">
+                <a14:hiddenLine xmlns="" xmlns:a14="http://schemas.microsoft.com/office/drawing/2010/main" w="9525">
                   <a:solidFill>
                     <a:srgbClr val="000000"/>
                   </a:solidFill>
@@ -3935,7 +3935,7 @@
             </a:ln>
             <a:extLst>
               <a:ext uri="{91240B29-F687-4f45-9708-019B960494DF}">
-                <a14:hiddenLine xmlns:a14="http://schemas.microsoft.com/office/drawing/2010/main" xmlns="" w="9525">
+                <a14:hiddenLine xmlns="" xmlns:a14="http://schemas.microsoft.com/office/drawing/2010/main" w="9525">
                   <a:solidFill>
                     <a:srgbClr val="000000"/>
                   </a:solidFill>
@@ -3997,7 +3997,7 @@
             </a:ln>
             <a:extLst>
               <a:ext uri="{91240B29-F687-4f45-9708-019B960494DF}">
-                <a14:hiddenLine xmlns:a14="http://schemas.microsoft.com/office/drawing/2010/main" xmlns="" w="9525">
+                <a14:hiddenLine xmlns="" xmlns:a14="http://schemas.microsoft.com/office/drawing/2010/main" w="9525">
                   <a:solidFill>
                     <a:srgbClr val="000000"/>
                   </a:solidFill>
@@ -4087,7 +4087,7 @@
             </a:ln>
             <a:extLst>
               <a:ext uri="{91240B29-F687-4f45-9708-019B960494DF}">
-                <a14:hiddenLine xmlns:a14="http://schemas.microsoft.com/office/drawing/2010/main" xmlns="" w="9525">
+                <a14:hiddenLine xmlns="" xmlns:a14="http://schemas.microsoft.com/office/drawing/2010/main" w="9525">
                   <a:solidFill>
                     <a:srgbClr val="000000"/>
                   </a:solidFill>
@@ -4177,7 +4177,7 @@
             </a:ln>
             <a:extLst>
               <a:ext uri="{91240B29-F687-4f45-9708-019B960494DF}">
-                <a14:hiddenLine xmlns:a14="http://schemas.microsoft.com/office/drawing/2010/main" xmlns="" w="9525">
+                <a14:hiddenLine xmlns="" xmlns:a14="http://schemas.microsoft.com/office/drawing/2010/main" w="9525">
                   <a:solidFill>
                     <a:srgbClr val="000000"/>
                   </a:solidFill>
@@ -4242,7 +4242,7 @@
             </a:ln>
             <a:extLst>
               <a:ext uri="{91240B29-F687-4f45-9708-019B960494DF}">
-                <a14:hiddenLine xmlns:a14="http://schemas.microsoft.com/office/drawing/2010/main" xmlns="" w="9525">
+                <a14:hiddenLine xmlns="" xmlns:a14="http://schemas.microsoft.com/office/drawing/2010/main" w="9525">
                   <a:solidFill>
                     <a:srgbClr val="000000"/>
                   </a:solidFill>
@@ -4304,7 +4304,7 @@
             </a:ln>
             <a:extLst>
               <a:ext uri="{91240B29-F687-4f45-9708-019B960494DF}">
-                <a14:hiddenLine xmlns:a14="http://schemas.microsoft.com/office/drawing/2010/main" xmlns="" w="9525">
+                <a14:hiddenLine xmlns="" xmlns:a14="http://schemas.microsoft.com/office/drawing/2010/main" w="9525">
                   <a:solidFill>
                     <a:srgbClr val="000000"/>
                   </a:solidFill>
@@ -4394,7 +4394,7 @@
             </a:ln>
             <a:extLst>
               <a:ext uri="{91240B29-F687-4f45-9708-019B960494DF}">
-                <a14:hiddenLine xmlns:a14="http://schemas.microsoft.com/office/drawing/2010/main" xmlns="" w="9525">
+                <a14:hiddenLine xmlns="" xmlns:a14="http://schemas.microsoft.com/office/drawing/2010/main" w="9525">
                   <a:solidFill>
                     <a:srgbClr val="000000"/>
                   </a:solidFill>
@@ -4484,7 +4484,7 @@
             </a:ln>
             <a:extLst>
               <a:ext uri="{91240B29-F687-4f45-9708-019B960494DF}">
-                <a14:hiddenLine xmlns:a14="http://schemas.microsoft.com/office/drawing/2010/main" xmlns="" w="9525">
+                <a14:hiddenLine xmlns="" xmlns:a14="http://schemas.microsoft.com/office/drawing/2010/main" w="9525">
                   <a:solidFill>
                     <a:srgbClr val="000000"/>
                   </a:solidFill>
@@ -4546,7 +4546,7 @@
             </a:ln>
             <a:extLst>
               <a:ext uri="{91240B29-F687-4f45-9708-019B960494DF}">
-                <a14:hiddenLine xmlns:a14="http://schemas.microsoft.com/office/drawing/2010/main" xmlns="" w="9525">
+                <a14:hiddenLine xmlns="" xmlns:a14="http://schemas.microsoft.com/office/drawing/2010/main" w="9525">
                   <a:solidFill>
                     <a:srgbClr val="000000"/>
                   </a:solidFill>
@@ -4666,7 +4666,7 @@
             </a:ln>
             <a:extLst>
               <a:ext uri="{91240B29-F687-4f45-9708-019B960494DF}">
-                <a14:hiddenLine xmlns:a14="http://schemas.microsoft.com/office/drawing/2010/main" xmlns="" w="9525">
+                <a14:hiddenLine xmlns="" xmlns:a14="http://schemas.microsoft.com/office/drawing/2010/main" w="9525">
                   <a:solidFill>
                     <a:srgbClr val="000000"/>
                   </a:solidFill>
@@ -4734,7 +4734,7 @@
             </a:ln>
             <a:extLst>
               <a:ext uri="{91240B29-F687-4f45-9708-019B960494DF}">
-                <a14:hiddenLine xmlns:a14="http://schemas.microsoft.com/office/drawing/2010/main" xmlns="" w="9525">
+                <a14:hiddenLine xmlns="" xmlns:a14="http://schemas.microsoft.com/office/drawing/2010/main" w="9525">
                   <a:solidFill>
                     <a:srgbClr val="000000"/>
                   </a:solidFill>
@@ -4824,7 +4824,7 @@
             </a:ln>
             <a:extLst>
               <a:ext uri="{91240B29-F687-4f45-9708-019B960494DF}">
-                <a14:hiddenLine xmlns:a14="http://schemas.microsoft.com/office/drawing/2010/main" xmlns="" w="9525">
+                <a14:hiddenLine xmlns="" xmlns:a14="http://schemas.microsoft.com/office/drawing/2010/main" w="9525">
                   <a:solidFill>
                     <a:srgbClr val="000000"/>
                   </a:solidFill>
@@ -9729,7 +9729,7 @@
           <a:noFill/>
           <a:extLst>
             <a:ext uri="{909E8E84-426E-40dd-AFC4-6F175D3DCCD1}">
-              <a14:hiddenFill xmlns:a14="http://schemas.microsoft.com/office/drawing/2010/main" xmlns="">
+              <a14:hiddenFill xmlns="" xmlns:a14="http://schemas.microsoft.com/office/drawing/2010/main">
                 <a:solidFill>
                   <a:srgbClr val="FFFFFF"/>
                 </a:solidFill>
@@ -9803,7 +9803,7 @@
               </a:ln>
               <a:extLst>
                 <a:ext uri="{91240B29-F687-4f45-9708-019B960494DF}">
-                  <a14:hiddenLine xmlns:a14="http://schemas.microsoft.com/office/drawing/2010/main" xmlns="" w="9525">
+                  <a14:hiddenLine xmlns="" xmlns:a14="http://schemas.microsoft.com/office/drawing/2010/main" w="9525">
                     <a:solidFill>
                       <a:srgbClr val="000000"/>
                     </a:solidFill>
@@ -9893,7 +9893,7 @@
               </a:ln>
               <a:extLst>
                 <a:ext uri="{91240B29-F687-4f45-9708-019B960494DF}">
-                  <a14:hiddenLine xmlns:a14="http://schemas.microsoft.com/office/drawing/2010/main" xmlns="" w="9525">
+                  <a14:hiddenLine xmlns="" xmlns:a14="http://schemas.microsoft.com/office/drawing/2010/main" w="9525">
                     <a:solidFill>
                       <a:srgbClr val="000000"/>
                     </a:solidFill>
@@ -9983,7 +9983,7 @@
               </a:ln>
               <a:extLst>
                 <a:ext uri="{91240B29-F687-4f45-9708-019B960494DF}">
-                  <a14:hiddenLine xmlns:a14="http://schemas.microsoft.com/office/drawing/2010/main" xmlns="" w="9525">
+                  <a14:hiddenLine xmlns="" xmlns:a14="http://schemas.microsoft.com/office/drawing/2010/main" w="9525">
                     <a:solidFill>
                       <a:srgbClr val="000000"/>
                     </a:solidFill>
@@ -10045,7 +10045,7 @@
               </a:ln>
               <a:extLst>
                 <a:ext uri="{91240B29-F687-4f45-9708-019B960494DF}">
-                  <a14:hiddenLine xmlns:a14="http://schemas.microsoft.com/office/drawing/2010/main" xmlns="" w="9525">
+                  <a14:hiddenLine xmlns="" xmlns:a14="http://schemas.microsoft.com/office/drawing/2010/main" w="9525">
                     <a:solidFill>
                       <a:srgbClr val="000000"/>
                     </a:solidFill>
@@ -10135,7 +10135,7 @@
               </a:ln>
               <a:extLst>
                 <a:ext uri="{91240B29-F687-4f45-9708-019B960494DF}">
-                  <a14:hiddenLine xmlns:a14="http://schemas.microsoft.com/office/drawing/2010/main" xmlns="" w="9525">
+                  <a14:hiddenLine xmlns="" xmlns:a14="http://schemas.microsoft.com/office/drawing/2010/main" w="9525">
                     <a:solidFill>
                       <a:srgbClr val="000000"/>
                     </a:solidFill>
@@ -10197,7 +10197,7 @@
               </a:ln>
               <a:extLst>
                 <a:ext uri="{91240B29-F687-4f45-9708-019B960494DF}">
-                  <a14:hiddenLine xmlns:a14="http://schemas.microsoft.com/office/drawing/2010/main" xmlns="" w="9525">
+                  <a14:hiddenLine xmlns="" xmlns:a14="http://schemas.microsoft.com/office/drawing/2010/main" w="9525">
                     <a:solidFill>
                       <a:srgbClr val="000000"/>
                     </a:solidFill>
@@ -10259,7 +10259,7 @@
               </a:ln>
               <a:extLst>
                 <a:ext uri="{91240B29-F687-4f45-9708-019B960494DF}">
-                  <a14:hiddenLine xmlns:a14="http://schemas.microsoft.com/office/drawing/2010/main" xmlns="" w="9525">
+                  <a14:hiddenLine xmlns="" xmlns:a14="http://schemas.microsoft.com/office/drawing/2010/main" w="9525">
                     <a:solidFill>
                       <a:srgbClr val="000000"/>
                     </a:solidFill>
@@ -10349,7 +10349,7 @@
               </a:ln>
               <a:extLst>
                 <a:ext uri="{91240B29-F687-4f45-9708-019B960494DF}">
-                  <a14:hiddenLine xmlns:a14="http://schemas.microsoft.com/office/drawing/2010/main" xmlns="" w="9525">
+                  <a14:hiddenLine xmlns="" xmlns:a14="http://schemas.microsoft.com/office/drawing/2010/main" w="9525">
                     <a:solidFill>
                       <a:srgbClr val="000000"/>
                     </a:solidFill>
@@ -10439,7 +10439,7 @@
               </a:ln>
               <a:extLst>
                 <a:ext uri="{91240B29-F687-4f45-9708-019B960494DF}">
-                  <a14:hiddenLine xmlns:a14="http://schemas.microsoft.com/office/drawing/2010/main" xmlns="" w="9525">
+                  <a14:hiddenLine xmlns="" xmlns:a14="http://schemas.microsoft.com/office/drawing/2010/main" w="9525">
                     <a:solidFill>
                       <a:srgbClr val="000000"/>
                     </a:solidFill>
@@ -10501,7 +10501,7 @@
               </a:ln>
               <a:extLst>
                 <a:ext uri="{91240B29-F687-4f45-9708-019B960494DF}">
-                  <a14:hiddenLine xmlns:a14="http://schemas.microsoft.com/office/drawing/2010/main" xmlns="" w="9525">
+                  <a14:hiddenLine xmlns="" xmlns:a14="http://schemas.microsoft.com/office/drawing/2010/main" w="9525">
                     <a:solidFill>
                       <a:srgbClr val="000000"/>
                     </a:solidFill>
@@ -10611,7 +10611,7 @@
               </a:ln>
               <a:extLst>
                 <a:ext uri="{91240B29-F687-4f45-9708-019B960494DF}">
-                  <a14:hiddenLine xmlns:a14="http://schemas.microsoft.com/office/drawing/2010/main" xmlns="" w="9525">
+                  <a14:hiddenLine xmlns="" xmlns:a14="http://schemas.microsoft.com/office/drawing/2010/main" w="9525">
                     <a:solidFill>
                       <a:srgbClr val="000000"/>
                     </a:solidFill>
@@ -10695,7 +10695,7 @@
               </a:ln>
               <a:extLst>
                 <a:ext uri="{91240B29-F687-4f45-9708-019B960494DF}">
-                  <a14:hiddenLine xmlns:a14="http://schemas.microsoft.com/office/drawing/2010/main" xmlns="" w="9525">
+                  <a14:hiddenLine xmlns="" xmlns:a14="http://schemas.microsoft.com/office/drawing/2010/main" w="9525">
                     <a:solidFill>
                       <a:srgbClr val="000000"/>
                     </a:solidFill>
@@ -10757,7 +10757,7 @@
               </a:ln>
               <a:extLst>
                 <a:ext uri="{91240B29-F687-4f45-9708-019B960494DF}">
-                  <a14:hiddenLine xmlns:a14="http://schemas.microsoft.com/office/drawing/2010/main" xmlns="" w="9525">
+                  <a14:hiddenLine xmlns="" xmlns:a14="http://schemas.microsoft.com/office/drawing/2010/main" w="9525">
                     <a:solidFill>
                       <a:srgbClr val="000000"/>
                     </a:solidFill>
@@ -10819,7 +10819,7 @@
               </a:ln>
               <a:extLst>
                 <a:ext uri="{91240B29-F687-4f45-9708-019B960494DF}">
-                  <a14:hiddenLine xmlns:a14="http://schemas.microsoft.com/office/drawing/2010/main" xmlns="" w="9525">
+                  <a14:hiddenLine xmlns="" xmlns:a14="http://schemas.microsoft.com/office/drawing/2010/main" w="9525">
                     <a:solidFill>
                       <a:srgbClr val="000000"/>
                     </a:solidFill>
@@ -10909,7 +10909,7 @@
               </a:ln>
               <a:extLst>
                 <a:ext uri="{91240B29-F687-4f45-9708-019B960494DF}">
-                  <a14:hiddenLine xmlns:a14="http://schemas.microsoft.com/office/drawing/2010/main" xmlns="" w="9525">
+                  <a14:hiddenLine xmlns="" xmlns:a14="http://schemas.microsoft.com/office/drawing/2010/main" w="9525">
                     <a:solidFill>
                       <a:srgbClr val="000000"/>
                     </a:solidFill>
@@ -10943,7 +10943,7 @@
               </a:ln>
               <a:extLst>
                 <a:ext uri="{91240B29-F687-4f45-9708-019B960494DF}">
-                  <a14:hiddenLine xmlns:a14="http://schemas.microsoft.com/office/drawing/2010/main" xmlns="" w="9525">
+                  <a14:hiddenLine xmlns="" xmlns:a14="http://schemas.microsoft.com/office/drawing/2010/main" w="9525">
                     <a:solidFill>
                       <a:srgbClr val="000000"/>
                     </a:solidFill>
@@ -11008,7 +11008,7 @@
               </a:ln>
               <a:extLst>
                 <a:ext uri="{91240B29-F687-4f45-9708-019B960494DF}">
-                  <a14:hiddenLine xmlns:a14="http://schemas.microsoft.com/office/drawing/2010/main" xmlns="" w="9525">
+                  <a14:hiddenLine xmlns="" xmlns:a14="http://schemas.microsoft.com/office/drawing/2010/main" w="9525">
                     <a:solidFill>
                       <a:srgbClr val="000000"/>
                     </a:solidFill>
@@ -11098,7 +11098,7 @@
               </a:ln>
               <a:extLst>
                 <a:ext uri="{91240B29-F687-4f45-9708-019B960494DF}">
-                  <a14:hiddenLine xmlns:a14="http://schemas.microsoft.com/office/drawing/2010/main" xmlns="" w="9525">
+                  <a14:hiddenLine xmlns="" xmlns:a14="http://schemas.microsoft.com/office/drawing/2010/main" w="9525">
                     <a:solidFill>
                       <a:srgbClr val="000000"/>
                     </a:solidFill>
@@ -11160,7 +11160,7 @@
               </a:ln>
               <a:extLst>
                 <a:ext uri="{91240B29-F687-4f45-9708-019B960494DF}">
-                  <a14:hiddenLine xmlns:a14="http://schemas.microsoft.com/office/drawing/2010/main" xmlns="" w="9525">
+                  <a14:hiddenLine xmlns="" xmlns:a14="http://schemas.microsoft.com/office/drawing/2010/main" w="9525">
                     <a:solidFill>
                       <a:srgbClr val="000000"/>
                     </a:solidFill>
@@ -11250,7 +11250,7 @@
               </a:ln>
               <a:extLst>
                 <a:ext uri="{91240B29-F687-4f45-9708-019B960494DF}">
-                  <a14:hiddenLine xmlns:a14="http://schemas.microsoft.com/office/drawing/2010/main" xmlns="" w="9525">
+                  <a14:hiddenLine xmlns="" xmlns:a14="http://schemas.microsoft.com/office/drawing/2010/main" w="9525">
                     <a:solidFill>
                       <a:srgbClr val="000000"/>
                     </a:solidFill>
@@ -11315,7 +11315,7 @@
               </a:ln>
               <a:extLst>
                 <a:ext uri="{91240B29-F687-4f45-9708-019B960494DF}">
-                  <a14:hiddenLine xmlns:a14="http://schemas.microsoft.com/office/drawing/2010/main" xmlns="" w="9525">
+                  <a14:hiddenLine xmlns="" xmlns:a14="http://schemas.microsoft.com/office/drawing/2010/main" w="9525">
                     <a:solidFill>
                       <a:srgbClr val="000000"/>
                     </a:solidFill>
@@ -11377,7 +11377,7 @@
               </a:ln>
               <a:extLst>
                 <a:ext uri="{91240B29-F687-4f45-9708-019B960494DF}">
-                  <a14:hiddenLine xmlns:a14="http://schemas.microsoft.com/office/drawing/2010/main" xmlns="" w="9525">
+                  <a14:hiddenLine xmlns="" xmlns:a14="http://schemas.microsoft.com/office/drawing/2010/main" w="9525">
                     <a:solidFill>
                       <a:srgbClr val="000000"/>
                     </a:solidFill>
@@ -11467,7 +11467,7 @@
               </a:ln>
               <a:extLst>
                 <a:ext uri="{91240B29-F687-4f45-9708-019B960494DF}">
-                  <a14:hiddenLine xmlns:a14="http://schemas.microsoft.com/office/drawing/2010/main" xmlns="" w="9525">
+                  <a14:hiddenLine xmlns="" xmlns:a14="http://schemas.microsoft.com/office/drawing/2010/main" w="9525">
                     <a:solidFill>
                       <a:srgbClr val="000000"/>
                     </a:solidFill>
@@ -11557,7 +11557,7 @@
               </a:ln>
               <a:extLst>
                 <a:ext uri="{91240B29-F687-4f45-9708-019B960494DF}">
-                  <a14:hiddenLine xmlns:a14="http://schemas.microsoft.com/office/drawing/2010/main" xmlns="" w="9525">
+                  <a14:hiddenLine xmlns="" xmlns:a14="http://schemas.microsoft.com/office/drawing/2010/main" w="9525">
                     <a:solidFill>
                       <a:srgbClr val="000000"/>
                     </a:solidFill>
@@ -11622,7 +11622,7 @@
               </a:ln>
               <a:extLst>
                 <a:ext uri="{91240B29-F687-4f45-9708-019B960494DF}">
-                  <a14:hiddenLine xmlns:a14="http://schemas.microsoft.com/office/drawing/2010/main" xmlns="" w="9525">
+                  <a14:hiddenLine xmlns="" xmlns:a14="http://schemas.microsoft.com/office/drawing/2010/main" w="9525">
                     <a:solidFill>
                       <a:srgbClr val="000000"/>
                     </a:solidFill>
@@ -11742,7 +11742,7 @@
               </a:ln>
               <a:extLst>
                 <a:ext uri="{91240B29-F687-4f45-9708-019B960494DF}">
-                  <a14:hiddenLine xmlns:a14="http://schemas.microsoft.com/office/drawing/2010/main" xmlns="" w="9525">
+                  <a14:hiddenLine xmlns="" xmlns:a14="http://schemas.microsoft.com/office/drawing/2010/main" w="9525">
                     <a:solidFill>
                       <a:srgbClr val="000000"/>
                     </a:solidFill>
@@ -11840,7 +11840,7 @@
               </a:ln>
               <a:extLst>
                 <a:ext uri="{91240B29-F687-4f45-9708-019B960494DF}">
-                  <a14:hiddenLine xmlns:a14="http://schemas.microsoft.com/office/drawing/2010/main" xmlns="" w="9525">
+                  <a14:hiddenLine xmlns="" xmlns:a14="http://schemas.microsoft.com/office/drawing/2010/main" w="9525">
                     <a:solidFill>
                       <a:srgbClr val="000000"/>
                     </a:solidFill>
@@ -11955,7 +11955,7 @@
               </a:ln>
               <a:extLst>
                 <a:ext uri="{91240B29-F687-4f45-9708-019B960494DF}">
-                  <a14:hiddenLine xmlns:a14="http://schemas.microsoft.com/office/drawing/2010/main" xmlns="" w="9525">
+                  <a14:hiddenLine xmlns="" xmlns:a14="http://schemas.microsoft.com/office/drawing/2010/main" w="9525">
                     <a:solidFill>
                       <a:srgbClr val="000000"/>
                     </a:solidFill>
@@ -12045,7 +12045,7 @@
               </a:ln>
               <a:extLst>
                 <a:ext uri="{91240B29-F687-4f45-9708-019B960494DF}">
-                  <a14:hiddenLine xmlns:a14="http://schemas.microsoft.com/office/drawing/2010/main" xmlns="" w="9525">
+                  <a14:hiddenLine xmlns="" xmlns:a14="http://schemas.microsoft.com/office/drawing/2010/main" w="9525">
                     <a:solidFill>
                       <a:srgbClr val="000000"/>
                     </a:solidFill>
@@ -12110,7 +12110,7 @@
               </a:ln>
               <a:extLst>
                 <a:ext uri="{91240B29-F687-4f45-9708-019B960494DF}">
-                  <a14:hiddenLine xmlns:a14="http://schemas.microsoft.com/office/drawing/2010/main" xmlns="" w="9525">
+                  <a14:hiddenLine xmlns="" xmlns:a14="http://schemas.microsoft.com/office/drawing/2010/main" w="9525">
                     <a:solidFill>
                       <a:srgbClr val="000000"/>
                     </a:solidFill>
@@ -12200,7 +12200,7 @@
               </a:ln>
               <a:extLst>
                 <a:ext uri="{91240B29-F687-4f45-9708-019B960494DF}">
-                  <a14:hiddenLine xmlns:a14="http://schemas.microsoft.com/office/drawing/2010/main" xmlns="" w="9525">
+                  <a14:hiddenLine xmlns="" xmlns:a14="http://schemas.microsoft.com/office/drawing/2010/main" w="9525">
                     <a:solidFill>
                       <a:srgbClr val="000000"/>
                     </a:solidFill>
@@ -12268,7 +12268,7 @@
               </a:ln>
               <a:extLst>
                 <a:ext uri="{91240B29-F687-4f45-9708-019B960494DF}">
-                  <a14:hiddenLine xmlns:a14="http://schemas.microsoft.com/office/drawing/2010/main" xmlns="" w="9525">
+                  <a14:hiddenLine xmlns="" xmlns:a14="http://schemas.microsoft.com/office/drawing/2010/main" w="9525">
                     <a:solidFill>
                       <a:srgbClr val="000000"/>
                     </a:solidFill>
@@ -12358,7 +12358,7 @@
               </a:ln>
               <a:extLst>
                 <a:ext uri="{91240B29-F687-4f45-9708-019B960494DF}">
-                  <a14:hiddenLine xmlns:a14="http://schemas.microsoft.com/office/drawing/2010/main" xmlns="" w="9525">
+                  <a14:hiddenLine xmlns="" xmlns:a14="http://schemas.microsoft.com/office/drawing/2010/main" w="9525">
                     <a:solidFill>
                       <a:srgbClr val="000000"/>
                     </a:solidFill>
@@ -12426,7 +12426,7 @@
               </a:ln>
               <a:extLst>
                 <a:ext uri="{91240B29-F687-4f45-9708-019B960494DF}">
-                  <a14:hiddenLine xmlns:a14="http://schemas.microsoft.com/office/drawing/2010/main" xmlns="" w="9525">
+                  <a14:hiddenLine xmlns="" xmlns:a14="http://schemas.microsoft.com/office/drawing/2010/main" w="9525">
                     <a:solidFill>
                       <a:srgbClr val="000000"/>
                     </a:solidFill>
@@ -12516,7 +12516,7 @@
               </a:ln>
               <a:extLst>
                 <a:ext uri="{91240B29-F687-4f45-9708-019B960494DF}">
-                  <a14:hiddenLine xmlns:a14="http://schemas.microsoft.com/office/drawing/2010/main" xmlns="" w="9525">
+                  <a14:hiddenLine xmlns="" xmlns:a14="http://schemas.microsoft.com/office/drawing/2010/main" w="9525">
                     <a:solidFill>
                       <a:srgbClr val="000000"/>
                     </a:solidFill>
@@ -12550,7 +12550,7 @@
               </a:ln>
               <a:extLst>
                 <a:ext uri="{91240B29-F687-4f45-9708-019B960494DF}">
-                  <a14:hiddenLine xmlns:a14="http://schemas.microsoft.com/office/drawing/2010/main" xmlns="" w="9525">
+                  <a14:hiddenLine xmlns="" xmlns:a14="http://schemas.microsoft.com/office/drawing/2010/main" w="9525">
                     <a:solidFill>
                       <a:srgbClr val="000000"/>
                     </a:solidFill>
@@ -13784,7 +13784,7 @@
           <a:noFill/>
           <a:extLst>
             <a:ext uri="{909E8E84-426E-40dd-AFC4-6F175D3DCCD1}">
-              <a14:hiddenFill xmlns:a14="http://schemas.microsoft.com/office/drawing/2010/main" xmlns:p14="http://schemas.microsoft.com/office/powerpoint/2010/main" xmlns:a16="http://schemas.microsoft.com/office/drawing/2014/main" xmlns="">
+              <a14:hiddenFill xmlns="" xmlns:a16="http://schemas.microsoft.com/office/drawing/2014/main" xmlns:p14="http://schemas.microsoft.com/office/powerpoint/2010/main" xmlns:a14="http://schemas.microsoft.com/office/drawing/2010/main">
                 <a:solidFill>
                   <a:srgbClr val="FFFFFF"/>
                 </a:solidFill>
@@ -13912,7 +13912,7 @@
             </a:ln>
             <a:extLst>
               <a:ext uri="{91240B29-F687-4f45-9708-019B960494DF}">
-                <a14:hiddenLine xmlns:a14="http://schemas.microsoft.com/office/drawing/2010/main" xmlns:p14="http://schemas.microsoft.com/office/powerpoint/2010/main" xmlns:a16="http://schemas.microsoft.com/office/drawing/2014/main" xmlns="" w="9525">
+                <a14:hiddenLine xmlns="" xmlns:a16="http://schemas.microsoft.com/office/drawing/2014/main" xmlns:p14="http://schemas.microsoft.com/office/powerpoint/2010/main" xmlns:a14="http://schemas.microsoft.com/office/drawing/2010/main" w="9525">
                   <a:solidFill>
                     <a:srgbClr val="000000"/>
                   </a:solidFill>
@@ -14017,7 +14017,7 @@
             </a:ln>
             <a:extLst>
               <a:ext uri="{91240B29-F687-4f45-9708-019B960494DF}">
-                <a14:hiddenLine xmlns:a14="http://schemas.microsoft.com/office/drawing/2010/main" xmlns:p14="http://schemas.microsoft.com/office/powerpoint/2010/main" xmlns:a16="http://schemas.microsoft.com/office/drawing/2014/main" xmlns="" w="9525">
+                <a14:hiddenLine xmlns="" xmlns:a16="http://schemas.microsoft.com/office/drawing/2014/main" xmlns:p14="http://schemas.microsoft.com/office/powerpoint/2010/main" xmlns:a14="http://schemas.microsoft.com/office/drawing/2010/main" w="9525">
                   <a:solidFill>
                     <a:srgbClr val="000000"/>
                   </a:solidFill>
@@ -14122,7 +14122,7 @@
             </a:ln>
             <a:extLst>
               <a:ext uri="{91240B29-F687-4f45-9708-019B960494DF}">
-                <a14:hiddenLine xmlns:a14="http://schemas.microsoft.com/office/drawing/2010/main" xmlns:p14="http://schemas.microsoft.com/office/powerpoint/2010/main" xmlns:a16="http://schemas.microsoft.com/office/drawing/2014/main" xmlns="" w="9525">
+                <a14:hiddenLine xmlns="" xmlns:a16="http://schemas.microsoft.com/office/drawing/2014/main" xmlns:p14="http://schemas.microsoft.com/office/powerpoint/2010/main" xmlns:a14="http://schemas.microsoft.com/office/drawing/2010/main" w="9525">
                   <a:solidFill>
                     <a:srgbClr val="000000"/>
                   </a:solidFill>
@@ -14199,7 +14199,7 @@
             </a:ln>
             <a:extLst>
               <a:ext uri="{91240B29-F687-4f45-9708-019B960494DF}">
-                <a14:hiddenLine xmlns:a14="http://schemas.microsoft.com/office/drawing/2010/main" xmlns:p14="http://schemas.microsoft.com/office/powerpoint/2010/main" xmlns:a16="http://schemas.microsoft.com/office/drawing/2014/main" xmlns="" w="9525">
+                <a14:hiddenLine xmlns="" xmlns:a16="http://schemas.microsoft.com/office/drawing/2014/main" xmlns:p14="http://schemas.microsoft.com/office/powerpoint/2010/main" xmlns:a14="http://schemas.microsoft.com/office/drawing/2010/main" w="9525">
                   <a:solidFill>
                     <a:srgbClr val="000000"/>
                   </a:solidFill>
@@ -14304,7 +14304,7 @@
             </a:ln>
             <a:extLst>
               <a:ext uri="{91240B29-F687-4f45-9708-019B960494DF}">
-                <a14:hiddenLine xmlns:a14="http://schemas.microsoft.com/office/drawing/2010/main" xmlns:p14="http://schemas.microsoft.com/office/powerpoint/2010/main" xmlns:a16="http://schemas.microsoft.com/office/drawing/2014/main" xmlns="" w="9525">
+                <a14:hiddenLine xmlns="" xmlns:a16="http://schemas.microsoft.com/office/drawing/2014/main" xmlns:p14="http://schemas.microsoft.com/office/powerpoint/2010/main" xmlns:a14="http://schemas.microsoft.com/office/drawing/2010/main" w="9525">
                   <a:solidFill>
                     <a:srgbClr val="000000"/>
                   </a:solidFill>
@@ -14381,7 +14381,7 @@
             </a:ln>
             <a:extLst>
               <a:ext uri="{91240B29-F687-4f45-9708-019B960494DF}">
-                <a14:hiddenLine xmlns:a14="http://schemas.microsoft.com/office/drawing/2010/main" xmlns:p14="http://schemas.microsoft.com/office/powerpoint/2010/main" xmlns:a16="http://schemas.microsoft.com/office/drawing/2014/main" xmlns="" w="9525">
+                <a14:hiddenLine xmlns="" xmlns:a16="http://schemas.microsoft.com/office/drawing/2014/main" xmlns:p14="http://schemas.microsoft.com/office/powerpoint/2010/main" xmlns:a14="http://schemas.microsoft.com/office/drawing/2010/main" w="9525">
                   <a:solidFill>
                     <a:srgbClr val="000000"/>
                   </a:solidFill>
@@ -14458,7 +14458,7 @@
             </a:ln>
             <a:extLst>
               <a:ext uri="{91240B29-F687-4f45-9708-019B960494DF}">
-                <a14:hiddenLine xmlns:a14="http://schemas.microsoft.com/office/drawing/2010/main" xmlns:p14="http://schemas.microsoft.com/office/powerpoint/2010/main" xmlns:a16="http://schemas.microsoft.com/office/drawing/2014/main" xmlns="" w="9525">
+                <a14:hiddenLine xmlns="" xmlns:a16="http://schemas.microsoft.com/office/drawing/2014/main" xmlns:p14="http://schemas.microsoft.com/office/powerpoint/2010/main" xmlns:a14="http://schemas.microsoft.com/office/drawing/2010/main" w="9525">
                   <a:solidFill>
                     <a:srgbClr val="000000"/>
                   </a:solidFill>
@@ -14563,7 +14563,7 @@
             </a:ln>
             <a:extLst>
               <a:ext uri="{91240B29-F687-4f45-9708-019B960494DF}">
-                <a14:hiddenLine xmlns:a14="http://schemas.microsoft.com/office/drawing/2010/main" xmlns:p14="http://schemas.microsoft.com/office/powerpoint/2010/main" xmlns:a16="http://schemas.microsoft.com/office/drawing/2014/main" xmlns="" w="9525">
+                <a14:hiddenLine xmlns="" xmlns:a16="http://schemas.microsoft.com/office/drawing/2014/main" xmlns:p14="http://schemas.microsoft.com/office/powerpoint/2010/main" xmlns:a14="http://schemas.microsoft.com/office/drawing/2010/main" w="9525">
                   <a:solidFill>
                     <a:srgbClr val="000000"/>
                   </a:solidFill>
@@ -14668,7 +14668,7 @@
             </a:ln>
             <a:extLst>
               <a:ext uri="{91240B29-F687-4f45-9708-019B960494DF}">
-                <a14:hiddenLine xmlns:a14="http://schemas.microsoft.com/office/drawing/2010/main" xmlns:p14="http://schemas.microsoft.com/office/powerpoint/2010/main" xmlns:a16="http://schemas.microsoft.com/office/drawing/2014/main" xmlns="" w="9525">
+                <a14:hiddenLine xmlns="" xmlns:a16="http://schemas.microsoft.com/office/drawing/2014/main" xmlns:p14="http://schemas.microsoft.com/office/powerpoint/2010/main" xmlns:a14="http://schemas.microsoft.com/office/drawing/2010/main" w="9525">
                   <a:solidFill>
                     <a:srgbClr val="000000"/>
                   </a:solidFill>
@@ -14745,7 +14745,7 @@
             </a:ln>
             <a:extLst>
               <a:ext uri="{91240B29-F687-4f45-9708-019B960494DF}">
-                <a14:hiddenLine xmlns:a14="http://schemas.microsoft.com/office/drawing/2010/main" xmlns:p14="http://schemas.microsoft.com/office/powerpoint/2010/main" xmlns:a16="http://schemas.microsoft.com/office/drawing/2014/main" xmlns="" w="9525">
+                <a14:hiddenLine xmlns="" xmlns:a16="http://schemas.microsoft.com/office/drawing/2014/main" xmlns:p14="http://schemas.microsoft.com/office/powerpoint/2010/main" xmlns:a14="http://schemas.microsoft.com/office/drawing/2010/main" w="9525">
                   <a:solidFill>
                     <a:srgbClr val="000000"/>
                   </a:solidFill>
@@ -14870,7 +14870,7 @@
             </a:ln>
             <a:extLst>
               <a:ext uri="{91240B29-F687-4f45-9708-019B960494DF}">
-                <a14:hiddenLine xmlns:a14="http://schemas.microsoft.com/office/drawing/2010/main" xmlns:p14="http://schemas.microsoft.com/office/powerpoint/2010/main" xmlns:a16="http://schemas.microsoft.com/office/drawing/2014/main" xmlns="" w="9525">
+                <a14:hiddenLine xmlns="" xmlns:a16="http://schemas.microsoft.com/office/drawing/2014/main" xmlns:p14="http://schemas.microsoft.com/office/powerpoint/2010/main" xmlns:a14="http://schemas.microsoft.com/office/drawing/2010/main" w="9525">
                   <a:solidFill>
                     <a:srgbClr val="000000"/>
                   </a:solidFill>
@@ -14984,7 +14984,7 @@
             </a:ln>
             <a:extLst>
               <a:ext uri="{91240B29-F687-4f45-9708-019B960494DF}">
-                <a14:hiddenLine xmlns:a14="http://schemas.microsoft.com/office/drawing/2010/main" xmlns:p14="http://schemas.microsoft.com/office/powerpoint/2010/main" xmlns:a16="http://schemas.microsoft.com/office/drawing/2014/main" xmlns="" w="9525">
+                <a14:hiddenLine xmlns="" xmlns:a16="http://schemas.microsoft.com/office/drawing/2014/main" xmlns:p14="http://schemas.microsoft.com/office/powerpoint/2010/main" xmlns:a14="http://schemas.microsoft.com/office/drawing/2010/main" w="9525">
                   <a:solidFill>
                     <a:srgbClr val="000000"/>
                   </a:solidFill>
@@ -15061,7 +15061,7 @@
             </a:ln>
             <a:extLst>
               <a:ext uri="{91240B29-F687-4f45-9708-019B960494DF}">
-                <a14:hiddenLine xmlns:a14="http://schemas.microsoft.com/office/drawing/2010/main" xmlns:p14="http://schemas.microsoft.com/office/powerpoint/2010/main" xmlns:a16="http://schemas.microsoft.com/office/drawing/2014/main" xmlns="" w="9525">
+                <a14:hiddenLine xmlns="" xmlns:a16="http://schemas.microsoft.com/office/drawing/2014/main" xmlns:p14="http://schemas.microsoft.com/office/powerpoint/2010/main" xmlns:a14="http://schemas.microsoft.com/office/drawing/2010/main" w="9525">
                   <a:solidFill>
                     <a:srgbClr val="000000"/>
                   </a:solidFill>
@@ -15138,7 +15138,7 @@
             </a:ln>
             <a:extLst>
               <a:ext uri="{91240B29-F687-4f45-9708-019B960494DF}">
-                <a14:hiddenLine xmlns:a14="http://schemas.microsoft.com/office/drawing/2010/main" xmlns:p14="http://schemas.microsoft.com/office/powerpoint/2010/main" xmlns:a16="http://schemas.microsoft.com/office/drawing/2014/main" xmlns="" w="9525">
+                <a14:hiddenLine xmlns="" xmlns:a16="http://schemas.microsoft.com/office/drawing/2014/main" xmlns:p14="http://schemas.microsoft.com/office/powerpoint/2010/main" xmlns:a14="http://schemas.microsoft.com/office/drawing/2010/main" w="9525">
                   <a:solidFill>
                     <a:srgbClr val="000000"/>
                   </a:solidFill>
@@ -15243,7 +15243,7 @@
             </a:ln>
             <a:extLst>
               <a:ext uri="{91240B29-F687-4f45-9708-019B960494DF}">
-                <a14:hiddenLine xmlns:a14="http://schemas.microsoft.com/office/drawing/2010/main" xmlns:p14="http://schemas.microsoft.com/office/powerpoint/2010/main" xmlns:a16="http://schemas.microsoft.com/office/drawing/2014/main" xmlns="" w="9525">
+                <a14:hiddenLine xmlns="" xmlns:a16="http://schemas.microsoft.com/office/drawing/2014/main" xmlns:p14="http://schemas.microsoft.com/office/powerpoint/2010/main" xmlns:a14="http://schemas.microsoft.com/office/drawing/2010/main" w="9525">
                   <a:solidFill>
                     <a:srgbClr val="000000"/>
                   </a:solidFill>
@@ -15292,7 +15292,7 @@
             </a:ln>
             <a:extLst>
               <a:ext uri="{91240B29-F687-4f45-9708-019B960494DF}">
-                <a14:hiddenLine xmlns:a14="http://schemas.microsoft.com/office/drawing/2010/main" xmlns:p14="http://schemas.microsoft.com/office/powerpoint/2010/main" xmlns:a16="http://schemas.microsoft.com/office/drawing/2014/main" xmlns="" w="9525">
+                <a14:hiddenLine xmlns="" xmlns:a16="http://schemas.microsoft.com/office/drawing/2014/main" xmlns:p14="http://schemas.microsoft.com/office/powerpoint/2010/main" xmlns:a14="http://schemas.microsoft.com/office/drawing/2010/main" w="9525">
                   <a:solidFill>
                     <a:srgbClr val="000000"/>
                   </a:solidFill>
@@ -15372,7 +15372,7 @@
             </a:ln>
             <a:extLst>
               <a:ext uri="{91240B29-F687-4f45-9708-019B960494DF}">
-                <a14:hiddenLine xmlns:a14="http://schemas.microsoft.com/office/drawing/2010/main" xmlns:p14="http://schemas.microsoft.com/office/powerpoint/2010/main" xmlns:a16="http://schemas.microsoft.com/office/drawing/2014/main" xmlns="" w="9525">
+                <a14:hiddenLine xmlns="" xmlns:a16="http://schemas.microsoft.com/office/drawing/2014/main" xmlns:p14="http://schemas.microsoft.com/office/powerpoint/2010/main" xmlns:a14="http://schemas.microsoft.com/office/drawing/2010/main" w="9525">
                   <a:solidFill>
                     <a:srgbClr val="000000"/>
                   </a:solidFill>
@@ -15477,7 +15477,7 @@
             </a:ln>
             <a:extLst>
               <a:ext uri="{91240B29-F687-4f45-9708-019B960494DF}">
-                <a14:hiddenLine xmlns:a14="http://schemas.microsoft.com/office/drawing/2010/main" xmlns:p14="http://schemas.microsoft.com/office/powerpoint/2010/main" xmlns:a16="http://schemas.microsoft.com/office/drawing/2014/main" xmlns="" w="9525">
+                <a14:hiddenLine xmlns="" xmlns:a16="http://schemas.microsoft.com/office/drawing/2014/main" xmlns:p14="http://schemas.microsoft.com/office/powerpoint/2010/main" xmlns:a14="http://schemas.microsoft.com/office/drawing/2010/main" w="9525">
                   <a:solidFill>
                     <a:srgbClr val="000000"/>
                   </a:solidFill>
@@ -15554,7 +15554,7 @@
             </a:ln>
             <a:extLst>
               <a:ext uri="{91240B29-F687-4f45-9708-019B960494DF}">
-                <a14:hiddenLine xmlns:a14="http://schemas.microsoft.com/office/drawing/2010/main" xmlns:p14="http://schemas.microsoft.com/office/powerpoint/2010/main" xmlns:a16="http://schemas.microsoft.com/office/drawing/2014/main" xmlns="" w="9525">
+                <a14:hiddenLine xmlns="" xmlns:a16="http://schemas.microsoft.com/office/drawing/2014/main" xmlns:p14="http://schemas.microsoft.com/office/powerpoint/2010/main" xmlns:a14="http://schemas.microsoft.com/office/drawing/2010/main" w="9525">
                   <a:solidFill>
                     <a:srgbClr val="000000"/>
                   </a:solidFill>
@@ -15659,7 +15659,7 @@
             </a:ln>
             <a:extLst>
               <a:ext uri="{91240B29-F687-4f45-9708-019B960494DF}">
-                <a14:hiddenLine xmlns:a14="http://schemas.microsoft.com/office/drawing/2010/main" xmlns:p14="http://schemas.microsoft.com/office/powerpoint/2010/main" xmlns:a16="http://schemas.microsoft.com/office/drawing/2014/main" xmlns="" w="9525">
+                <a14:hiddenLine xmlns="" xmlns:a16="http://schemas.microsoft.com/office/drawing/2014/main" xmlns:p14="http://schemas.microsoft.com/office/powerpoint/2010/main" xmlns:a14="http://schemas.microsoft.com/office/drawing/2010/main" w="9525">
                   <a:solidFill>
                     <a:srgbClr val="000000"/>
                   </a:solidFill>
@@ -15739,7 +15739,7 @@
             </a:ln>
             <a:extLst>
               <a:ext uri="{91240B29-F687-4f45-9708-019B960494DF}">
-                <a14:hiddenLine xmlns:a14="http://schemas.microsoft.com/office/drawing/2010/main" xmlns:p14="http://schemas.microsoft.com/office/powerpoint/2010/main" xmlns:a16="http://schemas.microsoft.com/office/drawing/2014/main" xmlns="" w="9525">
+                <a14:hiddenLine xmlns="" xmlns:a16="http://schemas.microsoft.com/office/drawing/2014/main" xmlns:p14="http://schemas.microsoft.com/office/powerpoint/2010/main" xmlns:a14="http://schemas.microsoft.com/office/drawing/2010/main" w="9525">
                   <a:solidFill>
                     <a:srgbClr val="000000"/>
                   </a:solidFill>
@@ -15816,7 +15816,7 @@
             </a:ln>
             <a:extLst>
               <a:ext uri="{91240B29-F687-4f45-9708-019B960494DF}">
-                <a14:hiddenLine xmlns:a14="http://schemas.microsoft.com/office/drawing/2010/main" xmlns:p14="http://schemas.microsoft.com/office/powerpoint/2010/main" xmlns:a16="http://schemas.microsoft.com/office/drawing/2014/main" xmlns="" w="9525">
+                <a14:hiddenLine xmlns="" xmlns:a16="http://schemas.microsoft.com/office/drawing/2014/main" xmlns:p14="http://schemas.microsoft.com/office/powerpoint/2010/main" xmlns:a14="http://schemas.microsoft.com/office/drawing/2010/main" w="9525">
                   <a:solidFill>
                     <a:srgbClr val="000000"/>
                   </a:solidFill>
@@ -15921,7 +15921,7 @@
             </a:ln>
             <a:extLst>
               <a:ext uri="{91240B29-F687-4f45-9708-019B960494DF}">
-                <a14:hiddenLine xmlns:a14="http://schemas.microsoft.com/office/drawing/2010/main" xmlns:p14="http://schemas.microsoft.com/office/powerpoint/2010/main" xmlns:a16="http://schemas.microsoft.com/office/drawing/2014/main" xmlns="" w="9525">
+                <a14:hiddenLine xmlns="" xmlns:a16="http://schemas.microsoft.com/office/drawing/2014/main" xmlns:p14="http://schemas.microsoft.com/office/powerpoint/2010/main" xmlns:a14="http://schemas.microsoft.com/office/drawing/2010/main" w="9525">
                   <a:solidFill>
                     <a:srgbClr val="000000"/>
                   </a:solidFill>
@@ -16026,7 +16026,7 @@
             </a:ln>
             <a:extLst>
               <a:ext uri="{91240B29-F687-4f45-9708-019B960494DF}">
-                <a14:hiddenLine xmlns:a14="http://schemas.microsoft.com/office/drawing/2010/main" xmlns:p14="http://schemas.microsoft.com/office/powerpoint/2010/main" xmlns:a16="http://schemas.microsoft.com/office/drawing/2014/main" xmlns="" w="9525">
+                <a14:hiddenLine xmlns="" xmlns:a16="http://schemas.microsoft.com/office/drawing/2014/main" xmlns:p14="http://schemas.microsoft.com/office/powerpoint/2010/main" xmlns:a14="http://schemas.microsoft.com/office/drawing/2010/main" w="9525">
                   <a:solidFill>
                     <a:srgbClr val="000000"/>
                   </a:solidFill>
@@ -16106,7 +16106,7 @@
             </a:ln>
             <a:extLst>
               <a:ext uri="{91240B29-F687-4f45-9708-019B960494DF}">
-                <a14:hiddenLine xmlns:a14="http://schemas.microsoft.com/office/drawing/2010/main" xmlns:p14="http://schemas.microsoft.com/office/powerpoint/2010/main" xmlns:a16="http://schemas.microsoft.com/office/drawing/2014/main" xmlns="" w="9525">
+                <a14:hiddenLine xmlns="" xmlns:a16="http://schemas.microsoft.com/office/drawing/2014/main" xmlns:p14="http://schemas.microsoft.com/office/powerpoint/2010/main" xmlns:a14="http://schemas.microsoft.com/office/drawing/2010/main" w="9525">
                   <a:solidFill>
                     <a:srgbClr val="000000"/>
                   </a:solidFill>
@@ -16241,7 +16241,7 @@
             </a:ln>
             <a:extLst>
               <a:ext uri="{91240B29-F687-4f45-9708-019B960494DF}">
-                <a14:hiddenLine xmlns:a14="http://schemas.microsoft.com/office/drawing/2010/main" xmlns:p14="http://schemas.microsoft.com/office/powerpoint/2010/main" xmlns:a16="http://schemas.microsoft.com/office/drawing/2014/main" xmlns="" w="9525">
+                <a14:hiddenLine xmlns="" xmlns:a16="http://schemas.microsoft.com/office/drawing/2014/main" xmlns:p14="http://schemas.microsoft.com/office/powerpoint/2010/main" xmlns:a14="http://schemas.microsoft.com/office/drawing/2010/main" w="9525">
                   <a:solidFill>
                     <a:srgbClr val="000000"/>
                   </a:solidFill>
@@ -16813,7 +16813,7 @@
           <a:noFill/>
           <a:extLst>
             <a:ext uri="{909E8E84-426E-40dd-AFC4-6F175D3DCCD1}">
-              <a14:hiddenFill xmlns="" xmlns:a16="http://schemas.microsoft.com/office/drawing/2014/main" xmlns:p14="http://schemas.microsoft.com/office/powerpoint/2010/main" xmlns:a14="http://schemas.microsoft.com/office/drawing/2010/main">
+              <a14:hiddenFill xmlns:a14="http://schemas.microsoft.com/office/drawing/2010/main" xmlns:p14="http://schemas.microsoft.com/office/powerpoint/2010/main" xmlns:a16="http://schemas.microsoft.com/office/drawing/2014/main" xmlns="">
                 <a:solidFill>
                   <a:srgbClr val="FFFFFF"/>
                 </a:solidFill>
@@ -16941,7 +16941,7 @@
             </a:ln>
             <a:extLst>
               <a:ext uri="{91240B29-F687-4f45-9708-019B960494DF}">
-                <a14:hiddenLine xmlns="" xmlns:a16="http://schemas.microsoft.com/office/drawing/2014/main" xmlns:p14="http://schemas.microsoft.com/office/powerpoint/2010/main" xmlns:a14="http://schemas.microsoft.com/office/drawing/2010/main" w="9525">
+                <a14:hiddenLine xmlns:a14="http://schemas.microsoft.com/office/drawing/2010/main" xmlns:p14="http://schemas.microsoft.com/office/powerpoint/2010/main" xmlns:a16="http://schemas.microsoft.com/office/drawing/2014/main" xmlns="" w="9525">
                   <a:solidFill>
                     <a:srgbClr val="000000"/>
                   </a:solidFill>
@@ -17046,7 +17046,7 @@
             </a:ln>
             <a:extLst>
               <a:ext uri="{91240B29-F687-4f45-9708-019B960494DF}">
-                <a14:hiddenLine xmlns="" xmlns:a16="http://schemas.microsoft.com/office/drawing/2014/main" xmlns:p14="http://schemas.microsoft.com/office/powerpoint/2010/main" xmlns:a14="http://schemas.microsoft.com/office/drawing/2010/main" w="9525">
+                <a14:hiddenLine xmlns:a14="http://schemas.microsoft.com/office/drawing/2010/main" xmlns:p14="http://schemas.microsoft.com/office/powerpoint/2010/main" xmlns:a16="http://schemas.microsoft.com/office/drawing/2014/main" xmlns="" w="9525">
                   <a:solidFill>
                     <a:srgbClr val="000000"/>
                   </a:solidFill>
@@ -17151,7 +17151,7 @@
             </a:ln>
             <a:extLst>
               <a:ext uri="{91240B29-F687-4f45-9708-019B960494DF}">
-                <a14:hiddenLine xmlns="" xmlns:a16="http://schemas.microsoft.com/office/drawing/2014/main" xmlns:p14="http://schemas.microsoft.com/office/powerpoint/2010/main" xmlns:a14="http://schemas.microsoft.com/office/drawing/2010/main" w="9525">
+                <a14:hiddenLine xmlns:a14="http://schemas.microsoft.com/office/drawing/2010/main" xmlns:p14="http://schemas.microsoft.com/office/powerpoint/2010/main" xmlns:a16="http://schemas.microsoft.com/office/drawing/2014/main" xmlns="" w="9525">
                   <a:solidFill>
                     <a:srgbClr val="000000"/>
                   </a:solidFill>
@@ -17228,7 +17228,7 @@
             </a:ln>
             <a:extLst>
               <a:ext uri="{91240B29-F687-4f45-9708-019B960494DF}">
-                <a14:hiddenLine xmlns="" xmlns:a16="http://schemas.microsoft.com/office/drawing/2014/main" xmlns:p14="http://schemas.microsoft.com/office/powerpoint/2010/main" xmlns:a14="http://schemas.microsoft.com/office/drawing/2010/main" w="9525">
+                <a14:hiddenLine xmlns:a14="http://schemas.microsoft.com/office/drawing/2010/main" xmlns:p14="http://schemas.microsoft.com/office/powerpoint/2010/main" xmlns:a16="http://schemas.microsoft.com/office/drawing/2014/main" xmlns="" w="9525">
                   <a:solidFill>
                     <a:srgbClr val="000000"/>
                   </a:solidFill>
@@ -17333,7 +17333,7 @@
             </a:ln>
             <a:extLst>
               <a:ext uri="{91240B29-F687-4f45-9708-019B960494DF}">
-                <a14:hiddenLine xmlns="" xmlns:a16="http://schemas.microsoft.com/office/drawing/2014/main" xmlns:p14="http://schemas.microsoft.com/office/powerpoint/2010/main" xmlns:a14="http://schemas.microsoft.com/office/drawing/2010/main" w="9525">
+                <a14:hiddenLine xmlns:a14="http://schemas.microsoft.com/office/drawing/2010/main" xmlns:p14="http://schemas.microsoft.com/office/powerpoint/2010/main" xmlns:a16="http://schemas.microsoft.com/office/drawing/2014/main" xmlns="" w="9525">
                   <a:solidFill>
                     <a:srgbClr val="000000"/>
                   </a:solidFill>
@@ -17410,7 +17410,7 @@
             </a:ln>
             <a:extLst>
               <a:ext uri="{91240B29-F687-4f45-9708-019B960494DF}">
-                <a14:hiddenLine xmlns="" xmlns:a16="http://schemas.microsoft.com/office/drawing/2014/main" xmlns:p14="http://schemas.microsoft.com/office/powerpoint/2010/main" xmlns:a14="http://schemas.microsoft.com/office/drawing/2010/main" w="9525">
+                <a14:hiddenLine xmlns:a14="http://schemas.microsoft.com/office/drawing/2010/main" xmlns:p14="http://schemas.microsoft.com/office/powerpoint/2010/main" xmlns:a16="http://schemas.microsoft.com/office/drawing/2014/main" xmlns="" w="9525">
                   <a:solidFill>
                     <a:srgbClr val="000000"/>
                   </a:solidFill>
@@ -17487,7 +17487,7 @@
             </a:ln>
             <a:extLst>
               <a:ext uri="{91240B29-F687-4f45-9708-019B960494DF}">
-                <a14:hiddenLine xmlns="" xmlns:a16="http://schemas.microsoft.com/office/drawing/2014/main" xmlns:p14="http://schemas.microsoft.com/office/powerpoint/2010/main" xmlns:a14="http://schemas.microsoft.com/office/drawing/2010/main" w="9525">
+                <a14:hiddenLine xmlns:a14="http://schemas.microsoft.com/office/drawing/2010/main" xmlns:p14="http://schemas.microsoft.com/office/powerpoint/2010/main" xmlns:a16="http://schemas.microsoft.com/office/drawing/2014/main" xmlns="" w="9525">
                   <a:solidFill>
                     <a:srgbClr val="000000"/>
                   </a:solidFill>
@@ -17592,7 +17592,7 @@
             </a:ln>
             <a:extLst>
               <a:ext uri="{91240B29-F687-4f45-9708-019B960494DF}">
-                <a14:hiddenLine xmlns="" xmlns:a16="http://schemas.microsoft.com/office/drawing/2014/main" xmlns:p14="http://schemas.microsoft.com/office/powerpoint/2010/main" xmlns:a14="http://schemas.microsoft.com/office/drawing/2010/main" w="9525">
+                <a14:hiddenLine xmlns:a14="http://schemas.microsoft.com/office/drawing/2010/main" xmlns:p14="http://schemas.microsoft.com/office/powerpoint/2010/main" xmlns:a16="http://schemas.microsoft.com/office/drawing/2014/main" xmlns="" w="9525">
                   <a:solidFill>
                     <a:srgbClr val="000000"/>
                   </a:solidFill>
@@ -17697,7 +17697,7 @@
             </a:ln>
             <a:extLst>
               <a:ext uri="{91240B29-F687-4f45-9708-019B960494DF}">
-                <a14:hiddenLine xmlns="" xmlns:a16="http://schemas.microsoft.com/office/drawing/2014/main" xmlns:p14="http://schemas.microsoft.com/office/powerpoint/2010/main" xmlns:a14="http://schemas.microsoft.com/office/drawing/2010/main" w="9525">
+                <a14:hiddenLine xmlns:a14="http://schemas.microsoft.com/office/drawing/2010/main" xmlns:p14="http://schemas.microsoft.com/office/powerpoint/2010/main" xmlns:a16="http://schemas.microsoft.com/office/drawing/2014/main" xmlns="" w="9525">
                   <a:solidFill>
                     <a:srgbClr val="000000"/>
                   </a:solidFill>
@@ -17774,7 +17774,7 @@
             </a:ln>
             <a:extLst>
               <a:ext uri="{91240B29-F687-4f45-9708-019B960494DF}">
-                <a14:hiddenLine xmlns="" xmlns:a16="http://schemas.microsoft.com/office/drawing/2014/main" xmlns:p14="http://schemas.microsoft.com/office/powerpoint/2010/main" xmlns:a14="http://schemas.microsoft.com/office/drawing/2010/main" w="9525">
+                <a14:hiddenLine xmlns:a14="http://schemas.microsoft.com/office/drawing/2010/main" xmlns:p14="http://schemas.microsoft.com/office/powerpoint/2010/main" xmlns:a16="http://schemas.microsoft.com/office/drawing/2014/main" xmlns="" w="9525">
                   <a:solidFill>
                     <a:srgbClr val="000000"/>
                   </a:solidFill>
@@ -17899,7 +17899,7 @@
             </a:ln>
             <a:extLst>
               <a:ext uri="{91240B29-F687-4f45-9708-019B960494DF}">
-                <a14:hiddenLine xmlns="" xmlns:a16="http://schemas.microsoft.com/office/drawing/2014/main" xmlns:p14="http://schemas.microsoft.com/office/powerpoint/2010/main" xmlns:a14="http://schemas.microsoft.com/office/drawing/2010/main" w="9525">
+                <a14:hiddenLine xmlns:a14="http://schemas.microsoft.com/office/drawing/2010/main" xmlns:p14="http://schemas.microsoft.com/office/powerpoint/2010/main" xmlns:a16="http://schemas.microsoft.com/office/drawing/2014/main" xmlns="" w="9525">
                   <a:solidFill>
                     <a:srgbClr val="000000"/>
                   </a:solidFill>
@@ -18013,7 +18013,7 @@
             </a:ln>
             <a:extLst>
               <a:ext uri="{91240B29-F687-4f45-9708-019B960494DF}">
-                <a14:hiddenLine xmlns="" xmlns:a16="http://schemas.microsoft.com/office/drawing/2014/main" xmlns:p14="http://schemas.microsoft.com/office/powerpoint/2010/main" xmlns:a14="http://schemas.microsoft.com/office/drawing/2010/main" w="9525">
+                <a14:hiddenLine xmlns:a14="http://schemas.microsoft.com/office/drawing/2010/main" xmlns:p14="http://schemas.microsoft.com/office/powerpoint/2010/main" xmlns:a16="http://schemas.microsoft.com/office/drawing/2014/main" xmlns="" w="9525">
                   <a:solidFill>
                     <a:srgbClr val="000000"/>
                   </a:solidFill>
@@ -18090,7 +18090,7 @@
             </a:ln>
             <a:extLst>
               <a:ext uri="{91240B29-F687-4f45-9708-019B960494DF}">
-                <a14:hiddenLine xmlns="" xmlns:a16="http://schemas.microsoft.com/office/drawing/2014/main" xmlns:p14="http://schemas.microsoft.com/office/powerpoint/2010/main" xmlns:a14="http://schemas.microsoft.com/office/drawing/2010/main" w="9525">
+                <a14:hiddenLine xmlns:a14="http://schemas.microsoft.com/office/drawing/2010/main" xmlns:p14="http://schemas.microsoft.com/office/powerpoint/2010/main" xmlns:a16="http://schemas.microsoft.com/office/drawing/2014/main" xmlns="" w="9525">
                   <a:solidFill>
                     <a:srgbClr val="000000"/>
                   </a:solidFill>
@@ -18167,7 +18167,7 @@
             </a:ln>
             <a:extLst>
               <a:ext uri="{91240B29-F687-4f45-9708-019B960494DF}">
-                <a14:hiddenLine xmlns="" xmlns:a16="http://schemas.microsoft.com/office/drawing/2014/main" xmlns:p14="http://schemas.microsoft.com/office/powerpoint/2010/main" xmlns:a14="http://schemas.microsoft.com/office/drawing/2010/main" w="9525">
+                <a14:hiddenLine xmlns:a14="http://schemas.microsoft.com/office/drawing/2010/main" xmlns:p14="http://schemas.microsoft.com/office/powerpoint/2010/main" xmlns:a16="http://schemas.microsoft.com/office/drawing/2014/main" xmlns="" w="9525">
                   <a:solidFill>
                     <a:srgbClr val="000000"/>
                   </a:solidFill>
@@ -18272,7 +18272,7 @@
             </a:ln>
             <a:extLst>
               <a:ext uri="{91240B29-F687-4f45-9708-019B960494DF}">
-                <a14:hiddenLine xmlns="" xmlns:a16="http://schemas.microsoft.com/office/drawing/2014/main" xmlns:p14="http://schemas.microsoft.com/office/powerpoint/2010/main" xmlns:a14="http://schemas.microsoft.com/office/drawing/2010/main" w="9525">
+                <a14:hiddenLine xmlns:a14="http://schemas.microsoft.com/office/drawing/2010/main" xmlns:p14="http://schemas.microsoft.com/office/powerpoint/2010/main" xmlns:a16="http://schemas.microsoft.com/office/drawing/2014/main" xmlns="" w="9525">
                   <a:solidFill>
                     <a:srgbClr val="000000"/>
                   </a:solidFill>
@@ -18321,7 +18321,7 @@
             </a:ln>
             <a:extLst>
               <a:ext uri="{91240B29-F687-4f45-9708-019B960494DF}">
-                <a14:hiddenLine xmlns="" xmlns:a16="http://schemas.microsoft.com/office/drawing/2014/main" xmlns:p14="http://schemas.microsoft.com/office/powerpoint/2010/main" xmlns:a14="http://schemas.microsoft.com/office/drawing/2010/main" w="9525">
+                <a14:hiddenLine xmlns:a14="http://schemas.microsoft.com/office/drawing/2010/main" xmlns:p14="http://schemas.microsoft.com/office/powerpoint/2010/main" xmlns:a16="http://schemas.microsoft.com/office/drawing/2014/main" xmlns="" w="9525">
                   <a:solidFill>
                     <a:srgbClr val="000000"/>
                   </a:solidFill>
@@ -18401,7 +18401,7 @@
             </a:ln>
             <a:extLst>
               <a:ext uri="{91240B29-F687-4f45-9708-019B960494DF}">
-                <a14:hiddenLine xmlns="" xmlns:a16="http://schemas.microsoft.com/office/drawing/2014/main" xmlns:p14="http://schemas.microsoft.com/office/powerpoint/2010/main" xmlns:a14="http://schemas.microsoft.com/office/drawing/2010/main" w="9525">
+                <a14:hiddenLine xmlns:a14="http://schemas.microsoft.com/office/drawing/2010/main" xmlns:p14="http://schemas.microsoft.com/office/powerpoint/2010/main" xmlns:a16="http://schemas.microsoft.com/office/drawing/2014/main" xmlns="" w="9525">
                   <a:solidFill>
                     <a:srgbClr val="000000"/>
                   </a:solidFill>
@@ -18506,7 +18506,7 @@
             </a:ln>
             <a:extLst>
               <a:ext uri="{91240B29-F687-4f45-9708-019B960494DF}">
-                <a14:hiddenLine xmlns="" xmlns:a16="http://schemas.microsoft.com/office/drawing/2014/main" xmlns:p14="http://schemas.microsoft.com/office/powerpoint/2010/main" xmlns:a14="http://schemas.microsoft.com/office/drawing/2010/main" w="9525">
+                <a14:hiddenLine xmlns:a14="http://schemas.microsoft.com/office/drawing/2010/main" xmlns:p14="http://schemas.microsoft.com/office/powerpoint/2010/main" xmlns:a16="http://schemas.microsoft.com/office/drawing/2014/main" xmlns="" w="9525">
                   <a:solidFill>
                     <a:srgbClr val="000000"/>
                   </a:solidFill>
@@ -18583,7 +18583,7 @@
             </a:ln>
             <a:extLst>
               <a:ext uri="{91240B29-F687-4f45-9708-019B960494DF}">
-                <a14:hiddenLine xmlns="" xmlns:a16="http://schemas.microsoft.com/office/drawing/2014/main" xmlns:p14="http://schemas.microsoft.com/office/powerpoint/2010/main" xmlns:a14="http://schemas.microsoft.com/office/drawing/2010/main" w="9525">
+                <a14:hiddenLine xmlns:a14="http://schemas.microsoft.com/office/drawing/2010/main" xmlns:p14="http://schemas.microsoft.com/office/powerpoint/2010/main" xmlns:a16="http://schemas.microsoft.com/office/drawing/2014/main" xmlns="" w="9525">
                   <a:solidFill>
                     <a:srgbClr val="000000"/>
                   </a:solidFill>
@@ -18688,7 +18688,7 @@
             </a:ln>
             <a:extLst>
               <a:ext uri="{91240B29-F687-4f45-9708-019B960494DF}">
-                <a14:hiddenLine xmlns="" xmlns:a16="http://schemas.microsoft.com/office/drawing/2014/main" xmlns:p14="http://schemas.microsoft.com/office/powerpoint/2010/main" xmlns:a14="http://schemas.microsoft.com/office/drawing/2010/main" w="9525">
+                <a14:hiddenLine xmlns:a14="http://schemas.microsoft.com/office/drawing/2010/main" xmlns:p14="http://schemas.microsoft.com/office/powerpoint/2010/main" xmlns:a16="http://schemas.microsoft.com/office/drawing/2014/main" xmlns="" w="9525">
                   <a:solidFill>
                     <a:srgbClr val="000000"/>
                   </a:solidFill>
@@ -18768,7 +18768,7 @@
             </a:ln>
             <a:extLst>
               <a:ext uri="{91240B29-F687-4f45-9708-019B960494DF}">
-                <a14:hiddenLine xmlns="" xmlns:a16="http://schemas.microsoft.com/office/drawing/2014/main" xmlns:p14="http://schemas.microsoft.com/office/powerpoint/2010/main" xmlns:a14="http://schemas.microsoft.com/office/drawing/2010/main" w="9525">
+                <a14:hiddenLine xmlns:a14="http://schemas.microsoft.com/office/drawing/2010/main" xmlns:p14="http://schemas.microsoft.com/office/powerpoint/2010/main" xmlns:a16="http://schemas.microsoft.com/office/drawing/2014/main" xmlns="" w="9525">
                   <a:solidFill>
                     <a:srgbClr val="000000"/>
                   </a:solidFill>
@@ -18845,7 +18845,7 @@
             </a:ln>
             <a:extLst>
               <a:ext uri="{91240B29-F687-4f45-9708-019B960494DF}">
-                <a14:hiddenLine xmlns="" xmlns:a16="http://schemas.microsoft.com/office/drawing/2014/main" xmlns:p14="http://schemas.microsoft.com/office/powerpoint/2010/main" xmlns:a14="http://schemas.microsoft.com/office/drawing/2010/main" w="9525">
+                <a14:hiddenLine xmlns:a14="http://schemas.microsoft.com/office/drawing/2010/main" xmlns:p14="http://schemas.microsoft.com/office/powerpoint/2010/main" xmlns:a16="http://schemas.microsoft.com/office/drawing/2014/main" xmlns="" w="9525">
                   <a:solidFill>
                     <a:srgbClr val="000000"/>
                   </a:solidFill>
@@ -18950,7 +18950,7 @@
             </a:ln>
             <a:extLst>
               <a:ext uri="{91240B29-F687-4f45-9708-019B960494DF}">
-                <a14:hiddenLine xmlns="" xmlns:a16="http://schemas.microsoft.com/office/drawing/2014/main" xmlns:p14="http://schemas.microsoft.com/office/powerpoint/2010/main" xmlns:a14="http://schemas.microsoft.com/office/drawing/2010/main" w="9525">
+                <a14:hiddenLine xmlns:a14="http://schemas.microsoft.com/office/drawing/2010/main" xmlns:p14="http://schemas.microsoft.com/office/powerpoint/2010/main" xmlns:a16="http://schemas.microsoft.com/office/drawing/2014/main" xmlns="" w="9525">
                   <a:solidFill>
                     <a:srgbClr val="000000"/>
                   </a:solidFill>
@@ -19055,7 +19055,7 @@
             </a:ln>
             <a:extLst>
               <a:ext uri="{91240B29-F687-4f45-9708-019B960494DF}">
-                <a14:hiddenLine xmlns="" xmlns:a16="http://schemas.microsoft.com/office/drawing/2014/main" xmlns:p14="http://schemas.microsoft.com/office/powerpoint/2010/main" xmlns:a14="http://schemas.microsoft.com/office/drawing/2010/main" w="9525">
+                <a14:hiddenLine xmlns:a14="http://schemas.microsoft.com/office/drawing/2010/main" xmlns:p14="http://schemas.microsoft.com/office/powerpoint/2010/main" xmlns:a16="http://schemas.microsoft.com/office/drawing/2014/main" xmlns="" w="9525">
                   <a:solidFill>
                     <a:srgbClr val="000000"/>
                   </a:solidFill>
@@ -19135,7 +19135,7 @@
             </a:ln>
             <a:extLst>
               <a:ext uri="{91240B29-F687-4f45-9708-019B960494DF}">
-                <a14:hiddenLine xmlns="" xmlns:a16="http://schemas.microsoft.com/office/drawing/2014/main" xmlns:p14="http://schemas.microsoft.com/office/powerpoint/2010/main" xmlns:a14="http://schemas.microsoft.com/office/drawing/2010/main" w="9525">
+                <a14:hiddenLine xmlns:a14="http://schemas.microsoft.com/office/drawing/2010/main" xmlns:p14="http://schemas.microsoft.com/office/powerpoint/2010/main" xmlns:a16="http://schemas.microsoft.com/office/drawing/2014/main" xmlns="" w="9525">
                   <a:solidFill>
                     <a:srgbClr val="000000"/>
                   </a:solidFill>
@@ -19270,7 +19270,7 @@
             </a:ln>
             <a:extLst>
               <a:ext uri="{91240B29-F687-4f45-9708-019B960494DF}">
-                <a14:hiddenLine xmlns="" xmlns:a16="http://schemas.microsoft.com/office/drawing/2014/main" xmlns:p14="http://schemas.microsoft.com/office/powerpoint/2010/main" xmlns:a14="http://schemas.microsoft.com/office/drawing/2010/main" w="9525">
+                <a14:hiddenLine xmlns:a14="http://schemas.microsoft.com/office/drawing/2010/main" xmlns:p14="http://schemas.microsoft.com/office/powerpoint/2010/main" xmlns:a16="http://schemas.microsoft.com/office/drawing/2014/main" xmlns="" w="9525">
                   <a:solidFill>
                     <a:srgbClr val="000000"/>
                   </a:solidFill>
@@ -19999,7 +19999,7 @@
           <a:noFill/>
           <a:extLst>
             <a:ext uri="{909E8E84-426E-40dd-AFC4-6F175D3DCCD1}">
-              <a14:hiddenFill xmlns="" xmlns:a16="http://schemas.microsoft.com/office/drawing/2014/main" xmlns:p14="http://schemas.microsoft.com/office/powerpoint/2010/main" xmlns:a14="http://schemas.microsoft.com/office/drawing/2010/main">
+              <a14:hiddenFill xmlns:a14="http://schemas.microsoft.com/office/drawing/2010/main" xmlns:p14="http://schemas.microsoft.com/office/powerpoint/2010/main" xmlns:a16="http://schemas.microsoft.com/office/drawing/2014/main" xmlns="">
                 <a:solidFill>
                   <a:srgbClr val="FFFFFF"/>
                 </a:solidFill>
@@ -20132,7 +20132,7 @@
             </a:ln>
             <a:extLst>
               <a:ext uri="{91240B29-F687-4f45-9708-019B960494DF}">
-                <a14:hiddenLine xmlns="" xmlns:a16="http://schemas.microsoft.com/office/drawing/2014/main" xmlns:p14="http://schemas.microsoft.com/office/powerpoint/2010/main" xmlns:a14="http://schemas.microsoft.com/office/drawing/2010/main" w="9525">
+                <a14:hiddenLine xmlns:a14="http://schemas.microsoft.com/office/drawing/2010/main" xmlns:p14="http://schemas.microsoft.com/office/powerpoint/2010/main" xmlns:a16="http://schemas.microsoft.com/office/drawing/2014/main" xmlns="" w="9525">
                   <a:solidFill>
                     <a:srgbClr val="000000"/>
                   </a:solidFill>
@@ -20237,7 +20237,7 @@
             </a:ln>
             <a:extLst>
               <a:ext uri="{91240B29-F687-4f45-9708-019B960494DF}">
-                <a14:hiddenLine xmlns="" xmlns:a16="http://schemas.microsoft.com/office/drawing/2014/main" xmlns:p14="http://schemas.microsoft.com/office/powerpoint/2010/main" xmlns:a14="http://schemas.microsoft.com/office/drawing/2010/main" w="9525">
+                <a14:hiddenLine xmlns:a14="http://schemas.microsoft.com/office/drawing/2010/main" xmlns:p14="http://schemas.microsoft.com/office/powerpoint/2010/main" xmlns:a16="http://schemas.microsoft.com/office/drawing/2014/main" xmlns="" w="9525">
                   <a:solidFill>
                     <a:srgbClr val="000000"/>
                   </a:solidFill>
@@ -20342,7 +20342,7 @@
             </a:ln>
             <a:extLst>
               <a:ext uri="{91240B29-F687-4f45-9708-019B960494DF}">
-                <a14:hiddenLine xmlns="" xmlns:a16="http://schemas.microsoft.com/office/drawing/2014/main" xmlns:p14="http://schemas.microsoft.com/office/powerpoint/2010/main" xmlns:a14="http://schemas.microsoft.com/office/drawing/2010/main" w="9525">
+                <a14:hiddenLine xmlns:a14="http://schemas.microsoft.com/office/drawing/2010/main" xmlns:p14="http://schemas.microsoft.com/office/powerpoint/2010/main" xmlns:a16="http://schemas.microsoft.com/office/drawing/2014/main" xmlns="" w="9525">
                   <a:solidFill>
                     <a:srgbClr val="000000"/>
                   </a:solidFill>
@@ -20419,7 +20419,7 @@
             </a:ln>
             <a:extLst>
               <a:ext uri="{91240B29-F687-4f45-9708-019B960494DF}">
-                <a14:hiddenLine xmlns="" xmlns:a16="http://schemas.microsoft.com/office/drawing/2014/main" xmlns:p14="http://schemas.microsoft.com/office/powerpoint/2010/main" xmlns:a14="http://schemas.microsoft.com/office/drawing/2010/main" w="9525">
+                <a14:hiddenLine xmlns:a14="http://schemas.microsoft.com/office/drawing/2010/main" xmlns:p14="http://schemas.microsoft.com/office/powerpoint/2010/main" xmlns:a16="http://schemas.microsoft.com/office/drawing/2014/main" xmlns="" w="9525">
                   <a:solidFill>
                     <a:srgbClr val="000000"/>
                   </a:solidFill>
@@ -20524,7 +20524,7 @@
             </a:ln>
             <a:extLst>
               <a:ext uri="{91240B29-F687-4f45-9708-019B960494DF}">
-                <a14:hiddenLine xmlns="" xmlns:a16="http://schemas.microsoft.com/office/drawing/2014/main" xmlns:p14="http://schemas.microsoft.com/office/powerpoint/2010/main" xmlns:a14="http://schemas.microsoft.com/office/drawing/2010/main" w="9525">
+                <a14:hiddenLine xmlns:a14="http://schemas.microsoft.com/office/drawing/2010/main" xmlns:p14="http://schemas.microsoft.com/office/powerpoint/2010/main" xmlns:a16="http://schemas.microsoft.com/office/drawing/2014/main" xmlns="" w="9525">
                   <a:solidFill>
                     <a:srgbClr val="000000"/>
                   </a:solidFill>
@@ -20601,7 +20601,7 @@
             </a:ln>
             <a:extLst>
               <a:ext uri="{91240B29-F687-4f45-9708-019B960494DF}">
-                <a14:hiddenLine xmlns="" xmlns:a16="http://schemas.microsoft.com/office/drawing/2014/main" xmlns:p14="http://schemas.microsoft.com/office/powerpoint/2010/main" xmlns:a14="http://schemas.microsoft.com/office/drawing/2010/main" w="9525">
+                <a14:hiddenLine xmlns:a14="http://schemas.microsoft.com/office/drawing/2010/main" xmlns:p14="http://schemas.microsoft.com/office/powerpoint/2010/main" xmlns:a16="http://schemas.microsoft.com/office/drawing/2014/main" xmlns="" w="9525">
                   <a:solidFill>
                     <a:srgbClr val="000000"/>
                   </a:solidFill>
@@ -20678,7 +20678,7 @@
             </a:ln>
             <a:extLst>
               <a:ext uri="{91240B29-F687-4f45-9708-019B960494DF}">
-                <a14:hiddenLine xmlns="" xmlns:a16="http://schemas.microsoft.com/office/drawing/2014/main" xmlns:p14="http://schemas.microsoft.com/office/powerpoint/2010/main" xmlns:a14="http://schemas.microsoft.com/office/drawing/2010/main" w="9525">
+                <a14:hiddenLine xmlns:a14="http://schemas.microsoft.com/office/drawing/2010/main" xmlns:p14="http://schemas.microsoft.com/office/powerpoint/2010/main" xmlns:a16="http://schemas.microsoft.com/office/drawing/2014/main" xmlns="" w="9525">
                   <a:solidFill>
                     <a:srgbClr val="000000"/>
                   </a:solidFill>
@@ -20783,7 +20783,7 @@
             </a:ln>
             <a:extLst>
               <a:ext uri="{91240B29-F687-4f45-9708-019B960494DF}">
-                <a14:hiddenLine xmlns="" xmlns:a16="http://schemas.microsoft.com/office/drawing/2014/main" xmlns:p14="http://schemas.microsoft.com/office/powerpoint/2010/main" xmlns:a14="http://schemas.microsoft.com/office/drawing/2010/main" w="9525">
+                <a14:hiddenLine xmlns:a14="http://schemas.microsoft.com/office/drawing/2010/main" xmlns:p14="http://schemas.microsoft.com/office/powerpoint/2010/main" xmlns:a16="http://schemas.microsoft.com/office/drawing/2014/main" xmlns="" w="9525">
                   <a:solidFill>
                     <a:srgbClr val="000000"/>
                   </a:solidFill>
@@ -20888,7 +20888,7 @@
             </a:ln>
             <a:extLst>
               <a:ext uri="{91240B29-F687-4f45-9708-019B960494DF}">
-                <a14:hiddenLine xmlns="" xmlns:a16="http://schemas.microsoft.com/office/drawing/2014/main" xmlns:p14="http://schemas.microsoft.com/office/powerpoint/2010/main" xmlns:a14="http://schemas.microsoft.com/office/drawing/2010/main" w="9525">
+                <a14:hiddenLine xmlns:a14="http://schemas.microsoft.com/office/drawing/2010/main" xmlns:p14="http://schemas.microsoft.com/office/powerpoint/2010/main" xmlns:a16="http://schemas.microsoft.com/office/drawing/2014/main" xmlns="" w="9525">
                   <a:solidFill>
                     <a:srgbClr val="000000"/>
                   </a:solidFill>
@@ -20965,7 +20965,7 @@
             </a:ln>
             <a:extLst>
               <a:ext uri="{91240B29-F687-4f45-9708-019B960494DF}">
-                <a14:hiddenLine xmlns="" xmlns:a16="http://schemas.microsoft.com/office/drawing/2014/main" xmlns:p14="http://schemas.microsoft.com/office/powerpoint/2010/main" xmlns:a14="http://schemas.microsoft.com/office/drawing/2010/main" w="9525">
+                <a14:hiddenLine xmlns:a14="http://schemas.microsoft.com/office/drawing/2010/main" xmlns:p14="http://schemas.microsoft.com/office/powerpoint/2010/main" xmlns:a16="http://schemas.microsoft.com/office/drawing/2014/main" xmlns="" w="9525">
                   <a:solidFill>
                     <a:srgbClr val="000000"/>
                   </a:solidFill>
@@ -21090,7 +21090,7 @@
             </a:ln>
             <a:extLst>
               <a:ext uri="{91240B29-F687-4f45-9708-019B960494DF}">
-                <a14:hiddenLine xmlns="" xmlns:a16="http://schemas.microsoft.com/office/drawing/2014/main" xmlns:p14="http://schemas.microsoft.com/office/powerpoint/2010/main" xmlns:a14="http://schemas.microsoft.com/office/drawing/2010/main" w="9525">
+                <a14:hiddenLine xmlns:a14="http://schemas.microsoft.com/office/drawing/2010/main" xmlns:p14="http://schemas.microsoft.com/office/powerpoint/2010/main" xmlns:a16="http://schemas.microsoft.com/office/drawing/2014/main" xmlns="" w="9525">
                   <a:solidFill>
                     <a:srgbClr val="000000"/>
                   </a:solidFill>
@@ -21204,7 +21204,7 @@
             </a:ln>
             <a:extLst>
               <a:ext uri="{91240B29-F687-4f45-9708-019B960494DF}">
-                <a14:hiddenLine xmlns="" xmlns:a16="http://schemas.microsoft.com/office/drawing/2014/main" xmlns:p14="http://schemas.microsoft.com/office/powerpoint/2010/main" xmlns:a14="http://schemas.microsoft.com/office/drawing/2010/main" w="9525">
+                <a14:hiddenLine xmlns:a14="http://schemas.microsoft.com/office/drawing/2010/main" xmlns:p14="http://schemas.microsoft.com/office/powerpoint/2010/main" xmlns:a16="http://schemas.microsoft.com/office/drawing/2014/main" xmlns="" w="9525">
                   <a:solidFill>
                     <a:srgbClr val="000000"/>
                   </a:solidFill>
@@ -21281,7 +21281,7 @@
             </a:ln>
             <a:extLst>
               <a:ext uri="{91240B29-F687-4f45-9708-019B960494DF}">
-                <a14:hiddenLine xmlns="" xmlns:a16="http://schemas.microsoft.com/office/drawing/2014/main" xmlns:p14="http://schemas.microsoft.com/office/powerpoint/2010/main" xmlns:a14="http://schemas.microsoft.com/office/drawing/2010/main" w="9525">
+                <a14:hiddenLine xmlns:a14="http://schemas.microsoft.com/office/drawing/2010/main" xmlns:p14="http://schemas.microsoft.com/office/powerpoint/2010/main" xmlns:a16="http://schemas.microsoft.com/office/drawing/2014/main" xmlns="" w="9525">
                   <a:solidFill>
                     <a:srgbClr val="000000"/>
                   </a:solidFill>
@@ -21358,7 +21358,7 @@
             </a:ln>
             <a:extLst>
               <a:ext uri="{91240B29-F687-4f45-9708-019B960494DF}">
-                <a14:hiddenLine xmlns="" xmlns:a16="http://schemas.microsoft.com/office/drawing/2014/main" xmlns:p14="http://schemas.microsoft.com/office/powerpoint/2010/main" xmlns:a14="http://schemas.microsoft.com/office/drawing/2010/main" w="9525">
+                <a14:hiddenLine xmlns:a14="http://schemas.microsoft.com/office/drawing/2010/main" xmlns:p14="http://schemas.microsoft.com/office/powerpoint/2010/main" xmlns:a16="http://schemas.microsoft.com/office/drawing/2014/main" xmlns="" w="9525">
                   <a:solidFill>
                     <a:srgbClr val="000000"/>
                   </a:solidFill>
@@ -21463,7 +21463,7 @@
             </a:ln>
             <a:extLst>
               <a:ext uri="{91240B29-F687-4f45-9708-019B960494DF}">
-                <a14:hiddenLine xmlns="" xmlns:a16="http://schemas.microsoft.com/office/drawing/2014/main" xmlns:p14="http://schemas.microsoft.com/office/powerpoint/2010/main" xmlns:a14="http://schemas.microsoft.com/office/drawing/2010/main" w="9525">
+                <a14:hiddenLine xmlns:a14="http://schemas.microsoft.com/office/drawing/2010/main" xmlns:p14="http://schemas.microsoft.com/office/powerpoint/2010/main" xmlns:a16="http://schemas.microsoft.com/office/drawing/2014/main" xmlns="" w="9525">
                   <a:solidFill>
                     <a:srgbClr val="000000"/>
                   </a:solidFill>
@@ -21512,7 +21512,7 @@
             </a:ln>
             <a:extLst>
               <a:ext uri="{91240B29-F687-4f45-9708-019B960494DF}">
-                <a14:hiddenLine xmlns="" xmlns:a16="http://schemas.microsoft.com/office/drawing/2014/main" xmlns:p14="http://schemas.microsoft.com/office/powerpoint/2010/main" xmlns:a14="http://schemas.microsoft.com/office/drawing/2010/main" w="9525">
+                <a14:hiddenLine xmlns:a14="http://schemas.microsoft.com/office/drawing/2010/main" xmlns:p14="http://schemas.microsoft.com/office/powerpoint/2010/main" xmlns:a16="http://schemas.microsoft.com/office/drawing/2014/main" xmlns="" w="9525">
                   <a:solidFill>
                     <a:srgbClr val="000000"/>
                   </a:solidFill>
@@ -21592,7 +21592,7 @@
             </a:ln>
             <a:extLst>
               <a:ext uri="{91240B29-F687-4f45-9708-019B960494DF}">
-                <a14:hiddenLine xmlns="" xmlns:a16="http://schemas.microsoft.com/office/drawing/2014/main" xmlns:p14="http://schemas.microsoft.com/office/powerpoint/2010/main" xmlns:a14="http://schemas.microsoft.com/office/drawing/2010/main" w="9525">
+                <a14:hiddenLine xmlns:a14="http://schemas.microsoft.com/office/drawing/2010/main" xmlns:p14="http://schemas.microsoft.com/office/powerpoint/2010/main" xmlns:a16="http://schemas.microsoft.com/office/drawing/2014/main" xmlns="" w="9525">
                   <a:solidFill>
                     <a:srgbClr val="000000"/>
                   </a:solidFill>
@@ -21697,7 +21697,7 @@
             </a:ln>
             <a:extLst>
               <a:ext uri="{91240B29-F687-4f45-9708-019B960494DF}">
-                <a14:hiddenLine xmlns="" xmlns:a16="http://schemas.microsoft.com/office/drawing/2014/main" xmlns:p14="http://schemas.microsoft.com/office/powerpoint/2010/main" xmlns:a14="http://schemas.microsoft.com/office/drawing/2010/main" w="9525">
+                <a14:hiddenLine xmlns:a14="http://schemas.microsoft.com/office/drawing/2010/main" xmlns:p14="http://schemas.microsoft.com/office/powerpoint/2010/main" xmlns:a16="http://schemas.microsoft.com/office/drawing/2014/main" xmlns="" w="9525">
                   <a:solidFill>
                     <a:srgbClr val="000000"/>
                   </a:solidFill>
@@ -21774,7 +21774,7 @@
             </a:ln>
             <a:extLst>
               <a:ext uri="{91240B29-F687-4f45-9708-019B960494DF}">
-                <a14:hiddenLine xmlns="" xmlns:a16="http://schemas.microsoft.com/office/drawing/2014/main" xmlns:p14="http://schemas.microsoft.com/office/powerpoint/2010/main" xmlns:a14="http://schemas.microsoft.com/office/drawing/2010/main" w="9525">
+                <a14:hiddenLine xmlns:a14="http://schemas.microsoft.com/office/drawing/2010/main" xmlns:p14="http://schemas.microsoft.com/office/powerpoint/2010/main" xmlns:a16="http://schemas.microsoft.com/office/drawing/2014/main" xmlns="" w="9525">
                   <a:solidFill>
                     <a:srgbClr val="000000"/>
                   </a:solidFill>
@@ -21879,7 +21879,7 @@
             </a:ln>
             <a:extLst>
               <a:ext uri="{91240B29-F687-4f45-9708-019B960494DF}">
-                <a14:hiddenLine xmlns="" xmlns:a16="http://schemas.microsoft.com/office/drawing/2014/main" xmlns:p14="http://schemas.microsoft.com/office/powerpoint/2010/main" xmlns:a14="http://schemas.microsoft.com/office/drawing/2010/main" w="9525">
+                <a14:hiddenLine xmlns:a14="http://schemas.microsoft.com/office/drawing/2010/main" xmlns:p14="http://schemas.microsoft.com/office/powerpoint/2010/main" xmlns:a16="http://schemas.microsoft.com/office/drawing/2014/main" xmlns="" w="9525">
                   <a:solidFill>
                     <a:srgbClr val="000000"/>
                   </a:solidFill>
@@ -21959,7 +21959,7 @@
             </a:ln>
             <a:extLst>
               <a:ext uri="{91240B29-F687-4f45-9708-019B960494DF}">
-                <a14:hiddenLine xmlns="" xmlns:a16="http://schemas.microsoft.com/office/drawing/2014/main" xmlns:p14="http://schemas.microsoft.com/office/powerpoint/2010/main" xmlns:a14="http://schemas.microsoft.com/office/drawing/2010/main" w="9525">
+                <a14:hiddenLine xmlns:a14="http://schemas.microsoft.com/office/drawing/2010/main" xmlns:p14="http://schemas.microsoft.com/office/powerpoint/2010/main" xmlns:a16="http://schemas.microsoft.com/office/drawing/2014/main" xmlns="" w="9525">
                   <a:solidFill>
                     <a:srgbClr val="000000"/>
                   </a:solidFill>
@@ -22036,7 +22036,7 @@
             </a:ln>
             <a:extLst>
               <a:ext uri="{91240B29-F687-4f45-9708-019B960494DF}">
-                <a14:hiddenLine xmlns="" xmlns:a16="http://schemas.microsoft.com/office/drawing/2014/main" xmlns:p14="http://schemas.microsoft.com/office/powerpoint/2010/main" xmlns:a14="http://schemas.microsoft.com/office/drawing/2010/main" w="9525">
+                <a14:hiddenLine xmlns:a14="http://schemas.microsoft.com/office/drawing/2010/main" xmlns:p14="http://schemas.microsoft.com/office/powerpoint/2010/main" xmlns:a16="http://schemas.microsoft.com/office/drawing/2014/main" xmlns="" w="9525">
                   <a:solidFill>
                     <a:srgbClr val="000000"/>
                   </a:solidFill>
@@ -22141,7 +22141,7 @@
             </a:ln>
             <a:extLst>
               <a:ext uri="{91240B29-F687-4f45-9708-019B960494DF}">
-                <a14:hiddenLine xmlns="" xmlns:a16="http://schemas.microsoft.com/office/drawing/2014/main" xmlns:p14="http://schemas.microsoft.com/office/powerpoint/2010/main" xmlns:a14="http://schemas.microsoft.com/office/drawing/2010/main" w="9525">
+                <a14:hiddenLine xmlns:a14="http://schemas.microsoft.com/office/drawing/2010/main" xmlns:p14="http://schemas.microsoft.com/office/powerpoint/2010/main" xmlns:a16="http://schemas.microsoft.com/office/drawing/2014/main" xmlns="" w="9525">
                   <a:solidFill>
                     <a:srgbClr val="000000"/>
                   </a:solidFill>
@@ -22246,7 +22246,7 @@
             </a:ln>
             <a:extLst>
               <a:ext uri="{91240B29-F687-4f45-9708-019B960494DF}">
-                <a14:hiddenLine xmlns="" xmlns:a16="http://schemas.microsoft.com/office/drawing/2014/main" xmlns:p14="http://schemas.microsoft.com/office/powerpoint/2010/main" xmlns:a14="http://schemas.microsoft.com/office/drawing/2010/main" w="9525">
+                <a14:hiddenLine xmlns:a14="http://schemas.microsoft.com/office/drawing/2010/main" xmlns:p14="http://schemas.microsoft.com/office/powerpoint/2010/main" xmlns:a16="http://schemas.microsoft.com/office/drawing/2014/main" xmlns="" w="9525">
                   <a:solidFill>
                     <a:srgbClr val="000000"/>
                   </a:solidFill>
@@ -22326,7 +22326,7 @@
             </a:ln>
             <a:extLst>
               <a:ext uri="{91240B29-F687-4f45-9708-019B960494DF}">
-                <a14:hiddenLine xmlns="" xmlns:a16="http://schemas.microsoft.com/office/drawing/2014/main" xmlns:p14="http://schemas.microsoft.com/office/powerpoint/2010/main" xmlns:a14="http://schemas.microsoft.com/office/drawing/2010/main" w="9525">
+                <a14:hiddenLine xmlns:a14="http://schemas.microsoft.com/office/drawing/2010/main" xmlns:p14="http://schemas.microsoft.com/office/powerpoint/2010/main" xmlns:a16="http://schemas.microsoft.com/office/drawing/2014/main" xmlns="" w="9525">
                   <a:solidFill>
                     <a:srgbClr val="000000"/>
                   </a:solidFill>
@@ -22461,7 +22461,7 @@
             </a:ln>
             <a:extLst>
               <a:ext uri="{91240B29-F687-4f45-9708-019B960494DF}">
-                <a14:hiddenLine xmlns="" xmlns:a16="http://schemas.microsoft.com/office/drawing/2014/main" xmlns:p14="http://schemas.microsoft.com/office/powerpoint/2010/main" xmlns:a14="http://schemas.microsoft.com/office/drawing/2010/main" w="9525">
+                <a14:hiddenLine xmlns:a14="http://schemas.microsoft.com/office/drawing/2010/main" xmlns:p14="http://schemas.microsoft.com/office/powerpoint/2010/main" xmlns:a16="http://schemas.microsoft.com/office/drawing/2014/main" xmlns="" w="9525">
                   <a:solidFill>
                     <a:srgbClr val="000000"/>
                   </a:solidFill>
@@ -23258,7 +23258,7 @@
           <a:noFill/>
           <a:extLst>
             <a:ext uri="{909E8E84-426E-40dd-AFC4-6F175D3DCCD1}">
-              <a14:hiddenFill xmlns="" xmlns:a16="http://schemas.microsoft.com/office/drawing/2014/main" xmlns:p14="http://schemas.microsoft.com/office/powerpoint/2010/main" xmlns:a14="http://schemas.microsoft.com/office/drawing/2010/main">
+              <a14:hiddenFill xmlns:a14="http://schemas.microsoft.com/office/drawing/2010/main" xmlns:p14="http://schemas.microsoft.com/office/powerpoint/2010/main" xmlns:a16="http://schemas.microsoft.com/office/drawing/2014/main" xmlns="">
                 <a:solidFill>
                   <a:srgbClr val="FFFFFF"/>
                 </a:solidFill>
@@ -23387,7 +23387,7 @@
             </a:ln>
             <a:extLst>
               <a:ext uri="{91240B29-F687-4f45-9708-019B960494DF}">
-                <a14:hiddenLine xmlns="" xmlns:a16="http://schemas.microsoft.com/office/drawing/2014/main" xmlns:p14="http://schemas.microsoft.com/office/powerpoint/2010/main" xmlns:a14="http://schemas.microsoft.com/office/drawing/2010/main" w="9525">
+                <a14:hiddenLine xmlns:a14="http://schemas.microsoft.com/office/drawing/2010/main" xmlns:p14="http://schemas.microsoft.com/office/powerpoint/2010/main" xmlns:a16="http://schemas.microsoft.com/office/drawing/2014/main" xmlns="" w="9525">
                   <a:solidFill>
                     <a:srgbClr val="000000"/>
                   </a:solidFill>
@@ -23492,7 +23492,7 @@
             </a:ln>
             <a:extLst>
               <a:ext uri="{91240B29-F687-4f45-9708-019B960494DF}">
-                <a14:hiddenLine xmlns="" xmlns:a16="http://schemas.microsoft.com/office/drawing/2014/main" xmlns:p14="http://schemas.microsoft.com/office/powerpoint/2010/main" xmlns:a14="http://schemas.microsoft.com/office/drawing/2010/main" w="9525">
+                <a14:hiddenLine xmlns:a14="http://schemas.microsoft.com/office/drawing/2010/main" xmlns:p14="http://schemas.microsoft.com/office/powerpoint/2010/main" xmlns:a16="http://schemas.microsoft.com/office/drawing/2014/main" xmlns="" w="9525">
                   <a:solidFill>
                     <a:srgbClr val="000000"/>
                   </a:solidFill>
@@ -23597,7 +23597,7 @@
             </a:ln>
             <a:extLst>
               <a:ext uri="{91240B29-F687-4f45-9708-019B960494DF}">
-                <a14:hiddenLine xmlns="" xmlns:a16="http://schemas.microsoft.com/office/drawing/2014/main" xmlns:p14="http://schemas.microsoft.com/office/powerpoint/2010/main" xmlns:a14="http://schemas.microsoft.com/office/drawing/2010/main" w="9525">
+                <a14:hiddenLine xmlns:a14="http://schemas.microsoft.com/office/drawing/2010/main" xmlns:p14="http://schemas.microsoft.com/office/powerpoint/2010/main" xmlns:a16="http://schemas.microsoft.com/office/drawing/2014/main" xmlns="" w="9525">
                   <a:solidFill>
                     <a:srgbClr val="000000"/>
                   </a:solidFill>
@@ -23674,7 +23674,7 @@
             </a:ln>
             <a:extLst>
               <a:ext uri="{91240B29-F687-4f45-9708-019B960494DF}">
-                <a14:hiddenLine xmlns="" xmlns:a16="http://schemas.microsoft.com/office/drawing/2014/main" xmlns:p14="http://schemas.microsoft.com/office/powerpoint/2010/main" xmlns:a14="http://schemas.microsoft.com/office/drawing/2010/main" w="9525">
+                <a14:hiddenLine xmlns:a14="http://schemas.microsoft.com/office/drawing/2010/main" xmlns:p14="http://schemas.microsoft.com/office/powerpoint/2010/main" xmlns:a16="http://schemas.microsoft.com/office/drawing/2014/main" xmlns="" w="9525">
                   <a:solidFill>
                     <a:srgbClr val="000000"/>
                   </a:solidFill>
@@ -23779,7 +23779,7 @@
             </a:ln>
             <a:extLst>
               <a:ext uri="{91240B29-F687-4f45-9708-019B960494DF}">
-                <a14:hiddenLine xmlns="" xmlns:a16="http://schemas.microsoft.com/office/drawing/2014/main" xmlns:p14="http://schemas.microsoft.com/office/powerpoint/2010/main" xmlns:a14="http://schemas.microsoft.com/office/drawing/2010/main" w="9525">
+                <a14:hiddenLine xmlns:a14="http://schemas.microsoft.com/office/drawing/2010/main" xmlns:p14="http://schemas.microsoft.com/office/powerpoint/2010/main" xmlns:a16="http://schemas.microsoft.com/office/drawing/2014/main" xmlns="" w="9525">
                   <a:solidFill>
                     <a:srgbClr val="000000"/>
                   </a:solidFill>
@@ -23856,7 +23856,7 @@
             </a:ln>
             <a:extLst>
               <a:ext uri="{91240B29-F687-4f45-9708-019B960494DF}">
-                <a14:hiddenLine xmlns="" xmlns:a16="http://schemas.microsoft.com/office/drawing/2014/main" xmlns:p14="http://schemas.microsoft.com/office/powerpoint/2010/main" xmlns:a14="http://schemas.microsoft.com/office/drawing/2010/main" w="9525">
+                <a14:hiddenLine xmlns:a14="http://schemas.microsoft.com/office/drawing/2010/main" xmlns:p14="http://schemas.microsoft.com/office/powerpoint/2010/main" xmlns:a16="http://schemas.microsoft.com/office/drawing/2014/main" xmlns="" w="9525">
                   <a:solidFill>
                     <a:srgbClr val="000000"/>
                   </a:solidFill>
@@ -23933,7 +23933,7 @@
             </a:ln>
             <a:extLst>
               <a:ext uri="{91240B29-F687-4f45-9708-019B960494DF}">
-                <a14:hiddenLine xmlns="" xmlns:a16="http://schemas.microsoft.com/office/drawing/2014/main" xmlns:p14="http://schemas.microsoft.com/office/powerpoint/2010/main" xmlns:a14="http://schemas.microsoft.com/office/drawing/2010/main" w="9525">
+                <a14:hiddenLine xmlns:a14="http://schemas.microsoft.com/office/drawing/2010/main" xmlns:p14="http://schemas.microsoft.com/office/powerpoint/2010/main" xmlns:a16="http://schemas.microsoft.com/office/drawing/2014/main" xmlns="" w="9525">
                   <a:solidFill>
                     <a:srgbClr val="000000"/>
                   </a:solidFill>
@@ -24038,7 +24038,7 @@
             </a:ln>
             <a:extLst>
               <a:ext uri="{91240B29-F687-4f45-9708-019B960494DF}">
-                <a14:hiddenLine xmlns="" xmlns:a16="http://schemas.microsoft.com/office/drawing/2014/main" xmlns:p14="http://schemas.microsoft.com/office/powerpoint/2010/main" xmlns:a14="http://schemas.microsoft.com/office/drawing/2010/main" w="9525">
+                <a14:hiddenLine xmlns:a14="http://schemas.microsoft.com/office/drawing/2010/main" xmlns:p14="http://schemas.microsoft.com/office/powerpoint/2010/main" xmlns:a16="http://schemas.microsoft.com/office/drawing/2014/main" xmlns="" w="9525">
                   <a:solidFill>
                     <a:srgbClr val="000000"/>
                   </a:solidFill>
@@ -24143,7 +24143,7 @@
             </a:ln>
             <a:extLst>
               <a:ext uri="{91240B29-F687-4f45-9708-019B960494DF}">
-                <a14:hiddenLine xmlns="" xmlns:a16="http://schemas.microsoft.com/office/drawing/2014/main" xmlns:p14="http://schemas.microsoft.com/office/powerpoint/2010/main" xmlns:a14="http://schemas.microsoft.com/office/drawing/2010/main" w="9525">
+                <a14:hiddenLine xmlns:a14="http://schemas.microsoft.com/office/drawing/2010/main" xmlns:p14="http://schemas.microsoft.com/office/powerpoint/2010/main" xmlns:a16="http://schemas.microsoft.com/office/drawing/2014/main" xmlns="" w="9525">
                   <a:solidFill>
                     <a:srgbClr val="000000"/>
                   </a:solidFill>
@@ -24220,7 +24220,7 @@
             </a:ln>
             <a:extLst>
               <a:ext uri="{91240B29-F687-4f45-9708-019B960494DF}">
-                <a14:hiddenLine xmlns="" xmlns:a16="http://schemas.microsoft.com/office/drawing/2014/main" xmlns:p14="http://schemas.microsoft.com/office/powerpoint/2010/main" xmlns:a14="http://schemas.microsoft.com/office/drawing/2010/main" w="9525">
+                <a14:hiddenLine xmlns:a14="http://schemas.microsoft.com/office/drawing/2010/main" xmlns:p14="http://schemas.microsoft.com/office/powerpoint/2010/main" xmlns:a16="http://schemas.microsoft.com/office/drawing/2014/main" xmlns="" w="9525">
                   <a:solidFill>
                     <a:srgbClr val="000000"/>
                   </a:solidFill>
@@ -24345,7 +24345,7 @@
             </a:ln>
             <a:extLst>
               <a:ext uri="{91240B29-F687-4f45-9708-019B960494DF}">
-                <a14:hiddenLine xmlns="" xmlns:a16="http://schemas.microsoft.com/office/drawing/2014/main" xmlns:p14="http://schemas.microsoft.com/office/powerpoint/2010/main" xmlns:a14="http://schemas.microsoft.com/office/drawing/2010/main" w="9525">
+                <a14:hiddenLine xmlns:a14="http://schemas.microsoft.com/office/drawing/2010/main" xmlns:p14="http://schemas.microsoft.com/office/powerpoint/2010/main" xmlns:a16="http://schemas.microsoft.com/office/drawing/2014/main" xmlns="" w="9525">
                   <a:solidFill>
                     <a:srgbClr val="000000"/>
                   </a:solidFill>
@@ -24459,7 +24459,7 @@
             </a:ln>
             <a:extLst>
               <a:ext uri="{91240B29-F687-4f45-9708-019B960494DF}">
-                <a14:hiddenLine xmlns="" xmlns:a16="http://schemas.microsoft.com/office/drawing/2014/main" xmlns:p14="http://schemas.microsoft.com/office/powerpoint/2010/main" xmlns:a14="http://schemas.microsoft.com/office/drawing/2010/main" w="9525">
+                <a14:hiddenLine xmlns:a14="http://schemas.microsoft.com/office/drawing/2010/main" xmlns:p14="http://schemas.microsoft.com/office/powerpoint/2010/main" xmlns:a16="http://schemas.microsoft.com/office/drawing/2014/main" xmlns="" w="9525">
                   <a:solidFill>
                     <a:srgbClr val="000000"/>
                   </a:solidFill>
@@ -24536,7 +24536,7 @@
             </a:ln>
             <a:extLst>
               <a:ext uri="{91240B29-F687-4f45-9708-019B960494DF}">
-                <a14:hiddenLine xmlns="" xmlns:a16="http://schemas.microsoft.com/office/drawing/2014/main" xmlns:p14="http://schemas.microsoft.com/office/powerpoint/2010/main" xmlns:a14="http://schemas.microsoft.com/office/drawing/2010/main" w="9525">
+                <a14:hiddenLine xmlns:a14="http://schemas.microsoft.com/office/drawing/2010/main" xmlns:p14="http://schemas.microsoft.com/office/powerpoint/2010/main" xmlns:a16="http://schemas.microsoft.com/office/drawing/2014/main" xmlns="" w="9525">
                   <a:solidFill>
                     <a:srgbClr val="000000"/>
                   </a:solidFill>
@@ -24613,7 +24613,7 @@
             </a:ln>
             <a:extLst>
               <a:ext uri="{91240B29-F687-4f45-9708-019B960494DF}">
-                <a14:hiddenLine xmlns="" xmlns:a16="http://schemas.microsoft.com/office/drawing/2014/main" xmlns:p14="http://schemas.microsoft.com/office/powerpoint/2010/main" xmlns:a14="http://schemas.microsoft.com/office/drawing/2010/main" w="9525">
+                <a14:hiddenLine xmlns:a14="http://schemas.microsoft.com/office/drawing/2010/main" xmlns:p14="http://schemas.microsoft.com/office/powerpoint/2010/main" xmlns:a16="http://schemas.microsoft.com/office/drawing/2014/main" xmlns="" w="9525">
                   <a:solidFill>
                     <a:srgbClr val="000000"/>
                   </a:solidFill>
@@ -24718,7 +24718,7 @@
             </a:ln>
             <a:extLst>
               <a:ext uri="{91240B29-F687-4f45-9708-019B960494DF}">
-                <a14:hiddenLine xmlns="" xmlns:a16="http://schemas.microsoft.com/office/drawing/2014/main" xmlns:p14="http://schemas.microsoft.com/office/powerpoint/2010/main" xmlns:a14="http://schemas.microsoft.com/office/drawing/2010/main" w="9525">
+                <a14:hiddenLine xmlns:a14="http://schemas.microsoft.com/office/drawing/2010/main" xmlns:p14="http://schemas.microsoft.com/office/powerpoint/2010/main" xmlns:a16="http://schemas.microsoft.com/office/drawing/2014/main" xmlns="" w="9525">
                   <a:solidFill>
                     <a:srgbClr val="000000"/>
                   </a:solidFill>
@@ -24767,7 +24767,7 @@
             </a:ln>
             <a:extLst>
               <a:ext uri="{91240B29-F687-4f45-9708-019B960494DF}">
-                <a14:hiddenLine xmlns="" xmlns:a16="http://schemas.microsoft.com/office/drawing/2014/main" xmlns:p14="http://schemas.microsoft.com/office/powerpoint/2010/main" xmlns:a14="http://schemas.microsoft.com/office/drawing/2010/main" w="9525">
+                <a14:hiddenLine xmlns:a14="http://schemas.microsoft.com/office/drawing/2010/main" xmlns:p14="http://schemas.microsoft.com/office/powerpoint/2010/main" xmlns:a16="http://schemas.microsoft.com/office/drawing/2014/main" xmlns="" w="9525">
                   <a:solidFill>
                     <a:srgbClr val="000000"/>
                   </a:solidFill>
@@ -24847,7 +24847,7 @@
             </a:ln>
             <a:extLst>
               <a:ext uri="{91240B29-F687-4f45-9708-019B960494DF}">
-                <a14:hiddenLine xmlns="" xmlns:a16="http://schemas.microsoft.com/office/drawing/2014/main" xmlns:p14="http://schemas.microsoft.com/office/powerpoint/2010/main" xmlns:a14="http://schemas.microsoft.com/office/drawing/2010/main" w="9525">
+                <a14:hiddenLine xmlns:a14="http://schemas.microsoft.com/office/drawing/2010/main" xmlns:p14="http://schemas.microsoft.com/office/powerpoint/2010/main" xmlns:a16="http://schemas.microsoft.com/office/drawing/2014/main" xmlns="" w="9525">
                   <a:solidFill>
                     <a:srgbClr val="000000"/>
                   </a:solidFill>
@@ -24952,7 +24952,7 @@
             </a:ln>
             <a:extLst>
               <a:ext uri="{91240B29-F687-4f45-9708-019B960494DF}">
-                <a14:hiddenLine xmlns="" xmlns:a16="http://schemas.microsoft.com/office/drawing/2014/main" xmlns:p14="http://schemas.microsoft.com/office/powerpoint/2010/main" xmlns:a14="http://schemas.microsoft.com/office/drawing/2010/main" w="9525">
+                <a14:hiddenLine xmlns:a14="http://schemas.microsoft.com/office/drawing/2010/main" xmlns:p14="http://schemas.microsoft.com/office/powerpoint/2010/main" xmlns:a16="http://schemas.microsoft.com/office/drawing/2014/main" xmlns="" w="9525">
                   <a:solidFill>
                     <a:srgbClr val="000000"/>
                   </a:solidFill>
@@ -25029,7 +25029,7 @@
             </a:ln>
             <a:extLst>
               <a:ext uri="{91240B29-F687-4f45-9708-019B960494DF}">
-                <a14:hiddenLine xmlns="" xmlns:a16="http://schemas.microsoft.com/office/drawing/2014/main" xmlns:p14="http://schemas.microsoft.com/office/powerpoint/2010/main" xmlns:a14="http://schemas.microsoft.com/office/drawing/2010/main" w="9525">
+                <a14:hiddenLine xmlns:a14="http://schemas.microsoft.com/office/drawing/2010/main" xmlns:p14="http://schemas.microsoft.com/office/powerpoint/2010/main" xmlns:a16="http://schemas.microsoft.com/office/drawing/2014/main" xmlns="" w="9525">
                   <a:solidFill>
                     <a:srgbClr val="000000"/>
                   </a:solidFill>
@@ -25134,7 +25134,7 @@
             </a:ln>
             <a:extLst>
               <a:ext uri="{91240B29-F687-4f45-9708-019B960494DF}">
-                <a14:hiddenLine xmlns="" xmlns:a16="http://schemas.microsoft.com/office/drawing/2014/main" xmlns:p14="http://schemas.microsoft.com/office/powerpoint/2010/main" xmlns:a14="http://schemas.microsoft.com/office/drawing/2010/main" w="9525">
+                <a14:hiddenLine xmlns:a14="http://schemas.microsoft.com/office/drawing/2010/main" xmlns:p14="http://schemas.microsoft.com/office/powerpoint/2010/main" xmlns:a16="http://schemas.microsoft.com/office/drawing/2014/main" xmlns="" w="9525">
                   <a:solidFill>
                     <a:srgbClr val="000000"/>
                   </a:solidFill>
@@ -25214,7 +25214,7 @@
             </a:ln>
             <a:extLst>
               <a:ext uri="{91240B29-F687-4f45-9708-019B960494DF}">
-                <a14:hiddenLine xmlns="" xmlns:a16="http://schemas.microsoft.com/office/drawing/2014/main" xmlns:p14="http://schemas.microsoft.com/office/powerpoint/2010/main" xmlns:a14="http://schemas.microsoft.com/office/drawing/2010/main" w="9525">
+                <a14:hiddenLine xmlns:a14="http://schemas.microsoft.com/office/drawing/2010/main" xmlns:p14="http://schemas.microsoft.com/office/powerpoint/2010/main" xmlns:a16="http://schemas.microsoft.com/office/drawing/2014/main" xmlns="" w="9525">
                   <a:solidFill>
                     <a:srgbClr val="000000"/>
                   </a:solidFill>
@@ -25291,7 +25291,7 @@
             </a:ln>
             <a:extLst>
               <a:ext uri="{91240B29-F687-4f45-9708-019B960494DF}">
-                <a14:hiddenLine xmlns="" xmlns:a16="http://schemas.microsoft.com/office/drawing/2014/main" xmlns:p14="http://schemas.microsoft.com/office/powerpoint/2010/main" xmlns:a14="http://schemas.microsoft.com/office/drawing/2010/main" w="9525">
+                <a14:hiddenLine xmlns:a14="http://schemas.microsoft.com/office/drawing/2010/main" xmlns:p14="http://schemas.microsoft.com/office/powerpoint/2010/main" xmlns:a16="http://schemas.microsoft.com/office/drawing/2014/main" xmlns="" w="9525">
                   <a:solidFill>
                     <a:srgbClr val="000000"/>
                   </a:solidFill>
@@ -25396,7 +25396,7 @@
             </a:ln>
             <a:extLst>
               <a:ext uri="{91240B29-F687-4f45-9708-019B960494DF}">
-                <a14:hiddenLine xmlns="" xmlns:a16="http://schemas.microsoft.com/office/drawing/2014/main" xmlns:p14="http://schemas.microsoft.com/office/powerpoint/2010/main" xmlns:a14="http://schemas.microsoft.com/office/drawing/2010/main" w="9525">
+                <a14:hiddenLine xmlns:a14="http://schemas.microsoft.com/office/drawing/2010/main" xmlns:p14="http://schemas.microsoft.com/office/powerpoint/2010/main" xmlns:a16="http://schemas.microsoft.com/office/drawing/2014/main" xmlns="" w="9525">
                   <a:solidFill>
                     <a:srgbClr val="000000"/>
                   </a:solidFill>
@@ -25501,7 +25501,7 @@
             </a:ln>
             <a:extLst>
               <a:ext uri="{91240B29-F687-4f45-9708-019B960494DF}">
-                <a14:hiddenLine xmlns="" xmlns:a16="http://schemas.microsoft.com/office/drawing/2014/main" xmlns:p14="http://schemas.microsoft.com/office/powerpoint/2010/main" xmlns:a14="http://schemas.microsoft.com/office/drawing/2010/main" w="9525">
+                <a14:hiddenLine xmlns:a14="http://schemas.microsoft.com/office/drawing/2010/main" xmlns:p14="http://schemas.microsoft.com/office/powerpoint/2010/main" xmlns:a16="http://schemas.microsoft.com/office/drawing/2014/main" xmlns="" w="9525">
                   <a:solidFill>
                     <a:srgbClr val="000000"/>
                   </a:solidFill>
@@ -25581,7 +25581,7 @@
             </a:ln>
             <a:extLst>
               <a:ext uri="{91240B29-F687-4f45-9708-019B960494DF}">
-                <a14:hiddenLine xmlns="" xmlns:a16="http://schemas.microsoft.com/office/drawing/2014/main" xmlns:p14="http://schemas.microsoft.com/office/powerpoint/2010/main" xmlns:a14="http://schemas.microsoft.com/office/drawing/2010/main" w="9525">
+                <a14:hiddenLine xmlns:a14="http://schemas.microsoft.com/office/drawing/2010/main" xmlns:p14="http://schemas.microsoft.com/office/powerpoint/2010/main" xmlns:a16="http://schemas.microsoft.com/office/drawing/2014/main" xmlns="" w="9525">
                   <a:solidFill>
                     <a:srgbClr val="000000"/>
                   </a:solidFill>
@@ -25716,7 +25716,7 @@
             </a:ln>
             <a:extLst>
               <a:ext uri="{91240B29-F687-4f45-9708-019B960494DF}">
-                <a14:hiddenLine xmlns="" xmlns:a16="http://schemas.microsoft.com/office/drawing/2014/main" xmlns:p14="http://schemas.microsoft.com/office/powerpoint/2010/main" xmlns:a14="http://schemas.microsoft.com/office/drawing/2010/main" w="9525">
+                <a14:hiddenLine xmlns:a14="http://schemas.microsoft.com/office/drawing/2010/main" xmlns:p14="http://schemas.microsoft.com/office/powerpoint/2010/main" xmlns:a16="http://schemas.microsoft.com/office/drawing/2014/main" xmlns="" w="9525">
                   <a:solidFill>
                     <a:srgbClr val="000000"/>
                   </a:solidFill>
@@ -26284,7 +26284,7 @@
           <a:noFill/>
           <a:extLst>
             <a:ext uri="{909E8E84-426E-40dd-AFC4-6F175D3DCCD1}">
-              <a14:hiddenFill xmlns:a14="http://schemas.microsoft.com/office/drawing/2010/main" xmlns:p14="http://schemas.microsoft.com/office/powerpoint/2010/main" xmlns:a16="http://schemas.microsoft.com/office/drawing/2014/main" xmlns="">
+              <a14:hiddenFill xmlns="" xmlns:a16="http://schemas.microsoft.com/office/drawing/2014/main" xmlns:p14="http://schemas.microsoft.com/office/powerpoint/2010/main" xmlns:a14="http://schemas.microsoft.com/office/drawing/2010/main">
                 <a:solidFill>
                   <a:srgbClr val="FFFFFF"/>
                 </a:solidFill>
@@ -26412,7 +26412,7 @@
             </a:ln>
             <a:extLst>
               <a:ext uri="{91240B29-F687-4f45-9708-019B960494DF}">
-                <a14:hiddenLine xmlns:a14="http://schemas.microsoft.com/office/drawing/2010/main" xmlns:p14="http://schemas.microsoft.com/office/powerpoint/2010/main" xmlns:a16="http://schemas.microsoft.com/office/drawing/2014/main" xmlns="" w="9525">
+                <a14:hiddenLine xmlns="" xmlns:a16="http://schemas.microsoft.com/office/drawing/2014/main" xmlns:p14="http://schemas.microsoft.com/office/powerpoint/2010/main" xmlns:a14="http://schemas.microsoft.com/office/drawing/2010/main" w="9525">
                   <a:solidFill>
                     <a:srgbClr val="000000"/>
                   </a:solidFill>
@@ -26517,7 +26517,7 @@
             </a:ln>
             <a:extLst>
               <a:ext uri="{91240B29-F687-4f45-9708-019B960494DF}">
-                <a14:hiddenLine xmlns:a14="http://schemas.microsoft.com/office/drawing/2010/main" xmlns:p14="http://schemas.microsoft.com/office/powerpoint/2010/main" xmlns:a16="http://schemas.microsoft.com/office/drawing/2014/main" xmlns="" w="9525">
+                <a14:hiddenLine xmlns="" xmlns:a16="http://schemas.microsoft.com/office/drawing/2014/main" xmlns:p14="http://schemas.microsoft.com/office/powerpoint/2010/main" xmlns:a14="http://schemas.microsoft.com/office/drawing/2010/main" w="9525">
                   <a:solidFill>
                     <a:srgbClr val="000000"/>
                   </a:solidFill>
@@ -26622,7 +26622,7 @@
             </a:ln>
             <a:extLst>
               <a:ext uri="{91240B29-F687-4f45-9708-019B960494DF}">
-                <a14:hiddenLine xmlns:a14="http://schemas.microsoft.com/office/drawing/2010/main" xmlns:p14="http://schemas.microsoft.com/office/powerpoint/2010/main" xmlns:a16="http://schemas.microsoft.com/office/drawing/2014/main" xmlns="" w="9525">
+                <a14:hiddenLine xmlns="" xmlns:a16="http://schemas.microsoft.com/office/drawing/2014/main" xmlns:p14="http://schemas.microsoft.com/office/powerpoint/2010/main" xmlns:a14="http://schemas.microsoft.com/office/drawing/2010/main" w="9525">
                   <a:solidFill>
                     <a:srgbClr val="000000"/>
                   </a:solidFill>
@@ -26699,7 +26699,7 @@
             </a:ln>
             <a:extLst>
               <a:ext uri="{91240B29-F687-4f45-9708-019B960494DF}">
-                <a14:hiddenLine xmlns:a14="http://schemas.microsoft.com/office/drawing/2010/main" xmlns:p14="http://schemas.microsoft.com/office/powerpoint/2010/main" xmlns:a16="http://schemas.microsoft.com/office/drawing/2014/main" xmlns="" w="9525">
+                <a14:hiddenLine xmlns="" xmlns:a16="http://schemas.microsoft.com/office/drawing/2014/main" xmlns:p14="http://schemas.microsoft.com/office/powerpoint/2010/main" xmlns:a14="http://schemas.microsoft.com/office/drawing/2010/main" w="9525">
                   <a:solidFill>
                     <a:srgbClr val="000000"/>
                   </a:solidFill>
@@ -26804,7 +26804,7 @@
             </a:ln>
             <a:extLst>
               <a:ext uri="{91240B29-F687-4f45-9708-019B960494DF}">
-                <a14:hiddenLine xmlns:a14="http://schemas.microsoft.com/office/drawing/2010/main" xmlns:p14="http://schemas.microsoft.com/office/powerpoint/2010/main" xmlns:a16="http://schemas.microsoft.com/office/drawing/2014/main" xmlns="" w="9525">
+                <a14:hiddenLine xmlns="" xmlns:a16="http://schemas.microsoft.com/office/drawing/2014/main" xmlns:p14="http://schemas.microsoft.com/office/powerpoint/2010/main" xmlns:a14="http://schemas.microsoft.com/office/drawing/2010/main" w="9525">
                   <a:solidFill>
                     <a:srgbClr val="000000"/>
                   </a:solidFill>
@@ -26881,7 +26881,7 @@
             </a:ln>
             <a:extLst>
               <a:ext uri="{91240B29-F687-4f45-9708-019B960494DF}">
-                <a14:hiddenLine xmlns:a14="http://schemas.microsoft.com/office/drawing/2010/main" xmlns:p14="http://schemas.microsoft.com/office/powerpoint/2010/main" xmlns:a16="http://schemas.microsoft.com/office/drawing/2014/main" xmlns="" w="9525">
+                <a14:hiddenLine xmlns="" xmlns:a16="http://schemas.microsoft.com/office/drawing/2014/main" xmlns:p14="http://schemas.microsoft.com/office/powerpoint/2010/main" xmlns:a14="http://schemas.microsoft.com/office/drawing/2010/main" w="9525">
                   <a:solidFill>
                     <a:srgbClr val="000000"/>
                   </a:solidFill>
@@ -26958,7 +26958,7 @@
             </a:ln>
             <a:extLst>
               <a:ext uri="{91240B29-F687-4f45-9708-019B960494DF}">
-                <a14:hiddenLine xmlns:a14="http://schemas.microsoft.com/office/drawing/2010/main" xmlns:p14="http://schemas.microsoft.com/office/powerpoint/2010/main" xmlns:a16="http://schemas.microsoft.com/office/drawing/2014/main" xmlns="" w="9525">
+                <a14:hiddenLine xmlns="" xmlns:a16="http://schemas.microsoft.com/office/drawing/2014/main" xmlns:p14="http://schemas.microsoft.com/office/powerpoint/2010/main" xmlns:a14="http://schemas.microsoft.com/office/drawing/2010/main" w="9525">
                   <a:solidFill>
                     <a:srgbClr val="000000"/>
                   </a:solidFill>
@@ -27063,7 +27063,7 @@
             </a:ln>
             <a:extLst>
               <a:ext uri="{91240B29-F687-4f45-9708-019B960494DF}">
-                <a14:hiddenLine xmlns:a14="http://schemas.microsoft.com/office/drawing/2010/main" xmlns:p14="http://schemas.microsoft.com/office/powerpoint/2010/main" xmlns:a16="http://schemas.microsoft.com/office/drawing/2014/main" xmlns="" w="9525">
+                <a14:hiddenLine xmlns="" xmlns:a16="http://schemas.microsoft.com/office/drawing/2014/main" xmlns:p14="http://schemas.microsoft.com/office/powerpoint/2010/main" xmlns:a14="http://schemas.microsoft.com/office/drawing/2010/main" w="9525">
                   <a:solidFill>
                     <a:srgbClr val="000000"/>
                   </a:solidFill>
@@ -27168,7 +27168,7 @@
             </a:ln>
             <a:extLst>
               <a:ext uri="{91240B29-F687-4f45-9708-019B960494DF}">
-                <a14:hiddenLine xmlns:a14="http://schemas.microsoft.com/office/drawing/2010/main" xmlns:p14="http://schemas.microsoft.com/office/powerpoint/2010/main" xmlns:a16="http://schemas.microsoft.com/office/drawing/2014/main" xmlns="" w="9525">
+                <a14:hiddenLine xmlns="" xmlns:a16="http://schemas.microsoft.com/office/drawing/2014/main" xmlns:p14="http://schemas.microsoft.com/office/powerpoint/2010/main" xmlns:a14="http://schemas.microsoft.com/office/drawing/2010/main" w="9525">
                   <a:solidFill>
                     <a:srgbClr val="000000"/>
                   </a:solidFill>
@@ -27245,7 +27245,7 @@
             </a:ln>
             <a:extLst>
               <a:ext uri="{91240B29-F687-4f45-9708-019B960494DF}">
-                <a14:hiddenLine xmlns:a14="http://schemas.microsoft.com/office/drawing/2010/main" xmlns:p14="http://schemas.microsoft.com/office/powerpoint/2010/main" xmlns:a16="http://schemas.microsoft.com/office/drawing/2014/main" xmlns="" w="9525">
+                <a14:hiddenLine xmlns="" xmlns:a16="http://schemas.microsoft.com/office/drawing/2014/main" xmlns:p14="http://schemas.microsoft.com/office/powerpoint/2010/main" xmlns:a14="http://schemas.microsoft.com/office/drawing/2010/main" w="9525">
                   <a:solidFill>
                     <a:srgbClr val="000000"/>
                   </a:solidFill>
@@ -27370,7 +27370,7 @@
             </a:ln>
             <a:extLst>
               <a:ext uri="{91240B29-F687-4f45-9708-019B960494DF}">
-                <a14:hiddenLine xmlns:a14="http://schemas.microsoft.com/office/drawing/2010/main" xmlns:p14="http://schemas.microsoft.com/office/powerpoint/2010/main" xmlns:a16="http://schemas.microsoft.com/office/drawing/2014/main" xmlns="" w="9525">
+                <a14:hiddenLine xmlns="" xmlns:a16="http://schemas.microsoft.com/office/drawing/2014/main" xmlns:p14="http://schemas.microsoft.com/office/powerpoint/2010/main" xmlns:a14="http://schemas.microsoft.com/office/drawing/2010/main" w="9525">
                   <a:solidFill>
                     <a:srgbClr val="000000"/>
                   </a:solidFill>
@@ -27484,7 +27484,7 @@
             </a:ln>
             <a:extLst>
               <a:ext uri="{91240B29-F687-4f45-9708-019B960494DF}">
-                <a14:hiddenLine xmlns:a14="http://schemas.microsoft.com/office/drawing/2010/main" xmlns:p14="http://schemas.microsoft.com/office/powerpoint/2010/main" xmlns:a16="http://schemas.microsoft.com/office/drawing/2014/main" xmlns="" w="9525">
+                <a14:hiddenLine xmlns="" xmlns:a16="http://schemas.microsoft.com/office/drawing/2014/main" xmlns:p14="http://schemas.microsoft.com/office/powerpoint/2010/main" xmlns:a14="http://schemas.microsoft.com/office/drawing/2010/main" w="9525">
                   <a:solidFill>
                     <a:srgbClr val="000000"/>
                   </a:solidFill>
@@ -27561,7 +27561,7 @@
             </a:ln>
             <a:extLst>
               <a:ext uri="{91240B29-F687-4f45-9708-019B960494DF}">
-                <a14:hiddenLine xmlns:a14="http://schemas.microsoft.com/office/drawing/2010/main" xmlns:p14="http://schemas.microsoft.com/office/powerpoint/2010/main" xmlns:a16="http://schemas.microsoft.com/office/drawing/2014/main" xmlns="" w="9525">
+                <a14:hiddenLine xmlns="" xmlns:a16="http://schemas.microsoft.com/office/drawing/2014/main" xmlns:p14="http://schemas.microsoft.com/office/powerpoint/2010/main" xmlns:a14="http://schemas.microsoft.com/office/drawing/2010/main" w="9525">
                   <a:solidFill>
                     <a:srgbClr val="000000"/>
                   </a:solidFill>
@@ -27638,7 +27638,7 @@
             </a:ln>
             <a:extLst>
               <a:ext uri="{91240B29-F687-4f45-9708-019B960494DF}">
-                <a14:hiddenLine xmlns:a14="http://schemas.microsoft.com/office/drawing/2010/main" xmlns:p14="http://schemas.microsoft.com/office/powerpoint/2010/main" xmlns:a16="http://schemas.microsoft.com/office/drawing/2014/main" xmlns="" w="9525">
+                <a14:hiddenLine xmlns="" xmlns:a16="http://schemas.microsoft.com/office/drawing/2014/main" xmlns:p14="http://schemas.microsoft.com/office/powerpoint/2010/main" xmlns:a14="http://schemas.microsoft.com/office/drawing/2010/main" w="9525">
                   <a:solidFill>
                     <a:srgbClr val="000000"/>
                   </a:solidFill>
@@ -27743,7 +27743,7 @@
             </a:ln>
             <a:extLst>
               <a:ext uri="{91240B29-F687-4f45-9708-019B960494DF}">
-                <a14:hiddenLine xmlns:a14="http://schemas.microsoft.com/office/drawing/2010/main" xmlns:p14="http://schemas.microsoft.com/office/powerpoint/2010/main" xmlns:a16="http://schemas.microsoft.com/office/drawing/2014/main" xmlns="" w="9525">
+                <a14:hiddenLine xmlns="" xmlns:a16="http://schemas.microsoft.com/office/drawing/2014/main" xmlns:p14="http://schemas.microsoft.com/office/powerpoint/2010/main" xmlns:a14="http://schemas.microsoft.com/office/drawing/2010/main" w="9525">
                   <a:solidFill>
                     <a:srgbClr val="000000"/>
                   </a:solidFill>
@@ -27792,7 +27792,7 @@
             </a:ln>
             <a:extLst>
               <a:ext uri="{91240B29-F687-4f45-9708-019B960494DF}">
-                <a14:hiddenLine xmlns:a14="http://schemas.microsoft.com/office/drawing/2010/main" xmlns:p14="http://schemas.microsoft.com/office/powerpoint/2010/main" xmlns:a16="http://schemas.microsoft.com/office/drawing/2014/main" xmlns="" w="9525">
+                <a14:hiddenLine xmlns="" xmlns:a16="http://schemas.microsoft.com/office/drawing/2014/main" xmlns:p14="http://schemas.microsoft.com/office/powerpoint/2010/main" xmlns:a14="http://schemas.microsoft.com/office/drawing/2010/main" w="9525">
                   <a:solidFill>
                     <a:srgbClr val="000000"/>
                   </a:solidFill>
@@ -27872,7 +27872,7 @@
             </a:ln>
             <a:extLst>
               <a:ext uri="{91240B29-F687-4f45-9708-019B960494DF}">
-                <a14:hiddenLine xmlns:a14="http://schemas.microsoft.com/office/drawing/2010/main" xmlns:p14="http://schemas.microsoft.com/office/powerpoint/2010/main" xmlns:a16="http://schemas.microsoft.com/office/drawing/2014/main" xmlns="" w="9525">
+                <a14:hiddenLine xmlns="" xmlns:a16="http://schemas.microsoft.com/office/drawing/2014/main" xmlns:p14="http://schemas.microsoft.com/office/powerpoint/2010/main" xmlns:a14="http://schemas.microsoft.com/office/drawing/2010/main" w="9525">
                   <a:solidFill>
                     <a:srgbClr val="000000"/>
                   </a:solidFill>
@@ -27977,7 +27977,7 @@
             </a:ln>
             <a:extLst>
               <a:ext uri="{91240B29-F687-4f45-9708-019B960494DF}">
-                <a14:hiddenLine xmlns:a14="http://schemas.microsoft.com/office/drawing/2010/main" xmlns:p14="http://schemas.microsoft.com/office/powerpoint/2010/main" xmlns:a16="http://schemas.microsoft.com/office/drawing/2014/main" xmlns="" w="9525">
+                <a14:hiddenLine xmlns="" xmlns:a16="http://schemas.microsoft.com/office/drawing/2014/main" xmlns:p14="http://schemas.microsoft.com/office/powerpoint/2010/main" xmlns:a14="http://schemas.microsoft.com/office/drawing/2010/main" w="9525">
                   <a:solidFill>
                     <a:srgbClr val="000000"/>
                   </a:solidFill>
@@ -28054,7 +28054,7 @@
             </a:ln>
             <a:extLst>
               <a:ext uri="{91240B29-F687-4f45-9708-019B960494DF}">
-                <a14:hiddenLine xmlns:a14="http://schemas.microsoft.com/office/drawing/2010/main" xmlns:p14="http://schemas.microsoft.com/office/powerpoint/2010/main" xmlns:a16="http://schemas.microsoft.com/office/drawing/2014/main" xmlns="" w="9525">
+                <a14:hiddenLine xmlns="" xmlns:a16="http://schemas.microsoft.com/office/drawing/2014/main" xmlns:p14="http://schemas.microsoft.com/office/powerpoint/2010/main" xmlns:a14="http://schemas.microsoft.com/office/drawing/2010/main" w="9525">
                   <a:solidFill>
                     <a:srgbClr val="000000"/>
                   </a:solidFill>
@@ -28159,7 +28159,7 @@
             </a:ln>
             <a:extLst>
               <a:ext uri="{91240B29-F687-4f45-9708-019B960494DF}">
-                <a14:hiddenLine xmlns:a14="http://schemas.microsoft.com/office/drawing/2010/main" xmlns:p14="http://schemas.microsoft.com/office/powerpoint/2010/main" xmlns:a16="http://schemas.microsoft.com/office/drawing/2014/main" xmlns="" w="9525">
+                <a14:hiddenLine xmlns="" xmlns:a16="http://schemas.microsoft.com/office/drawing/2014/main" xmlns:p14="http://schemas.microsoft.com/office/powerpoint/2010/main" xmlns:a14="http://schemas.microsoft.com/office/drawing/2010/main" w="9525">
                   <a:solidFill>
                     <a:srgbClr val="000000"/>
                   </a:solidFill>
@@ -28239,7 +28239,7 @@
             </a:ln>
             <a:extLst>
               <a:ext uri="{91240B29-F687-4f45-9708-019B960494DF}">
-                <a14:hiddenLine xmlns:a14="http://schemas.microsoft.com/office/drawing/2010/main" xmlns:p14="http://schemas.microsoft.com/office/powerpoint/2010/main" xmlns:a16="http://schemas.microsoft.com/office/drawing/2014/main" xmlns="" w="9525">
+                <a14:hiddenLine xmlns="" xmlns:a16="http://schemas.microsoft.com/office/drawing/2014/main" xmlns:p14="http://schemas.microsoft.com/office/powerpoint/2010/main" xmlns:a14="http://schemas.microsoft.com/office/drawing/2010/main" w="9525">
                   <a:solidFill>
                     <a:srgbClr val="000000"/>
                   </a:solidFill>
@@ -28316,7 +28316,7 @@
             </a:ln>
             <a:extLst>
               <a:ext uri="{91240B29-F687-4f45-9708-019B960494DF}">
-                <a14:hiddenLine xmlns:a14="http://schemas.microsoft.com/office/drawing/2010/main" xmlns:p14="http://schemas.microsoft.com/office/powerpoint/2010/main" xmlns:a16="http://schemas.microsoft.com/office/drawing/2014/main" xmlns="" w="9525">
+                <a14:hiddenLine xmlns="" xmlns:a16="http://schemas.microsoft.com/office/drawing/2014/main" xmlns:p14="http://schemas.microsoft.com/office/powerpoint/2010/main" xmlns:a14="http://schemas.microsoft.com/office/drawing/2010/main" w="9525">
                   <a:solidFill>
                     <a:srgbClr val="000000"/>
                   </a:solidFill>
@@ -28421,7 +28421,7 @@
             </a:ln>
             <a:extLst>
               <a:ext uri="{91240B29-F687-4f45-9708-019B960494DF}">
-                <a14:hiddenLine xmlns:a14="http://schemas.microsoft.com/office/drawing/2010/main" xmlns:p14="http://schemas.microsoft.com/office/powerpoint/2010/main" xmlns:a16="http://schemas.microsoft.com/office/drawing/2014/main" xmlns="" w="9525">
+                <a14:hiddenLine xmlns="" xmlns:a16="http://schemas.microsoft.com/office/drawing/2014/main" xmlns:p14="http://schemas.microsoft.com/office/powerpoint/2010/main" xmlns:a14="http://schemas.microsoft.com/office/drawing/2010/main" w="9525">
                   <a:solidFill>
                     <a:srgbClr val="000000"/>
                   </a:solidFill>
@@ -28526,7 +28526,7 @@
             </a:ln>
             <a:extLst>
               <a:ext uri="{91240B29-F687-4f45-9708-019B960494DF}">
-                <a14:hiddenLine xmlns:a14="http://schemas.microsoft.com/office/drawing/2010/main" xmlns:p14="http://schemas.microsoft.com/office/powerpoint/2010/main" xmlns:a16="http://schemas.microsoft.com/office/drawing/2014/main" xmlns="" w="9525">
+                <a14:hiddenLine xmlns="" xmlns:a16="http://schemas.microsoft.com/office/drawing/2014/main" xmlns:p14="http://schemas.microsoft.com/office/powerpoint/2010/main" xmlns:a14="http://schemas.microsoft.com/office/drawing/2010/main" w="9525">
                   <a:solidFill>
                     <a:srgbClr val="000000"/>
                   </a:solidFill>
@@ -28606,7 +28606,7 @@
             </a:ln>
             <a:extLst>
               <a:ext uri="{91240B29-F687-4f45-9708-019B960494DF}">
-                <a14:hiddenLine xmlns:a14="http://schemas.microsoft.com/office/drawing/2010/main" xmlns:p14="http://schemas.microsoft.com/office/powerpoint/2010/main" xmlns:a16="http://schemas.microsoft.com/office/drawing/2014/main" xmlns="" w="9525">
+                <a14:hiddenLine xmlns="" xmlns:a16="http://schemas.microsoft.com/office/drawing/2014/main" xmlns:p14="http://schemas.microsoft.com/office/powerpoint/2010/main" xmlns:a14="http://schemas.microsoft.com/office/drawing/2010/main" w="9525">
                   <a:solidFill>
                     <a:srgbClr val="000000"/>
                   </a:solidFill>
@@ -28741,7 +28741,7 @@
             </a:ln>
             <a:extLst>
               <a:ext uri="{91240B29-F687-4f45-9708-019B960494DF}">
-                <a14:hiddenLine xmlns:a14="http://schemas.microsoft.com/office/drawing/2010/main" xmlns:p14="http://schemas.microsoft.com/office/powerpoint/2010/main" xmlns:a16="http://schemas.microsoft.com/office/drawing/2014/main" xmlns="" w="9525">
+                <a14:hiddenLine xmlns="" xmlns:a16="http://schemas.microsoft.com/office/drawing/2014/main" xmlns:p14="http://schemas.microsoft.com/office/powerpoint/2010/main" xmlns:a14="http://schemas.microsoft.com/office/drawing/2010/main" w="9525">
                   <a:solidFill>
                     <a:srgbClr val="000000"/>
                   </a:solidFill>
@@ -29585,7 +29585,7 @@
           <a:noFill/>
           <a:extLst>
             <a:ext uri="{909E8E84-426E-40dd-AFC4-6F175D3DCCD1}">
-              <a14:hiddenFill xmlns:a14="http://schemas.microsoft.com/office/drawing/2010/main" xmlns:p14="http://schemas.microsoft.com/office/powerpoint/2010/main" xmlns:a16="http://schemas.microsoft.com/office/drawing/2014/main" xmlns="">
+              <a14:hiddenFill xmlns="" xmlns:a16="http://schemas.microsoft.com/office/drawing/2014/main" xmlns:p14="http://schemas.microsoft.com/office/powerpoint/2010/main" xmlns:a14="http://schemas.microsoft.com/office/drawing/2010/main">
                 <a:solidFill>
                   <a:srgbClr val="FFFFFF"/>
                 </a:solidFill>
@@ -29718,7 +29718,7 @@
             </a:ln>
             <a:extLst>
               <a:ext uri="{91240B29-F687-4f45-9708-019B960494DF}">
-                <a14:hiddenLine xmlns:a14="http://schemas.microsoft.com/office/drawing/2010/main" xmlns:p14="http://schemas.microsoft.com/office/powerpoint/2010/main" xmlns:a16="http://schemas.microsoft.com/office/drawing/2014/main" xmlns="" w="9525">
+                <a14:hiddenLine xmlns="" xmlns:a16="http://schemas.microsoft.com/office/drawing/2014/main" xmlns:p14="http://schemas.microsoft.com/office/powerpoint/2010/main" xmlns:a14="http://schemas.microsoft.com/office/drawing/2010/main" w="9525">
                   <a:solidFill>
                     <a:srgbClr val="000000"/>
                   </a:solidFill>
@@ -29823,7 +29823,7 @@
             </a:ln>
             <a:extLst>
               <a:ext uri="{91240B29-F687-4f45-9708-019B960494DF}">
-                <a14:hiddenLine xmlns:a14="http://schemas.microsoft.com/office/drawing/2010/main" xmlns:p14="http://schemas.microsoft.com/office/powerpoint/2010/main" xmlns:a16="http://schemas.microsoft.com/office/drawing/2014/main" xmlns="" w="9525">
+                <a14:hiddenLine xmlns="" xmlns:a16="http://schemas.microsoft.com/office/drawing/2014/main" xmlns:p14="http://schemas.microsoft.com/office/powerpoint/2010/main" xmlns:a14="http://schemas.microsoft.com/office/drawing/2010/main" w="9525">
                   <a:solidFill>
                     <a:srgbClr val="000000"/>
                   </a:solidFill>
@@ -29928,7 +29928,7 @@
             </a:ln>
             <a:extLst>
               <a:ext uri="{91240B29-F687-4f45-9708-019B960494DF}">
-                <a14:hiddenLine xmlns:a14="http://schemas.microsoft.com/office/drawing/2010/main" xmlns:p14="http://schemas.microsoft.com/office/powerpoint/2010/main" xmlns:a16="http://schemas.microsoft.com/office/drawing/2014/main" xmlns="" w="9525">
+                <a14:hiddenLine xmlns="" xmlns:a16="http://schemas.microsoft.com/office/drawing/2014/main" xmlns:p14="http://schemas.microsoft.com/office/powerpoint/2010/main" xmlns:a14="http://schemas.microsoft.com/office/drawing/2010/main" w="9525">
                   <a:solidFill>
                     <a:srgbClr val="000000"/>
                   </a:solidFill>
@@ -30005,7 +30005,7 @@
             </a:ln>
             <a:extLst>
               <a:ext uri="{91240B29-F687-4f45-9708-019B960494DF}">
-                <a14:hiddenLine xmlns:a14="http://schemas.microsoft.com/office/drawing/2010/main" xmlns:p14="http://schemas.microsoft.com/office/powerpoint/2010/main" xmlns:a16="http://schemas.microsoft.com/office/drawing/2014/main" xmlns="" w="9525">
+                <a14:hiddenLine xmlns="" xmlns:a16="http://schemas.microsoft.com/office/drawing/2014/main" xmlns:p14="http://schemas.microsoft.com/office/powerpoint/2010/main" xmlns:a14="http://schemas.microsoft.com/office/drawing/2010/main" w="9525">
                   <a:solidFill>
                     <a:srgbClr val="000000"/>
                   </a:solidFill>
@@ -30110,7 +30110,7 @@
             </a:ln>
             <a:extLst>
               <a:ext uri="{91240B29-F687-4f45-9708-019B960494DF}">
-                <a14:hiddenLine xmlns:a14="http://schemas.microsoft.com/office/drawing/2010/main" xmlns:p14="http://schemas.microsoft.com/office/powerpoint/2010/main" xmlns:a16="http://schemas.microsoft.com/office/drawing/2014/main" xmlns="" w="9525">
+                <a14:hiddenLine xmlns="" xmlns:a16="http://schemas.microsoft.com/office/drawing/2014/main" xmlns:p14="http://schemas.microsoft.com/office/powerpoint/2010/main" xmlns:a14="http://schemas.microsoft.com/office/drawing/2010/main" w="9525">
                   <a:solidFill>
                     <a:srgbClr val="000000"/>
                   </a:solidFill>
@@ -30187,7 +30187,7 @@
             </a:ln>
             <a:extLst>
               <a:ext uri="{91240B29-F687-4f45-9708-019B960494DF}">
-                <a14:hiddenLine xmlns:a14="http://schemas.microsoft.com/office/drawing/2010/main" xmlns:p14="http://schemas.microsoft.com/office/powerpoint/2010/main" xmlns:a16="http://schemas.microsoft.com/office/drawing/2014/main" xmlns="" w="9525">
+                <a14:hiddenLine xmlns="" xmlns:a16="http://schemas.microsoft.com/office/drawing/2014/main" xmlns:p14="http://schemas.microsoft.com/office/powerpoint/2010/main" xmlns:a14="http://schemas.microsoft.com/office/drawing/2010/main" w="9525">
                   <a:solidFill>
                     <a:srgbClr val="000000"/>
                   </a:solidFill>
@@ -30264,7 +30264,7 @@
             </a:ln>
             <a:extLst>
               <a:ext uri="{91240B29-F687-4f45-9708-019B960494DF}">
-                <a14:hiddenLine xmlns:a14="http://schemas.microsoft.com/office/drawing/2010/main" xmlns:p14="http://schemas.microsoft.com/office/powerpoint/2010/main" xmlns:a16="http://schemas.microsoft.com/office/drawing/2014/main" xmlns="" w="9525">
+                <a14:hiddenLine xmlns="" xmlns:a16="http://schemas.microsoft.com/office/drawing/2014/main" xmlns:p14="http://schemas.microsoft.com/office/powerpoint/2010/main" xmlns:a14="http://schemas.microsoft.com/office/drawing/2010/main" w="9525">
                   <a:solidFill>
                     <a:srgbClr val="000000"/>
                   </a:solidFill>
@@ -30369,7 +30369,7 @@
             </a:ln>
             <a:extLst>
               <a:ext uri="{91240B29-F687-4f45-9708-019B960494DF}">
-                <a14:hiddenLine xmlns:a14="http://schemas.microsoft.com/office/drawing/2010/main" xmlns:p14="http://schemas.microsoft.com/office/powerpoint/2010/main" xmlns:a16="http://schemas.microsoft.com/office/drawing/2014/main" xmlns="" w="9525">
+                <a14:hiddenLine xmlns="" xmlns:a16="http://schemas.microsoft.com/office/drawing/2014/main" xmlns:p14="http://schemas.microsoft.com/office/powerpoint/2010/main" xmlns:a14="http://schemas.microsoft.com/office/drawing/2010/main" w="9525">
                   <a:solidFill>
                     <a:srgbClr val="000000"/>
                   </a:solidFill>
@@ -30474,7 +30474,7 @@
             </a:ln>
             <a:extLst>
               <a:ext uri="{91240B29-F687-4f45-9708-019B960494DF}">
-                <a14:hiddenLine xmlns:a14="http://schemas.microsoft.com/office/drawing/2010/main" xmlns:p14="http://schemas.microsoft.com/office/powerpoint/2010/main" xmlns:a16="http://schemas.microsoft.com/office/drawing/2014/main" xmlns="" w="9525">
+                <a14:hiddenLine xmlns="" xmlns:a16="http://schemas.microsoft.com/office/drawing/2014/main" xmlns:p14="http://schemas.microsoft.com/office/powerpoint/2010/main" xmlns:a14="http://schemas.microsoft.com/office/drawing/2010/main" w="9525">
                   <a:solidFill>
                     <a:srgbClr val="000000"/>
                   </a:solidFill>
@@ -30551,7 +30551,7 @@
             </a:ln>
             <a:extLst>
               <a:ext uri="{91240B29-F687-4f45-9708-019B960494DF}">
-                <a14:hiddenLine xmlns:a14="http://schemas.microsoft.com/office/drawing/2010/main" xmlns:p14="http://schemas.microsoft.com/office/powerpoint/2010/main" xmlns:a16="http://schemas.microsoft.com/office/drawing/2014/main" xmlns="" w="9525">
+                <a14:hiddenLine xmlns="" xmlns:a16="http://schemas.microsoft.com/office/drawing/2014/main" xmlns:p14="http://schemas.microsoft.com/office/powerpoint/2010/main" xmlns:a14="http://schemas.microsoft.com/office/drawing/2010/main" w="9525">
                   <a:solidFill>
                     <a:srgbClr val="000000"/>
                   </a:solidFill>
@@ -30676,7 +30676,7 @@
             </a:ln>
             <a:extLst>
               <a:ext uri="{91240B29-F687-4f45-9708-019B960494DF}">
-                <a14:hiddenLine xmlns:a14="http://schemas.microsoft.com/office/drawing/2010/main" xmlns:p14="http://schemas.microsoft.com/office/powerpoint/2010/main" xmlns:a16="http://schemas.microsoft.com/office/drawing/2014/main" xmlns="" w="9525">
+                <a14:hiddenLine xmlns="" xmlns:a16="http://schemas.microsoft.com/office/drawing/2014/main" xmlns:p14="http://schemas.microsoft.com/office/powerpoint/2010/main" xmlns:a14="http://schemas.microsoft.com/office/drawing/2010/main" w="9525">
                   <a:solidFill>
                     <a:srgbClr val="000000"/>
                   </a:solidFill>
@@ -30790,7 +30790,7 @@
             </a:ln>
             <a:extLst>
               <a:ext uri="{91240B29-F687-4f45-9708-019B960494DF}">
-                <a14:hiddenLine xmlns:a14="http://schemas.microsoft.com/office/drawing/2010/main" xmlns:p14="http://schemas.microsoft.com/office/powerpoint/2010/main" xmlns:a16="http://schemas.microsoft.com/office/drawing/2014/main" xmlns="" w="9525">
+                <a14:hiddenLine xmlns="" xmlns:a16="http://schemas.microsoft.com/office/drawing/2014/main" xmlns:p14="http://schemas.microsoft.com/office/powerpoint/2010/main" xmlns:a14="http://schemas.microsoft.com/office/drawing/2010/main" w="9525">
                   <a:solidFill>
                     <a:srgbClr val="000000"/>
                   </a:solidFill>
@@ -30867,7 +30867,7 @@
             </a:ln>
             <a:extLst>
               <a:ext uri="{91240B29-F687-4f45-9708-019B960494DF}">
-                <a14:hiddenLine xmlns:a14="http://schemas.microsoft.com/office/drawing/2010/main" xmlns:p14="http://schemas.microsoft.com/office/powerpoint/2010/main" xmlns:a16="http://schemas.microsoft.com/office/drawing/2014/main" xmlns="" w="9525">
+                <a14:hiddenLine xmlns="" xmlns:a16="http://schemas.microsoft.com/office/drawing/2014/main" xmlns:p14="http://schemas.microsoft.com/office/powerpoint/2010/main" xmlns:a14="http://schemas.microsoft.com/office/drawing/2010/main" w="9525">
                   <a:solidFill>
                     <a:srgbClr val="000000"/>
                   </a:solidFill>
@@ -30944,7 +30944,7 @@
             </a:ln>
             <a:extLst>
               <a:ext uri="{91240B29-F687-4f45-9708-019B960494DF}">
-                <a14:hiddenLine xmlns:a14="http://schemas.microsoft.com/office/drawing/2010/main" xmlns:p14="http://schemas.microsoft.com/office/powerpoint/2010/main" xmlns:a16="http://schemas.microsoft.com/office/drawing/2014/main" xmlns="" w="9525">
+                <a14:hiddenLine xmlns="" xmlns:a16="http://schemas.microsoft.com/office/drawing/2014/main" xmlns:p14="http://schemas.microsoft.com/office/powerpoint/2010/main" xmlns:a14="http://schemas.microsoft.com/office/drawing/2010/main" w="9525">
                   <a:solidFill>
                     <a:srgbClr val="000000"/>
                   </a:solidFill>
@@ -31049,7 +31049,7 @@
             </a:ln>
             <a:extLst>
               <a:ext uri="{91240B29-F687-4f45-9708-019B960494DF}">
-                <a14:hiddenLine xmlns:a14="http://schemas.microsoft.com/office/drawing/2010/main" xmlns:p14="http://schemas.microsoft.com/office/powerpoint/2010/main" xmlns:a16="http://schemas.microsoft.com/office/drawing/2014/main" xmlns="" w="9525">
+                <a14:hiddenLine xmlns="" xmlns:a16="http://schemas.microsoft.com/office/drawing/2014/main" xmlns:p14="http://schemas.microsoft.com/office/powerpoint/2010/main" xmlns:a14="http://schemas.microsoft.com/office/drawing/2010/main" w="9525">
                   <a:solidFill>
                     <a:srgbClr val="000000"/>
                   </a:solidFill>
@@ -31098,7 +31098,7 @@
             </a:ln>
             <a:extLst>
               <a:ext uri="{91240B29-F687-4f45-9708-019B960494DF}">
-                <a14:hiddenLine xmlns:a14="http://schemas.microsoft.com/office/drawing/2010/main" xmlns:p14="http://schemas.microsoft.com/office/powerpoint/2010/main" xmlns:a16="http://schemas.microsoft.com/office/drawing/2014/main" xmlns="" w="9525">
+                <a14:hiddenLine xmlns="" xmlns:a16="http://schemas.microsoft.com/office/drawing/2014/main" xmlns:p14="http://schemas.microsoft.com/office/powerpoint/2010/main" xmlns:a14="http://schemas.microsoft.com/office/drawing/2010/main" w="9525">
                   <a:solidFill>
                     <a:srgbClr val="000000"/>
                   </a:solidFill>
@@ -31178,7 +31178,7 @@
             </a:ln>
             <a:extLst>
               <a:ext uri="{91240B29-F687-4f45-9708-019B960494DF}">
-                <a14:hiddenLine xmlns:a14="http://schemas.microsoft.com/office/drawing/2010/main" xmlns:p14="http://schemas.microsoft.com/office/powerpoint/2010/main" xmlns:a16="http://schemas.microsoft.com/office/drawing/2014/main" xmlns="" w="9525">
+                <a14:hiddenLine xmlns="" xmlns:a16="http://schemas.microsoft.com/office/drawing/2014/main" xmlns:p14="http://schemas.microsoft.com/office/powerpoint/2010/main" xmlns:a14="http://schemas.microsoft.com/office/drawing/2010/main" w="9525">
                   <a:solidFill>
                     <a:srgbClr val="000000"/>
                   </a:solidFill>
@@ -31283,7 +31283,7 @@
             </a:ln>
             <a:extLst>
               <a:ext uri="{91240B29-F687-4f45-9708-019B960494DF}">
-                <a14:hiddenLine xmlns:a14="http://schemas.microsoft.com/office/drawing/2010/main" xmlns:p14="http://schemas.microsoft.com/office/powerpoint/2010/main" xmlns:a16="http://schemas.microsoft.com/office/drawing/2014/main" xmlns="" w="9525">
+                <a14:hiddenLine xmlns="" xmlns:a16="http://schemas.microsoft.com/office/drawing/2014/main" xmlns:p14="http://schemas.microsoft.com/office/powerpoint/2010/main" xmlns:a14="http://schemas.microsoft.com/office/drawing/2010/main" w="9525">
                   <a:solidFill>
                     <a:srgbClr val="000000"/>
                   </a:solidFill>
@@ -31360,7 +31360,7 @@
             </a:ln>
             <a:extLst>
               <a:ext uri="{91240B29-F687-4f45-9708-019B960494DF}">
-                <a14:hiddenLine xmlns:a14="http://schemas.microsoft.com/office/drawing/2010/main" xmlns:p14="http://schemas.microsoft.com/office/powerpoint/2010/main" xmlns:a16="http://schemas.microsoft.com/office/drawing/2014/main" xmlns="" w="9525">
+                <a14:hiddenLine xmlns="" xmlns:a16="http://schemas.microsoft.com/office/drawing/2014/main" xmlns:p14="http://schemas.microsoft.com/office/powerpoint/2010/main" xmlns:a14="http://schemas.microsoft.com/office/drawing/2010/main" w="9525">
                   <a:solidFill>
                     <a:srgbClr val="000000"/>
                   </a:solidFill>
@@ -31465,7 +31465,7 @@
             </a:ln>
             <a:extLst>
               <a:ext uri="{91240B29-F687-4f45-9708-019B960494DF}">
-                <a14:hiddenLine xmlns:a14="http://schemas.microsoft.com/office/drawing/2010/main" xmlns:p14="http://schemas.microsoft.com/office/powerpoint/2010/main" xmlns:a16="http://schemas.microsoft.com/office/drawing/2014/main" xmlns="" w="9525">
+                <a14:hiddenLine xmlns="" xmlns:a16="http://schemas.microsoft.com/office/drawing/2014/main" xmlns:p14="http://schemas.microsoft.com/office/powerpoint/2010/main" xmlns:a14="http://schemas.microsoft.com/office/drawing/2010/main" w="9525">
                   <a:solidFill>
                     <a:srgbClr val="000000"/>
                   </a:solidFill>
@@ -31545,7 +31545,7 @@
             </a:ln>
             <a:extLst>
               <a:ext uri="{91240B29-F687-4f45-9708-019B960494DF}">
-                <a14:hiddenLine xmlns:a14="http://schemas.microsoft.com/office/drawing/2010/main" xmlns:p14="http://schemas.microsoft.com/office/powerpoint/2010/main" xmlns:a16="http://schemas.microsoft.com/office/drawing/2014/main" xmlns="" w="9525">
+                <a14:hiddenLine xmlns="" xmlns:a16="http://schemas.microsoft.com/office/drawing/2014/main" xmlns:p14="http://schemas.microsoft.com/office/powerpoint/2010/main" xmlns:a14="http://schemas.microsoft.com/office/drawing/2010/main" w="9525">
                   <a:solidFill>
                     <a:srgbClr val="000000"/>
                   </a:solidFill>
@@ -31622,7 +31622,7 @@
             </a:ln>
             <a:extLst>
               <a:ext uri="{91240B29-F687-4f45-9708-019B960494DF}">
-                <a14:hiddenLine xmlns:a14="http://schemas.microsoft.com/office/drawing/2010/main" xmlns:p14="http://schemas.microsoft.com/office/powerpoint/2010/main" xmlns:a16="http://schemas.microsoft.com/office/drawing/2014/main" xmlns="" w="9525">
+                <a14:hiddenLine xmlns="" xmlns:a16="http://schemas.microsoft.com/office/drawing/2014/main" xmlns:p14="http://schemas.microsoft.com/office/powerpoint/2010/main" xmlns:a14="http://schemas.microsoft.com/office/drawing/2010/main" w="9525">
                   <a:solidFill>
                     <a:srgbClr val="000000"/>
                   </a:solidFill>
@@ -31727,7 +31727,7 @@
             </a:ln>
             <a:extLst>
               <a:ext uri="{91240B29-F687-4f45-9708-019B960494DF}">
-                <a14:hiddenLine xmlns:a14="http://schemas.microsoft.com/office/drawing/2010/main" xmlns:p14="http://schemas.microsoft.com/office/powerpoint/2010/main" xmlns:a16="http://schemas.microsoft.com/office/drawing/2014/main" xmlns="" w="9525">
+                <a14:hiddenLine xmlns="" xmlns:a16="http://schemas.microsoft.com/office/drawing/2014/main" xmlns:p14="http://schemas.microsoft.com/office/powerpoint/2010/main" xmlns:a14="http://schemas.microsoft.com/office/drawing/2010/main" w="9525">
                   <a:solidFill>
                     <a:srgbClr val="000000"/>
                   </a:solidFill>
@@ -31832,7 +31832,7 @@
             </a:ln>
             <a:extLst>
               <a:ext uri="{91240B29-F687-4f45-9708-019B960494DF}">
-                <a14:hiddenLine xmlns:a14="http://schemas.microsoft.com/office/drawing/2010/main" xmlns:p14="http://schemas.microsoft.com/office/powerpoint/2010/main" xmlns:a16="http://schemas.microsoft.com/office/drawing/2014/main" xmlns="" w="9525">
+                <a14:hiddenLine xmlns="" xmlns:a16="http://schemas.microsoft.com/office/drawing/2014/main" xmlns:p14="http://schemas.microsoft.com/office/powerpoint/2010/main" xmlns:a14="http://schemas.microsoft.com/office/drawing/2010/main" w="9525">
                   <a:solidFill>
                     <a:srgbClr val="000000"/>
                   </a:solidFill>
@@ -31912,7 +31912,7 @@
             </a:ln>
             <a:extLst>
               <a:ext uri="{91240B29-F687-4f45-9708-019B960494DF}">
-                <a14:hiddenLine xmlns:a14="http://schemas.microsoft.com/office/drawing/2010/main" xmlns:p14="http://schemas.microsoft.com/office/powerpoint/2010/main" xmlns:a16="http://schemas.microsoft.com/office/drawing/2014/main" xmlns="" w="9525">
+                <a14:hiddenLine xmlns="" xmlns:a16="http://schemas.microsoft.com/office/drawing/2014/main" xmlns:p14="http://schemas.microsoft.com/office/powerpoint/2010/main" xmlns:a14="http://schemas.microsoft.com/office/drawing/2010/main" w="9525">
                   <a:solidFill>
                     <a:srgbClr val="000000"/>
                   </a:solidFill>
@@ -32047,7 +32047,7 @@
             </a:ln>
             <a:extLst>
               <a:ext uri="{91240B29-F687-4f45-9708-019B960494DF}">
-                <a14:hiddenLine xmlns:a14="http://schemas.microsoft.com/office/drawing/2010/main" xmlns:p14="http://schemas.microsoft.com/office/powerpoint/2010/main" xmlns:a16="http://schemas.microsoft.com/office/drawing/2014/main" xmlns="" w="9525">
+                <a14:hiddenLine xmlns="" xmlns:a16="http://schemas.microsoft.com/office/drawing/2014/main" xmlns:p14="http://schemas.microsoft.com/office/powerpoint/2010/main" xmlns:a14="http://schemas.microsoft.com/office/drawing/2010/main" w="9525">
                   <a:solidFill>
                     <a:srgbClr val="000000"/>
                   </a:solidFill>
@@ -32859,7 +32859,7 @@
           <a:noFill/>
           <a:extLst>
             <a:ext uri="{909E8E84-426E-40dd-AFC4-6F175D3DCCD1}">
-              <a14:hiddenFill xmlns="" xmlns:a16="http://schemas.microsoft.com/office/drawing/2014/main" xmlns:p14="http://schemas.microsoft.com/office/powerpoint/2010/main" xmlns:a14="http://schemas.microsoft.com/office/drawing/2010/main">
+              <a14:hiddenFill xmlns:a14="http://schemas.microsoft.com/office/drawing/2010/main" xmlns:p14="http://schemas.microsoft.com/office/powerpoint/2010/main" xmlns:a16="http://schemas.microsoft.com/office/drawing/2014/main" xmlns="">
                 <a:solidFill>
                   <a:srgbClr val="FFFFFF"/>
                 </a:solidFill>
@@ -32986,7 +32986,7 @@
             </a:ln>
             <a:extLst>
               <a:ext uri="{91240B29-F687-4f45-9708-019B960494DF}">
-                <a14:hiddenLine xmlns="" xmlns:a16="http://schemas.microsoft.com/office/drawing/2014/main" xmlns:p14="http://schemas.microsoft.com/office/powerpoint/2010/main" xmlns:a14="http://schemas.microsoft.com/office/drawing/2010/main" w="9525">
+                <a14:hiddenLine xmlns:a14="http://schemas.microsoft.com/office/drawing/2010/main" xmlns:p14="http://schemas.microsoft.com/office/powerpoint/2010/main" xmlns:a16="http://schemas.microsoft.com/office/drawing/2014/main" xmlns="" w="9525">
                   <a:solidFill>
                     <a:srgbClr val="000000"/>
                   </a:solidFill>
@@ -33091,7 +33091,7 @@
             </a:ln>
             <a:extLst>
               <a:ext uri="{91240B29-F687-4f45-9708-019B960494DF}">
-                <a14:hiddenLine xmlns="" xmlns:a16="http://schemas.microsoft.com/office/drawing/2014/main" xmlns:p14="http://schemas.microsoft.com/office/powerpoint/2010/main" xmlns:a14="http://schemas.microsoft.com/office/drawing/2010/main" w="9525">
+                <a14:hiddenLine xmlns:a14="http://schemas.microsoft.com/office/drawing/2010/main" xmlns:p14="http://schemas.microsoft.com/office/powerpoint/2010/main" xmlns:a16="http://schemas.microsoft.com/office/drawing/2014/main" xmlns="" w="9525">
                   <a:solidFill>
                     <a:srgbClr val="000000"/>
                   </a:solidFill>
@@ -33196,7 +33196,7 @@
             </a:ln>
             <a:extLst>
               <a:ext uri="{91240B29-F687-4f45-9708-019B960494DF}">
-                <a14:hiddenLine xmlns="" xmlns:a16="http://schemas.microsoft.com/office/drawing/2014/main" xmlns:p14="http://schemas.microsoft.com/office/powerpoint/2010/main" xmlns:a14="http://schemas.microsoft.com/office/drawing/2010/main" w="9525">
+                <a14:hiddenLine xmlns:a14="http://schemas.microsoft.com/office/drawing/2010/main" xmlns:p14="http://schemas.microsoft.com/office/powerpoint/2010/main" xmlns:a16="http://schemas.microsoft.com/office/drawing/2014/main" xmlns="" w="9525">
                   <a:solidFill>
                     <a:srgbClr val="000000"/>
                   </a:solidFill>
@@ -33273,7 +33273,7 @@
             </a:ln>
             <a:extLst>
               <a:ext uri="{91240B29-F687-4f45-9708-019B960494DF}">
-                <a14:hiddenLine xmlns="" xmlns:a16="http://schemas.microsoft.com/office/drawing/2014/main" xmlns:p14="http://schemas.microsoft.com/office/powerpoint/2010/main" xmlns:a14="http://schemas.microsoft.com/office/drawing/2010/main" w="9525">
+                <a14:hiddenLine xmlns:a14="http://schemas.microsoft.com/office/drawing/2010/main" xmlns:p14="http://schemas.microsoft.com/office/powerpoint/2010/main" xmlns:a16="http://schemas.microsoft.com/office/drawing/2014/main" xmlns="" w="9525">
                   <a:solidFill>
                     <a:srgbClr val="000000"/>
                   </a:solidFill>
@@ -33378,7 +33378,7 @@
             </a:ln>
             <a:extLst>
               <a:ext uri="{91240B29-F687-4f45-9708-019B960494DF}">
-                <a14:hiddenLine xmlns="" xmlns:a16="http://schemas.microsoft.com/office/drawing/2014/main" xmlns:p14="http://schemas.microsoft.com/office/powerpoint/2010/main" xmlns:a14="http://schemas.microsoft.com/office/drawing/2010/main" w="9525">
+                <a14:hiddenLine xmlns:a14="http://schemas.microsoft.com/office/drawing/2010/main" xmlns:p14="http://schemas.microsoft.com/office/powerpoint/2010/main" xmlns:a16="http://schemas.microsoft.com/office/drawing/2014/main" xmlns="" w="9525">
                   <a:solidFill>
                     <a:srgbClr val="000000"/>
                   </a:solidFill>
@@ -33455,7 +33455,7 @@
             </a:ln>
             <a:extLst>
               <a:ext uri="{91240B29-F687-4f45-9708-019B960494DF}">
-                <a14:hiddenLine xmlns="" xmlns:a16="http://schemas.microsoft.com/office/drawing/2014/main" xmlns:p14="http://schemas.microsoft.com/office/powerpoint/2010/main" xmlns:a14="http://schemas.microsoft.com/office/drawing/2010/main" w="9525">
+                <a14:hiddenLine xmlns:a14="http://schemas.microsoft.com/office/drawing/2010/main" xmlns:p14="http://schemas.microsoft.com/office/powerpoint/2010/main" xmlns:a16="http://schemas.microsoft.com/office/drawing/2014/main" xmlns="" w="9525">
                   <a:solidFill>
                     <a:srgbClr val="000000"/>
                   </a:solidFill>
@@ -33532,7 +33532,7 @@
             </a:ln>
             <a:extLst>
               <a:ext uri="{91240B29-F687-4f45-9708-019B960494DF}">
-                <a14:hiddenLine xmlns="" xmlns:a16="http://schemas.microsoft.com/office/drawing/2014/main" xmlns:p14="http://schemas.microsoft.com/office/powerpoint/2010/main" xmlns:a14="http://schemas.microsoft.com/office/drawing/2010/main" w="9525">
+                <a14:hiddenLine xmlns:a14="http://schemas.microsoft.com/office/drawing/2010/main" xmlns:p14="http://schemas.microsoft.com/office/powerpoint/2010/main" xmlns:a16="http://schemas.microsoft.com/office/drawing/2014/main" xmlns="" w="9525">
                   <a:solidFill>
                     <a:srgbClr val="000000"/>
                   </a:solidFill>
@@ -33637,7 +33637,7 @@
             </a:ln>
             <a:extLst>
               <a:ext uri="{91240B29-F687-4f45-9708-019B960494DF}">
-                <a14:hiddenLine xmlns="" xmlns:a16="http://schemas.microsoft.com/office/drawing/2014/main" xmlns:p14="http://schemas.microsoft.com/office/powerpoint/2010/main" xmlns:a14="http://schemas.microsoft.com/office/drawing/2010/main" w="9525">
+                <a14:hiddenLine xmlns:a14="http://schemas.microsoft.com/office/drawing/2010/main" xmlns:p14="http://schemas.microsoft.com/office/powerpoint/2010/main" xmlns:a16="http://schemas.microsoft.com/office/drawing/2014/main" xmlns="" w="9525">
                   <a:solidFill>
                     <a:srgbClr val="000000"/>
                   </a:solidFill>
@@ -33742,7 +33742,7 @@
             </a:ln>
             <a:extLst>
               <a:ext uri="{91240B29-F687-4f45-9708-019B960494DF}">
-                <a14:hiddenLine xmlns="" xmlns:a16="http://schemas.microsoft.com/office/drawing/2014/main" xmlns:p14="http://schemas.microsoft.com/office/powerpoint/2010/main" xmlns:a14="http://schemas.microsoft.com/office/drawing/2010/main" w="9525">
+                <a14:hiddenLine xmlns:a14="http://schemas.microsoft.com/office/drawing/2010/main" xmlns:p14="http://schemas.microsoft.com/office/powerpoint/2010/main" xmlns:a16="http://schemas.microsoft.com/office/drawing/2014/main" xmlns="" w="9525">
                   <a:solidFill>
                     <a:srgbClr val="000000"/>
                   </a:solidFill>
@@ -33819,7 +33819,7 @@
             </a:ln>
             <a:extLst>
               <a:ext uri="{91240B29-F687-4f45-9708-019B960494DF}">
-                <a14:hiddenLine xmlns="" xmlns:a16="http://schemas.microsoft.com/office/drawing/2014/main" xmlns:p14="http://schemas.microsoft.com/office/powerpoint/2010/main" xmlns:a14="http://schemas.microsoft.com/office/drawing/2010/main" w="9525">
+                <a14:hiddenLine xmlns:a14="http://schemas.microsoft.com/office/drawing/2010/main" xmlns:p14="http://schemas.microsoft.com/office/powerpoint/2010/main" xmlns:a16="http://schemas.microsoft.com/office/drawing/2014/main" xmlns="" w="9525">
                   <a:solidFill>
                     <a:srgbClr val="000000"/>
                   </a:solidFill>
@@ -33944,7 +33944,7 @@
             </a:ln>
             <a:extLst>
               <a:ext uri="{91240B29-F687-4f45-9708-019B960494DF}">
-                <a14:hiddenLine xmlns="" xmlns:a16="http://schemas.microsoft.com/office/drawing/2014/main" xmlns:p14="http://schemas.microsoft.com/office/powerpoint/2010/main" xmlns:a14="http://schemas.microsoft.com/office/drawing/2010/main" w="9525">
+                <a14:hiddenLine xmlns:a14="http://schemas.microsoft.com/office/drawing/2010/main" xmlns:p14="http://schemas.microsoft.com/office/powerpoint/2010/main" xmlns:a16="http://schemas.microsoft.com/office/drawing/2014/main" xmlns="" w="9525">
                   <a:solidFill>
                     <a:srgbClr val="000000"/>
                   </a:solidFill>
@@ -34058,7 +34058,7 @@
             </a:ln>
             <a:extLst>
               <a:ext uri="{91240B29-F687-4f45-9708-019B960494DF}">
-                <a14:hiddenLine xmlns="" xmlns:a16="http://schemas.microsoft.com/office/drawing/2014/main" xmlns:p14="http://schemas.microsoft.com/office/powerpoint/2010/main" xmlns:a14="http://schemas.microsoft.com/office/drawing/2010/main" w="9525">
+                <a14:hiddenLine xmlns:a14="http://schemas.microsoft.com/office/drawing/2010/main" xmlns:p14="http://schemas.microsoft.com/office/powerpoint/2010/main" xmlns:a16="http://schemas.microsoft.com/office/drawing/2014/main" xmlns="" w="9525">
                   <a:solidFill>
                     <a:srgbClr val="000000"/>
                   </a:solidFill>
@@ -34135,7 +34135,7 @@
             </a:ln>
             <a:extLst>
               <a:ext uri="{91240B29-F687-4f45-9708-019B960494DF}">
-                <a14:hiddenLine xmlns="" xmlns:a16="http://schemas.microsoft.com/office/drawing/2014/main" xmlns:p14="http://schemas.microsoft.com/office/powerpoint/2010/main" xmlns:a14="http://schemas.microsoft.com/office/drawing/2010/main" w="9525">
+                <a14:hiddenLine xmlns:a14="http://schemas.microsoft.com/office/drawing/2010/main" xmlns:p14="http://schemas.microsoft.com/office/powerpoint/2010/main" xmlns:a16="http://schemas.microsoft.com/office/drawing/2014/main" xmlns="" w="9525">
                   <a:solidFill>
                     <a:srgbClr val="000000"/>
                   </a:solidFill>
@@ -34212,7 +34212,7 @@
             </a:ln>
             <a:extLst>
               <a:ext uri="{91240B29-F687-4f45-9708-019B960494DF}">
-                <a14:hiddenLine xmlns="" xmlns:a16="http://schemas.microsoft.com/office/drawing/2014/main" xmlns:p14="http://schemas.microsoft.com/office/powerpoint/2010/main" xmlns:a14="http://schemas.microsoft.com/office/drawing/2010/main" w="9525">
+                <a14:hiddenLine xmlns:a14="http://schemas.microsoft.com/office/drawing/2010/main" xmlns:p14="http://schemas.microsoft.com/office/powerpoint/2010/main" xmlns:a16="http://schemas.microsoft.com/office/drawing/2014/main" xmlns="" w="9525">
                   <a:solidFill>
                     <a:srgbClr val="000000"/>
                   </a:solidFill>
@@ -34317,7 +34317,7 @@
             </a:ln>
             <a:extLst>
               <a:ext uri="{91240B29-F687-4f45-9708-019B960494DF}">
-                <a14:hiddenLine xmlns="" xmlns:a16="http://schemas.microsoft.com/office/drawing/2014/main" xmlns:p14="http://schemas.microsoft.com/office/powerpoint/2010/main" xmlns:a14="http://schemas.microsoft.com/office/drawing/2010/main" w="9525">
+                <a14:hiddenLine xmlns:a14="http://schemas.microsoft.com/office/drawing/2010/main" xmlns:p14="http://schemas.microsoft.com/office/powerpoint/2010/main" xmlns:a16="http://schemas.microsoft.com/office/drawing/2014/main" xmlns="" w="9525">
                   <a:solidFill>
                     <a:srgbClr val="000000"/>
                   </a:solidFill>
@@ -34366,7 +34366,7 @@
             </a:ln>
             <a:extLst>
               <a:ext uri="{91240B29-F687-4f45-9708-019B960494DF}">
-                <a14:hiddenLine xmlns="" xmlns:a16="http://schemas.microsoft.com/office/drawing/2014/main" xmlns:p14="http://schemas.microsoft.com/office/powerpoint/2010/main" xmlns:a14="http://schemas.microsoft.com/office/drawing/2010/main" w="9525">
+                <a14:hiddenLine xmlns:a14="http://schemas.microsoft.com/office/drawing/2010/main" xmlns:p14="http://schemas.microsoft.com/office/powerpoint/2010/main" xmlns:a16="http://schemas.microsoft.com/office/drawing/2014/main" xmlns="" w="9525">
                   <a:solidFill>
                     <a:srgbClr val="000000"/>
                   </a:solidFill>
@@ -34446,7 +34446,7 @@
             </a:ln>
             <a:extLst>
               <a:ext uri="{91240B29-F687-4f45-9708-019B960494DF}">
-                <a14:hiddenLine xmlns="" xmlns:a16="http://schemas.microsoft.com/office/drawing/2014/main" xmlns:p14="http://schemas.microsoft.com/office/powerpoint/2010/main" xmlns:a14="http://schemas.microsoft.com/office/drawing/2010/main" w="9525">
+                <a14:hiddenLine xmlns:a14="http://schemas.microsoft.com/office/drawing/2010/main" xmlns:p14="http://schemas.microsoft.com/office/powerpoint/2010/main" xmlns:a16="http://schemas.microsoft.com/office/drawing/2014/main" xmlns="" w="9525">
                   <a:solidFill>
                     <a:srgbClr val="000000"/>
                   </a:solidFill>
@@ -34551,7 +34551,7 @@
             </a:ln>
             <a:extLst>
               <a:ext uri="{91240B29-F687-4f45-9708-019B960494DF}">
-                <a14:hiddenLine xmlns="" xmlns:a16="http://schemas.microsoft.com/office/drawing/2014/main" xmlns:p14="http://schemas.microsoft.com/office/powerpoint/2010/main" xmlns:a14="http://schemas.microsoft.com/office/drawing/2010/main" w="9525">
+                <a14:hiddenLine xmlns:a14="http://schemas.microsoft.com/office/drawing/2010/main" xmlns:p14="http://schemas.microsoft.com/office/powerpoint/2010/main" xmlns:a16="http://schemas.microsoft.com/office/drawing/2014/main" xmlns="" w="9525">
                   <a:solidFill>
                     <a:srgbClr val="000000"/>
                   </a:solidFill>
@@ -34628,7 +34628,7 @@
             </a:ln>
             <a:extLst>
               <a:ext uri="{91240B29-F687-4f45-9708-019B960494DF}">
-                <a14:hiddenLine xmlns="" xmlns:a16="http://schemas.microsoft.com/office/drawing/2014/main" xmlns:p14="http://schemas.microsoft.com/office/powerpoint/2010/main" xmlns:a14="http://schemas.microsoft.com/office/drawing/2010/main" w="9525">
+                <a14:hiddenLine xmlns:a14="http://schemas.microsoft.com/office/drawing/2010/main" xmlns:p14="http://schemas.microsoft.com/office/powerpoint/2010/main" xmlns:a16="http://schemas.microsoft.com/office/drawing/2014/main" xmlns="" w="9525">
                   <a:solidFill>
                     <a:srgbClr val="000000"/>
                   </a:solidFill>
@@ -34733,7 +34733,7 @@
             </a:ln>
             <a:extLst>
               <a:ext uri="{91240B29-F687-4f45-9708-019B960494DF}">
-                <a14:hiddenLine xmlns="" xmlns:a16="http://schemas.microsoft.com/office/drawing/2014/main" xmlns:p14="http://schemas.microsoft.com/office/powerpoint/2010/main" xmlns:a14="http://schemas.microsoft.com/office/drawing/2010/main" w="9525">
+                <a14:hiddenLine xmlns:a14="http://schemas.microsoft.com/office/drawing/2010/main" xmlns:p14="http://schemas.microsoft.com/office/powerpoint/2010/main" xmlns:a16="http://schemas.microsoft.com/office/drawing/2014/main" xmlns="" w="9525">
                   <a:solidFill>
                     <a:srgbClr val="000000"/>
                   </a:solidFill>
@@ -34813,7 +34813,7 @@
             </a:ln>
             <a:extLst>
               <a:ext uri="{91240B29-F687-4f45-9708-019B960494DF}">
-                <a14:hiddenLine xmlns="" xmlns:a16="http://schemas.microsoft.com/office/drawing/2014/main" xmlns:p14="http://schemas.microsoft.com/office/powerpoint/2010/main" xmlns:a14="http://schemas.microsoft.com/office/drawing/2010/main" w="9525">
+                <a14:hiddenLine xmlns:a14="http://schemas.microsoft.com/office/drawing/2010/main" xmlns:p14="http://schemas.microsoft.com/office/powerpoint/2010/main" xmlns:a16="http://schemas.microsoft.com/office/drawing/2014/main" xmlns="" w="9525">
                   <a:solidFill>
                     <a:srgbClr val="000000"/>
                   </a:solidFill>
@@ -34890,7 +34890,7 @@
             </a:ln>
             <a:extLst>
               <a:ext uri="{91240B29-F687-4f45-9708-019B960494DF}">
-                <a14:hiddenLine xmlns="" xmlns:a16="http://schemas.microsoft.com/office/drawing/2014/main" xmlns:p14="http://schemas.microsoft.com/office/powerpoint/2010/main" xmlns:a14="http://schemas.microsoft.com/office/drawing/2010/main" w="9525">
+                <a14:hiddenLine xmlns:a14="http://schemas.microsoft.com/office/drawing/2010/main" xmlns:p14="http://schemas.microsoft.com/office/powerpoint/2010/main" xmlns:a16="http://schemas.microsoft.com/office/drawing/2014/main" xmlns="" w="9525">
                   <a:solidFill>
                     <a:srgbClr val="000000"/>
                   </a:solidFill>
@@ -34995,7 +34995,7 @@
             </a:ln>
             <a:extLst>
               <a:ext uri="{91240B29-F687-4f45-9708-019B960494DF}">
-                <a14:hiddenLine xmlns="" xmlns:a16="http://schemas.microsoft.com/office/drawing/2014/main" xmlns:p14="http://schemas.microsoft.com/office/powerpoint/2010/main" xmlns:a14="http://schemas.microsoft.com/office/drawing/2010/main" w="9525">
+                <a14:hiddenLine xmlns:a14="http://schemas.microsoft.com/office/drawing/2010/main" xmlns:p14="http://schemas.microsoft.com/office/powerpoint/2010/main" xmlns:a16="http://schemas.microsoft.com/office/drawing/2014/main" xmlns="" w="9525">
                   <a:solidFill>
                     <a:srgbClr val="000000"/>
                   </a:solidFill>
@@ -35100,7 +35100,7 @@
             </a:ln>
             <a:extLst>
               <a:ext uri="{91240B29-F687-4f45-9708-019B960494DF}">
-                <a14:hiddenLine xmlns="" xmlns:a16="http://schemas.microsoft.com/office/drawing/2014/main" xmlns:p14="http://schemas.microsoft.com/office/powerpoint/2010/main" xmlns:a14="http://schemas.microsoft.com/office/drawing/2010/main" w="9525">
+                <a14:hiddenLine xmlns:a14="http://schemas.microsoft.com/office/drawing/2010/main" xmlns:p14="http://schemas.microsoft.com/office/powerpoint/2010/main" xmlns:a16="http://schemas.microsoft.com/office/drawing/2014/main" xmlns="" w="9525">
                   <a:solidFill>
                     <a:srgbClr val="000000"/>
                   </a:solidFill>
@@ -35180,7 +35180,7 @@
             </a:ln>
             <a:extLst>
               <a:ext uri="{91240B29-F687-4f45-9708-019B960494DF}">
-                <a14:hiddenLine xmlns="" xmlns:a16="http://schemas.microsoft.com/office/drawing/2014/main" xmlns:p14="http://schemas.microsoft.com/office/powerpoint/2010/main" xmlns:a14="http://schemas.microsoft.com/office/drawing/2010/main" w="9525">
+                <a14:hiddenLine xmlns:a14="http://schemas.microsoft.com/office/drawing/2010/main" xmlns:p14="http://schemas.microsoft.com/office/powerpoint/2010/main" xmlns:a16="http://schemas.microsoft.com/office/drawing/2014/main" xmlns="" w="9525">
                   <a:solidFill>
                     <a:srgbClr val="000000"/>
                   </a:solidFill>
@@ -35315,7 +35315,7 @@
             </a:ln>
             <a:extLst>
               <a:ext uri="{91240B29-F687-4f45-9708-019B960494DF}">
-                <a14:hiddenLine xmlns="" xmlns:a16="http://schemas.microsoft.com/office/drawing/2014/main" xmlns:p14="http://schemas.microsoft.com/office/powerpoint/2010/main" xmlns:a14="http://schemas.microsoft.com/office/drawing/2010/main" w="9525">
+                <a14:hiddenLine xmlns:a14="http://schemas.microsoft.com/office/drawing/2010/main" xmlns:p14="http://schemas.microsoft.com/office/powerpoint/2010/main" xmlns:a16="http://schemas.microsoft.com/office/drawing/2014/main" xmlns="" w="9525">
                   <a:solidFill>
                     <a:srgbClr val="000000"/>
                   </a:solidFill>
@@ -35362,13 +35362,8 @@
           <a:p>
             <a:r>
               <a:rPr lang="it-IT" sz="2800" dirty="0"/>
-              <a:t>Il Server TCP agisce in modo concorrente, quindi riesce a sostenere molteplici connessioni senza dilatare i tempi di </a:t>
+              <a:t>Il Server TCP è sequenziale, quindi riesce a sostenere molteplici connessioni senza dilatare i tempi di esecuzione.</a:t>
             </a:r>
-            <a:r>
-              <a:rPr lang="it-IT" sz="2800"/>
-              <a:t>esecuzione.</a:t>
-            </a:r>
-            <a:endParaRPr lang="it-IT" sz="2800" dirty="0"/>
           </a:p>
           <a:p>
             <a:endParaRPr lang="it-IT" sz="2800" dirty="0"/>
@@ -36348,6 +36343,15 @@
 </file>
 
 <file path=customXml/item2.xml><?xml version="1.0" encoding="utf-8"?>
+<?mso-contentType ?>
+<FormTemplates xmlns="http://schemas.microsoft.com/sharepoint/v3/contenttype/forms">
+  <Display>DocumentLibraryForm</Display>
+  <Edit>DocumentLibraryForm</Edit>
+  <New>DocumentLibraryForm</New>
+</FormTemplates>
+</file>
+
+<file path=customXml/item3.xml><?xml version="1.0" encoding="utf-8"?>
 <ct:contentTypeSchema xmlns:ct="http://schemas.microsoft.com/office/2006/metadata/contentType" xmlns:ma="http://schemas.microsoft.com/office/2006/metadata/properties/metaAttributes" ct:_="" ma:_="" ma:contentTypeName="Document" ma:contentTypeID="0x010100F6544C1E39CC704E9B655547C2A8EEA9" ma:contentTypeVersion="2" ma:contentTypeDescription="Create a new document." ma:contentTypeScope="" ma:versionID="3fe2086bbb13892a04151ef672109fb5">
   <xsd:schema xmlns:xsd="http://www.w3.org/2001/XMLSchema" xmlns:xs="http://www.w3.org/2001/XMLSchema" xmlns:p="http://schemas.microsoft.com/office/2006/metadata/properties" xmlns:ns3="b4ea0a96-3951-4160-baca-c74dadb8c17f" targetNamespace="http://schemas.microsoft.com/office/2006/metadata/properties" ma:root="true" ma:fieldsID="00c6c909f9b37d6c43d157d3aea4a463" ns3:_="">
     <xsd:import namespace="b4ea0a96-3951-4160-baca-c74dadb8c17f"/>
@@ -36479,15 +36483,6 @@
 </ct:contentTypeSchema>
 </file>
 
-<file path=customXml/item3.xml><?xml version="1.0" encoding="utf-8"?>
-<?mso-contentType ?>
-<FormTemplates xmlns="http://schemas.microsoft.com/sharepoint/v3/contenttype/forms">
-  <Display>DocumentLibraryForm</Display>
-  <Edit>DocumentLibraryForm</Edit>
-  <New>DocumentLibraryForm</New>
-</FormTemplates>
-</file>
-
 <file path=customXml/itemProps1.xml><?xml version="1.0" encoding="utf-8"?>
 <ds:datastoreItem xmlns:ds="http://schemas.openxmlformats.org/officeDocument/2006/customXml" ds:itemID="{D8463AF2-9ABC-4087-AAED-E5A30A3C4C54}">
   <ds:schemaRefs>
@@ -36505,6 +36500,14 @@
 </file>
 
 <file path=customXml/itemProps2.xml><?xml version="1.0" encoding="utf-8"?>
+<ds:datastoreItem xmlns:ds="http://schemas.openxmlformats.org/officeDocument/2006/customXml" ds:itemID="{3057252C-AA3B-4053-A64D-51B970623905}">
+  <ds:schemaRefs>
+    <ds:schemaRef ds:uri="http://schemas.microsoft.com/sharepoint/v3/contenttype/forms"/>
+  </ds:schemaRefs>
+</ds:datastoreItem>
+</file>
+
+<file path=customXml/itemProps3.xml><?xml version="1.0" encoding="utf-8"?>
 <ds:datastoreItem xmlns:ds="http://schemas.openxmlformats.org/officeDocument/2006/customXml" ds:itemID="{44ED1FCC-97A6-4B60-A765-2D292F04234A}">
   <ds:schemaRefs>
     <ds:schemaRef ds:uri="http://schemas.microsoft.com/office/2006/metadata/contentType"/>
@@ -36520,12 +36523,4 @@
     <ds:schemaRef ds:uri="http://schemas.microsoft.com/internal/obd"/>
   </ds:schemaRefs>
 </ds:datastoreItem>
-</file>
-
-<file path=customXml/itemProps3.xml><?xml version="1.0" encoding="utf-8"?>
-<ds:datastoreItem xmlns:ds="http://schemas.openxmlformats.org/officeDocument/2006/customXml" ds:itemID="{3057252C-AA3B-4053-A64D-51B970623905}">
-  <ds:schemaRefs>
-    <ds:schemaRef ds:uri="http://schemas.microsoft.com/sharepoint/v3/contenttype/forms"/>
-  </ds:schemaRefs>
-</ds:datastoreItem>
 </file>
</xml_diff>